<commit_message>
Added presentation in kit layout
</commit_message>
<xml_diff>
--- a/AbschlussPraesentation/Abschlusspraesentation_02.pptx
+++ b/AbschlussPraesentation/Abschlusspraesentation_02.pptx
@@ -50,29 +50,22 @@
   <p:notesSz cx="6858000" cy="9144000"/>
   <p:embeddedFontLst>
     <p:embeddedFont>
-      <p:font typeface="Economica" panose="020B0604020202020204" charset="0"/>
+      <p:font typeface="Cambria Math" panose="02040503050406030204" pitchFamily="18" charset="0"/>
       <p:regular r:id="rId40"/>
-      <p:bold r:id="rId41"/>
-      <p:italic r:id="rId42"/>
-      <p:boldItalic r:id="rId43"/>
     </p:embeddedFont>
     <p:embeddedFont>
-      <p:font typeface="Cambria Math" panose="02040503050406030204" pitchFamily="18" charset="0"/>
-      <p:regular r:id="rId44"/>
+      <p:font typeface="Economica" panose="020B0604020202020204" charset="0"/>
+      <p:regular r:id="rId41"/>
+      <p:bold r:id="rId42"/>
+      <p:italic r:id="rId43"/>
+      <p:boldItalic r:id="rId44"/>
     </p:embeddedFont>
     <p:embeddedFont>
-      <p:font typeface="Open Sans" panose="020B0604020202020204" charset="0"/>
+      <p:font typeface="Open Sans" panose="020B0606030504020204" pitchFamily="34" charset="0"/>
       <p:regular r:id="rId45"/>
       <p:bold r:id="rId46"/>
       <p:italic r:id="rId47"/>
       <p:boldItalic r:id="rId48"/>
-    </p:embeddedFont>
-    <p:embeddedFont>
-      <p:font typeface="Nunito" panose="020B0604020202020204" charset="0"/>
-      <p:regular r:id="rId49"/>
-      <p:bold r:id="rId50"/>
-      <p:italic r:id="rId51"/>
-      <p:boldItalic r:id="rId52"/>
     </p:embeddedFont>
   </p:embeddedFontLst>
   <p:defaultTextStyle>
@@ -1899,18 +1892,13 @@
         <a:lstStyle/>
         <a:p>
           <a:r>
-            <a:rPr lang="de-DE" dirty="0" smtClean="0">
+            <a:rPr lang="de-DE" dirty="0">
               <a:latin typeface="Open Sans" panose="020B0604020202020204" charset="0"/>
               <a:ea typeface="Open Sans" panose="020B0604020202020204" charset="0"/>
               <a:cs typeface="Open Sans" panose="020B0604020202020204" charset="0"/>
             </a:rPr>
             <a:t>Verbindung GMK und Mathe</a:t>
           </a:r>
-          <a:endParaRPr lang="de-DE" dirty="0">
-            <a:latin typeface="Open Sans" panose="020B0604020202020204" charset="0"/>
-            <a:ea typeface="Open Sans" panose="020B0604020202020204" charset="0"/>
-            <a:cs typeface="Open Sans" panose="020B0604020202020204" charset="0"/>
-          </a:endParaRPr>
         </a:p>
       </dgm:t>
     </dgm:pt>
@@ -1945,18 +1933,13 @@
         <a:p>
           <a:pPr rtl="0"/>
           <a:r>
-            <a:rPr lang="de-DE" sz="1700" dirty="0" smtClean="0">
+            <a:rPr lang="de-DE" sz="1700" dirty="0">
               <a:latin typeface="Open Sans" panose="020B0604020202020204" charset="0"/>
               <a:ea typeface="Open Sans" panose="020B0604020202020204" charset="0"/>
               <a:cs typeface="Open Sans" panose="020B0604020202020204" charset="0"/>
             </a:rPr>
             <a:t>(Wie) Beeinflusst die Vorgabe mathematischer Modelle unseren Alltag?</a:t>
           </a:r>
-          <a:endParaRPr lang="de-DE" sz="1700" dirty="0">
-            <a:latin typeface="Open Sans" panose="020B0604020202020204" charset="0"/>
-            <a:ea typeface="Open Sans" panose="020B0604020202020204" charset="0"/>
-            <a:cs typeface="Open Sans" panose="020B0604020202020204" charset="0"/>
-          </a:endParaRPr>
         </a:p>
       </dgm:t>
     </dgm:pt>
@@ -1991,18 +1974,13 @@
         <a:p>
           <a:pPr rtl="0"/>
           <a:r>
-            <a:rPr lang="de-DE" sz="1700" dirty="0" smtClean="0">
+            <a:rPr lang="de-DE" sz="1700" dirty="0">
               <a:latin typeface="Open Sans" panose="020B0604020202020204" charset="0"/>
               <a:ea typeface="Open Sans" panose="020B0604020202020204" charset="0"/>
               <a:cs typeface="Open Sans" panose="020B0604020202020204" charset="0"/>
             </a:rPr>
             <a:t>Sind mathematisch korrekte Modelle unantastbar?</a:t>
           </a:r>
-          <a:endParaRPr lang="de-DE" sz="1700" dirty="0">
-            <a:latin typeface="Open Sans" panose="020B0604020202020204" charset="0"/>
-            <a:ea typeface="Open Sans" panose="020B0604020202020204" charset="0"/>
-            <a:cs typeface="Open Sans" panose="020B0604020202020204" charset="0"/>
-          </a:endParaRPr>
         </a:p>
       </dgm:t>
     </dgm:pt>
@@ -2037,7 +2015,7 @@
         <a:p>
           <a:pPr rtl="0"/>
           <a:r>
-            <a:rPr lang="de-DE" sz="1700" dirty="0" smtClean="0">
+            <a:rPr lang="de-DE" sz="1700" dirty="0">
               <a:latin typeface="Open Sans" panose="020B0604020202020204" charset="0"/>
               <a:ea typeface="Open Sans" panose="020B0604020202020204" charset="0"/>
               <a:cs typeface="Open Sans" panose="020B0604020202020204" charset="0"/>
@@ -2045,25 +2023,20 @@
             <a:t>Wie funktioniert eigentlich unser Wahlsystem? </a:t>
           </a:r>
           <a:br>
-            <a:rPr lang="de-DE" sz="1700" dirty="0" smtClean="0">
+            <a:rPr lang="de-DE" sz="1700" dirty="0">
               <a:latin typeface="Open Sans" panose="020B0604020202020204" charset="0"/>
               <a:ea typeface="Open Sans" panose="020B0604020202020204" charset="0"/>
               <a:cs typeface="Open Sans" panose="020B0604020202020204" charset="0"/>
             </a:rPr>
           </a:br>
           <a:r>
-            <a:rPr lang="de-DE" sz="1700" dirty="0" smtClean="0">
+            <a:rPr lang="de-DE" sz="1700" dirty="0">
               <a:latin typeface="Open Sans" panose="020B0604020202020204" charset="0"/>
               <a:ea typeface="Open Sans" panose="020B0604020202020204" charset="0"/>
               <a:cs typeface="Open Sans" panose="020B0604020202020204" charset="0"/>
             </a:rPr>
             <a:t>Ist unser Wahlsystem (wirklich) so demokratisch?</a:t>
           </a:r>
-          <a:endParaRPr lang="de-DE" sz="1700" dirty="0">
-            <a:latin typeface="Open Sans" panose="020B0604020202020204" charset="0"/>
-            <a:ea typeface="Open Sans" panose="020B0604020202020204" charset="0"/>
-            <a:cs typeface="Open Sans" panose="020B0604020202020204" charset="0"/>
-          </a:endParaRPr>
         </a:p>
       </dgm:t>
     </dgm:pt>
@@ -2115,13 +2088,6 @@
         </dgm:presLayoutVars>
       </dgm:prSet>
       <dgm:spPr/>
-      <dgm:t>
-        <a:bodyPr/>
-        <a:lstStyle/>
-        <a:p>
-          <a:endParaRPr lang="de-DE"/>
-        </a:p>
-      </dgm:t>
     </dgm:pt>
     <dgm:pt modelId="{316BD337-9E19-40CD-9C87-5BF528BEF978}" type="pres">
       <dgm:prSet presAssocID="{03859B7E-B572-46F9-9423-E691D72A326D}" presName="parTrans" presStyleLbl="bgSibTrans2D1" presStyleIdx="1" presStyleCnt="3"/>
@@ -2134,13 +2100,6 @@
         </dgm:presLayoutVars>
       </dgm:prSet>
       <dgm:spPr/>
-      <dgm:t>
-        <a:bodyPr/>
-        <a:lstStyle/>
-        <a:p>
-          <a:endParaRPr lang="de-DE"/>
-        </a:p>
-      </dgm:t>
     </dgm:pt>
     <dgm:pt modelId="{BA598F4E-C331-464A-B764-5E78392B9AE3}" type="pres">
       <dgm:prSet presAssocID="{91476DDD-327D-40BB-AE4C-D1C3EC00294C}" presName="parTrans" presStyleLbl="bgSibTrans2D1" presStyleIdx="2" presStyleCnt="3"/>
@@ -2153,28 +2112,21 @@
         </dgm:presLayoutVars>
       </dgm:prSet>
       <dgm:spPr/>
-      <dgm:t>
-        <a:bodyPr/>
-        <a:lstStyle/>
-        <a:p>
-          <a:endParaRPr lang="de-DE"/>
-        </a:p>
-      </dgm:t>
     </dgm:pt>
   </dgm:ptLst>
   <dgm:cxnLst>
-    <dgm:cxn modelId="{235977CD-EC79-4EF9-A0FF-4311C5B9BA9C}" type="presOf" srcId="{ACED80DD-B3F2-4B88-A866-E5BBEC5A634C}" destId="{63D6A59D-DEB4-4D43-BD3C-DB666515AE65}" srcOrd="0" destOrd="0" presId="urn:microsoft.com/office/officeart/2005/8/layout/radial4"/>
-    <dgm:cxn modelId="{A7C20AEE-0911-42BF-88F8-A578A2275D20}" srcId="{DC1C0C31-89FE-4646-B2DC-6F5B7FFEB25D}" destId="{DC99EE43-6E6A-4AC9-A995-5F17E6228283}" srcOrd="2" destOrd="0" parTransId="{91476DDD-327D-40BB-AE4C-D1C3EC00294C}" sibTransId="{5F8635C1-71D7-4291-B4F7-0585EF308EF6}"/>
+    <dgm:cxn modelId="{C80FFC3C-DC95-4CF1-B466-65E11ED48301}" type="presOf" srcId="{DC1C0C31-89FE-4646-B2DC-6F5B7FFEB25D}" destId="{FBC9080B-4D2B-4442-A2B9-88FD44B9A443}" srcOrd="0" destOrd="0" presId="urn:microsoft.com/office/officeart/2005/8/layout/radial4"/>
     <dgm:cxn modelId="{A6E37664-3248-4CCC-A3A6-211CF482993A}" srcId="{A19FB311-8CE1-48E8-B4F4-96D273C6A104}" destId="{DC1C0C31-89FE-4646-B2DC-6F5B7FFEB25D}" srcOrd="0" destOrd="0" parTransId="{AD5C7951-D904-4CD2-AB78-1D24AD3F5BA8}" sibTransId="{83C1B87D-8515-4EF0-8C80-EC57A102B088}"/>
     <dgm:cxn modelId="{7CB35C4C-BA90-4780-9159-9C299506E0C9}" srcId="{DC1C0C31-89FE-4646-B2DC-6F5B7FFEB25D}" destId="{2FFE865F-5901-4AF1-AA1C-6D6B9DFD6B7B}" srcOrd="0" destOrd="0" parTransId="{1EF96A02-9157-4CC7-884C-BE72C965CC58}" sibTransId="{573FB6F3-39BB-4F10-AF8C-A24788495565}"/>
+    <dgm:cxn modelId="{74628B71-08C2-45D6-A72B-829B6C54569B}" type="presOf" srcId="{2FFE865F-5901-4AF1-AA1C-6D6B9DFD6B7B}" destId="{5ADDC7E7-CDF1-4DCF-AB8C-EF96BCC36BC8}" srcOrd="0" destOrd="0" presId="urn:microsoft.com/office/officeart/2005/8/layout/radial4"/>
+    <dgm:cxn modelId="{7AFF2F77-A832-4494-8AE6-E7A2477DB412}" type="presOf" srcId="{1EF96A02-9157-4CC7-884C-BE72C965CC58}" destId="{31DDEDB3-3966-45E1-BA22-C2C094A4785F}" srcOrd="0" destOrd="0" presId="urn:microsoft.com/office/officeart/2005/8/layout/radial4"/>
+    <dgm:cxn modelId="{678A9577-4D1C-4866-94CE-6DF7EC7F2246}" type="presOf" srcId="{A19FB311-8CE1-48E8-B4F4-96D273C6A104}" destId="{322AB630-9102-48C1-A6FD-CA299A8463C5}" srcOrd="0" destOrd="0" presId="urn:microsoft.com/office/officeart/2005/8/layout/radial4"/>
     <dgm:cxn modelId="{6E8428C0-BDA3-4F7A-B3F9-EE6D8A4E3175}" type="presOf" srcId="{03859B7E-B572-46F9-9423-E691D72A326D}" destId="{316BD337-9E19-40CD-9C87-5BF528BEF978}" srcOrd="0" destOrd="0" presId="urn:microsoft.com/office/officeart/2005/8/layout/radial4"/>
+    <dgm:cxn modelId="{AC4FEFC1-48C6-44C2-9380-AEE0E3C01298}" type="presOf" srcId="{DC99EE43-6E6A-4AC9-A995-5F17E6228283}" destId="{D80291B3-4354-4ED2-94ED-D2D671900A83}" srcOrd="0" destOrd="0" presId="urn:microsoft.com/office/officeart/2005/8/layout/radial4"/>
+    <dgm:cxn modelId="{AE3B6FC7-2DE2-429C-8AC2-7FC854D68E64}" type="presOf" srcId="{91476DDD-327D-40BB-AE4C-D1C3EC00294C}" destId="{BA598F4E-C331-464A-B764-5E78392B9AE3}" srcOrd="0" destOrd="0" presId="urn:microsoft.com/office/officeart/2005/8/layout/radial4"/>
+    <dgm:cxn modelId="{235977CD-EC79-4EF9-A0FF-4311C5B9BA9C}" type="presOf" srcId="{ACED80DD-B3F2-4B88-A866-E5BBEC5A634C}" destId="{63D6A59D-DEB4-4D43-BD3C-DB666515AE65}" srcOrd="0" destOrd="0" presId="urn:microsoft.com/office/officeart/2005/8/layout/radial4"/>
     <dgm:cxn modelId="{53CA96DC-BF6B-47B4-9409-DCCDF2A704CD}" srcId="{DC1C0C31-89FE-4646-B2DC-6F5B7FFEB25D}" destId="{ACED80DD-B3F2-4B88-A866-E5BBEC5A634C}" srcOrd="1" destOrd="0" parTransId="{03859B7E-B572-46F9-9423-E691D72A326D}" sibTransId="{0D537946-235C-4FE7-8F83-EDD02D9246D6}"/>
-    <dgm:cxn modelId="{678A9577-4D1C-4866-94CE-6DF7EC7F2246}" type="presOf" srcId="{A19FB311-8CE1-48E8-B4F4-96D273C6A104}" destId="{322AB630-9102-48C1-A6FD-CA299A8463C5}" srcOrd="0" destOrd="0" presId="urn:microsoft.com/office/officeart/2005/8/layout/radial4"/>
-    <dgm:cxn modelId="{AE3B6FC7-2DE2-429C-8AC2-7FC854D68E64}" type="presOf" srcId="{91476DDD-327D-40BB-AE4C-D1C3EC00294C}" destId="{BA598F4E-C331-464A-B764-5E78392B9AE3}" srcOrd="0" destOrd="0" presId="urn:microsoft.com/office/officeart/2005/8/layout/radial4"/>
-    <dgm:cxn modelId="{7AFF2F77-A832-4494-8AE6-E7A2477DB412}" type="presOf" srcId="{1EF96A02-9157-4CC7-884C-BE72C965CC58}" destId="{31DDEDB3-3966-45E1-BA22-C2C094A4785F}" srcOrd="0" destOrd="0" presId="urn:microsoft.com/office/officeart/2005/8/layout/radial4"/>
-    <dgm:cxn modelId="{74628B71-08C2-45D6-A72B-829B6C54569B}" type="presOf" srcId="{2FFE865F-5901-4AF1-AA1C-6D6B9DFD6B7B}" destId="{5ADDC7E7-CDF1-4DCF-AB8C-EF96BCC36BC8}" srcOrd="0" destOrd="0" presId="urn:microsoft.com/office/officeart/2005/8/layout/radial4"/>
-    <dgm:cxn modelId="{AC4FEFC1-48C6-44C2-9380-AEE0E3C01298}" type="presOf" srcId="{DC99EE43-6E6A-4AC9-A995-5F17E6228283}" destId="{D80291B3-4354-4ED2-94ED-D2D671900A83}" srcOrd="0" destOrd="0" presId="urn:microsoft.com/office/officeart/2005/8/layout/radial4"/>
-    <dgm:cxn modelId="{C80FFC3C-DC95-4CF1-B466-65E11ED48301}" type="presOf" srcId="{DC1C0C31-89FE-4646-B2DC-6F5B7FFEB25D}" destId="{FBC9080B-4D2B-4442-A2B9-88FD44B9A443}" srcOrd="0" destOrd="0" presId="urn:microsoft.com/office/officeart/2005/8/layout/radial4"/>
+    <dgm:cxn modelId="{A7C20AEE-0911-42BF-88F8-A578A2275D20}" srcId="{DC1C0C31-89FE-4646-B2DC-6F5B7FFEB25D}" destId="{DC99EE43-6E6A-4AC9-A995-5F17E6228283}" srcOrd="2" destOrd="0" parTransId="{91476DDD-327D-40BB-AE4C-D1C3EC00294C}" sibTransId="{5F8635C1-71D7-4291-B4F7-0585EF308EF6}"/>
     <dgm:cxn modelId="{6F58F6C4-FFC0-4332-979D-8BA917070C70}" type="presParOf" srcId="{322AB630-9102-48C1-A6FD-CA299A8463C5}" destId="{FBC9080B-4D2B-4442-A2B9-88FD44B9A443}" srcOrd="0" destOrd="0" presId="urn:microsoft.com/office/officeart/2005/8/layout/radial4"/>
     <dgm:cxn modelId="{C0C3F022-A0F7-474A-A495-5D6B567776E2}" type="presParOf" srcId="{322AB630-9102-48C1-A6FD-CA299A8463C5}" destId="{31DDEDB3-3966-45E1-BA22-C2C094A4785F}" srcOrd="1" destOrd="0" presId="urn:microsoft.com/office/officeart/2005/8/layout/radial4"/>
     <dgm:cxn modelId="{03E12075-0226-40EC-8DE7-2BD05001ADA7}" type="presParOf" srcId="{322AB630-9102-48C1-A6FD-CA299A8463C5}" destId="{5ADDC7E7-CDF1-4DCF-AB8C-EF96BCC36BC8}" srcOrd="2" destOrd="0" presId="urn:microsoft.com/office/officeart/2005/8/layout/radial4"/>
@@ -2215,18 +2167,13 @@
         <a:lstStyle/>
         <a:p>
           <a:r>
-            <a:rPr lang="de-DE" sz="2000" dirty="0" smtClean="0">
+            <a:rPr lang="de-DE" sz="2000" dirty="0">
               <a:latin typeface="Open Sans" panose="020B0604020202020204" charset="0"/>
               <a:ea typeface="Open Sans" panose="020B0604020202020204" charset="0"/>
               <a:cs typeface="Open Sans" panose="020B0604020202020204" charset="0"/>
             </a:rPr>
             <a:t>Notion</a:t>
           </a:r>
-          <a:endParaRPr lang="de-DE" sz="2000" dirty="0">
-            <a:latin typeface="Open Sans" panose="020B0604020202020204" charset="0"/>
-            <a:ea typeface="Open Sans" panose="020B0604020202020204" charset="0"/>
-            <a:cs typeface="Open Sans" panose="020B0604020202020204" charset="0"/>
-          </a:endParaRPr>
         </a:p>
       </dgm:t>
     </dgm:pt>
@@ -2249,18 +2196,13 @@
         <a:lstStyle/>
         <a:p>
           <a:r>
-            <a:rPr lang="de-DE" sz="3000" dirty="0" smtClean="0">
+            <a:rPr lang="de-DE" sz="3000" dirty="0">
               <a:latin typeface="Open Sans" panose="020B0604020202020204" charset="0"/>
               <a:ea typeface="Open Sans" panose="020B0604020202020204" charset="0"/>
               <a:cs typeface="Open Sans" panose="020B0604020202020204" charset="0"/>
             </a:rPr>
             <a:t>PPT</a:t>
           </a:r>
-          <a:endParaRPr lang="de-DE" sz="3000" dirty="0">
-            <a:latin typeface="Open Sans" panose="020B0604020202020204" charset="0"/>
-            <a:ea typeface="Open Sans" panose="020B0604020202020204" charset="0"/>
-            <a:cs typeface="Open Sans" panose="020B0604020202020204" charset="0"/>
-          </a:endParaRPr>
         </a:p>
       </dgm:t>
     </dgm:pt>
@@ -2272,7 +2214,7 @@
         <a:lstStyle/>
         <a:p>
           <a:r>
-            <a:rPr lang="de-DE" sz="2000" dirty="0" err="1" smtClean="0">
+            <a:rPr lang="de-DE" sz="2000" dirty="0" err="1">
               <a:latin typeface="Open Sans" panose="020B0604020202020204" charset="0"/>
               <a:ea typeface="Open Sans" panose="020B0604020202020204" charset="0"/>
               <a:cs typeface="Open Sans" panose="020B0604020202020204" charset="0"/>
@@ -2280,7 +2222,7 @@
             <a:t>Geo</a:t>
           </a:r>
           <a:r>
-            <a:rPr lang="de-DE" sz="2000" dirty="0" smtClean="0">
+            <a:rPr lang="de-DE" sz="2000" dirty="0">
               <a:latin typeface="Open Sans" panose="020B0604020202020204" charset="0"/>
               <a:ea typeface="Open Sans" panose="020B0604020202020204" charset="0"/>
               <a:cs typeface="Open Sans" panose="020B0604020202020204" charset="0"/>
@@ -2288,7 +2230,7 @@
             <a:t> </a:t>
           </a:r>
           <a:r>
-            <a:rPr lang="de-DE" sz="2000" dirty="0" err="1" smtClean="0">
+            <a:rPr lang="de-DE" sz="2000" dirty="0" err="1">
               <a:latin typeface="Open Sans" panose="020B0604020202020204" charset="0"/>
               <a:ea typeface="Open Sans" panose="020B0604020202020204" charset="0"/>
               <a:cs typeface="Open Sans" panose="020B0604020202020204" charset="0"/>
@@ -2328,7 +2270,7 @@
         <a:lstStyle/>
         <a:p>
           <a:r>
-            <a:rPr lang="de-DE" sz="2700" dirty="0" err="1" smtClean="0">
+            <a:rPr lang="de-DE" sz="2700" dirty="0" err="1">
               <a:ln>
                 <a:solidFill>
                   <a:schemeClr val="accent3">
@@ -2365,18 +2307,13 @@
         <a:lstStyle/>
         <a:p>
           <a:r>
-            <a:rPr lang="de-DE" sz="3000" dirty="0" smtClean="0">
+            <a:rPr lang="de-DE" sz="3000" dirty="0">
               <a:latin typeface="Open Sans" panose="020B0604020202020204" charset="0"/>
               <a:ea typeface="Open Sans" panose="020B0604020202020204" charset="0"/>
               <a:cs typeface="Open Sans" panose="020B0604020202020204" charset="0"/>
             </a:rPr>
             <a:t>H5P</a:t>
           </a:r>
-          <a:endParaRPr lang="de-DE" sz="3000" dirty="0">
-            <a:latin typeface="Open Sans" panose="020B0604020202020204" charset="0"/>
-            <a:ea typeface="Open Sans" panose="020B0604020202020204" charset="0"/>
-            <a:cs typeface="Open Sans" panose="020B0604020202020204" charset="0"/>
-          </a:endParaRPr>
         </a:p>
       </dgm:t>
     </dgm:pt>
@@ -2388,7 +2325,7 @@
         <a:lstStyle/>
         <a:p>
           <a:r>
-            <a:rPr lang="de-DE" sz="2800" dirty="0" err="1" smtClean="0">
+            <a:rPr lang="de-DE" sz="2800" dirty="0" err="1">
               <a:latin typeface="Open Sans" panose="020B0604020202020204" charset="0"/>
               <a:ea typeface="Open Sans" panose="020B0604020202020204" charset="0"/>
               <a:cs typeface="Open Sans" panose="020B0604020202020204" charset="0"/>
@@ -2428,7 +2365,7 @@
         <a:lstStyle/>
         <a:p>
           <a:r>
-            <a:rPr lang="de-DE" dirty="0" smtClean="0">
+            <a:rPr lang="de-DE" dirty="0">
               <a:ln>
                 <a:solidFill>
                   <a:schemeClr val="accent3">
@@ -2442,18 +2379,6 @@
             </a:rPr>
             <a:t>Excel</a:t>
           </a:r>
-          <a:endParaRPr lang="de-DE" dirty="0">
-            <a:ln>
-              <a:solidFill>
-                <a:schemeClr val="accent3">
-                  <a:lumMod val="50000"/>
-                </a:schemeClr>
-              </a:solidFill>
-            </a:ln>
-            <a:latin typeface="Open Sans" panose="020B0604020202020204" charset="0"/>
-            <a:ea typeface="Open Sans" panose="020B0604020202020204" charset="0"/>
-            <a:cs typeface="Open Sans" panose="020B0604020202020204" charset="0"/>
-          </a:endParaRPr>
         </a:p>
       </dgm:t>
     </dgm:pt>
@@ -2518,13 +2443,6 @@
         </dgm:presLayoutVars>
       </dgm:prSet>
       <dgm:spPr/>
-      <dgm:t>
-        <a:bodyPr/>
-        <a:lstStyle/>
-        <a:p>
-          <a:endParaRPr lang="de-DE"/>
-        </a:p>
-      </dgm:t>
     </dgm:pt>
     <dgm:pt modelId="{48CA4F48-486E-491F-AF10-2C90223AFA0D}" type="pres">
       <dgm:prSet presAssocID="{E55B6711-E1AC-448E-943E-ACEDE6D6093E}" presName="BalanceSpacing" presStyleCnt="0"/>
@@ -2555,13 +2473,6 @@
         </dgm:presLayoutVars>
       </dgm:prSet>
       <dgm:spPr/>
-      <dgm:t>
-        <a:bodyPr/>
-        <a:lstStyle/>
-        <a:p>
-          <a:endParaRPr lang="de-DE"/>
-        </a:p>
-      </dgm:t>
     </dgm:pt>
     <dgm:pt modelId="{E1F52AF1-8CDA-47DB-A6D8-BD0A813ED775}" type="pres">
       <dgm:prSet presAssocID="{99A1AF09-B0F8-4F9A-8085-BD076ABD6944}" presName="Childtext1" presStyleLbl="revTx" presStyleIdx="1" presStyleCnt="4">
@@ -2572,13 +2483,6 @@
         </dgm:presLayoutVars>
       </dgm:prSet>
       <dgm:spPr/>
-      <dgm:t>
-        <a:bodyPr/>
-        <a:lstStyle/>
-        <a:p>
-          <a:endParaRPr lang="de-DE"/>
-        </a:p>
-      </dgm:t>
     </dgm:pt>
     <dgm:pt modelId="{BCDD92D5-D68D-4987-8B5A-4BC4750F9313}" type="pres">
       <dgm:prSet presAssocID="{99A1AF09-B0F8-4F9A-8085-BD076ABD6944}" presName="BalanceSpacing" presStyleCnt="0"/>
@@ -2591,13 +2495,6 @@
     <dgm:pt modelId="{39CCCEF4-CF39-4393-8B16-EE47756F0380}" type="pres">
       <dgm:prSet presAssocID="{20FA04F2-BB65-42F2-B644-C9AD8E2F74BC}" presName="Accent1Text" presStyleLbl="node1" presStyleIdx="3" presStyleCnt="8" custLinFactNeighborY="0"/>
       <dgm:spPr/>
-      <dgm:t>
-        <a:bodyPr/>
-        <a:lstStyle/>
-        <a:p>
-          <a:endParaRPr lang="de-DE"/>
-        </a:p>
-      </dgm:t>
     </dgm:pt>
     <dgm:pt modelId="{6A41638B-E556-4986-ABBC-BBC8C5811EF4}" type="pres">
       <dgm:prSet presAssocID="{20FA04F2-BB65-42F2-B644-C9AD8E2F74BC}" presName="spaceBetweenRectangles" presStyleCnt="0"/>
@@ -2626,13 +2523,6 @@
         </dgm:presLayoutVars>
       </dgm:prSet>
       <dgm:spPr/>
-      <dgm:t>
-        <a:bodyPr/>
-        <a:lstStyle/>
-        <a:p>
-          <a:endParaRPr lang="de-DE"/>
-        </a:p>
-      </dgm:t>
     </dgm:pt>
     <dgm:pt modelId="{F63E2FBE-AD72-4FBB-A301-9086CB876C3A}" type="pres">
       <dgm:prSet presAssocID="{743970C8-5A58-4A68-B235-18ECA26D2227}" presName="BalanceSpacing" presStyleCnt="0"/>
@@ -2689,18 +2579,18 @@
   </dgm:ptLst>
   <dgm:cxnLst>
     <dgm:cxn modelId="{64CA5F0B-6C0B-4AE5-A634-16F8C8823739}" srcId="{AB59CB71-0E4F-4B58-954D-CAFE90A88E0E}" destId="{E55B6711-E1AC-448E-943E-ACEDE6D6093E}" srcOrd="0" destOrd="0" parTransId="{0247EDA3-CC41-4F5F-B024-11E00B6CC7DC}" sibTransId="{BB7D0D21-2CA1-428A-A44C-0B9802D97E06}"/>
-    <dgm:cxn modelId="{7F3734D7-F5FE-4DA1-AA5A-E92268F6A172}" type="presOf" srcId="{5B8EDA45-1E9D-468B-99E8-4E84B787DFAA}" destId="{C1A43178-AB67-46D4-B413-71BB70D7587C}" srcOrd="0" destOrd="0" presId="urn:microsoft.com/office/officeart/2008/layout/AlternatingHexagons"/>
-    <dgm:cxn modelId="{7DF3AE7B-C217-4F00-ADBE-2A376059EA0E}" type="presOf" srcId="{BB7D0D21-2CA1-428A-A44C-0B9802D97E06}" destId="{192CCC99-43DC-4F31-8797-06E70C1FD3C6}" srcOrd="0" destOrd="0" presId="urn:microsoft.com/office/officeart/2008/layout/AlternatingHexagons"/>
-    <dgm:cxn modelId="{2D01D539-EDC9-44DE-B69E-93C8505AC9CD}" srcId="{AB59CB71-0E4F-4B58-954D-CAFE90A88E0E}" destId="{99A1AF09-B0F8-4F9A-8085-BD076ABD6944}" srcOrd="1" destOrd="0" parTransId="{B9AF2EA0-F8E1-4E26-991F-743DFBE39B7C}" sibTransId="{20FA04F2-BB65-42F2-B644-C9AD8E2F74BC}"/>
-    <dgm:cxn modelId="{78B28487-5D99-44CB-B4B6-2281F6D72327}" srcId="{AB59CB71-0E4F-4B58-954D-CAFE90A88E0E}" destId="{743970C8-5A58-4A68-B235-18ECA26D2227}" srcOrd="2" destOrd="0" parTransId="{DD6D4D24-C3B8-4E73-9167-0DB5B72F8A72}" sibTransId="{5B8EDA45-1E9D-468B-99E8-4E84B787DFAA}"/>
-    <dgm:cxn modelId="{E85A11A4-1D09-40A2-AAAC-3003DC3C704E}" type="presOf" srcId="{5BAC699F-C5AC-4312-8521-163B45BBB642}" destId="{D4F3BF5A-EE77-4C02-A61C-80136158F426}" srcOrd="0" destOrd="0" presId="urn:microsoft.com/office/officeart/2008/layout/AlternatingHexagons"/>
-    <dgm:cxn modelId="{50573DDC-E86C-4F19-AF44-22C094D24F80}" srcId="{AB59CB71-0E4F-4B58-954D-CAFE90A88E0E}" destId="{C00DBF81-73C0-4F9D-A0FA-97472FAD85A0}" srcOrd="3" destOrd="0" parTransId="{994AF96B-12E9-4DF6-B906-BE70121F25AD}" sibTransId="{5BAC699F-C5AC-4312-8521-163B45BBB642}"/>
-    <dgm:cxn modelId="{54EE8592-E3C7-46C9-99F5-0290D45F4EC5}" type="presOf" srcId="{20FA04F2-BB65-42F2-B644-C9AD8E2F74BC}" destId="{39CCCEF4-CF39-4393-8B16-EE47756F0380}" srcOrd="0" destOrd="0" presId="urn:microsoft.com/office/officeart/2008/layout/AlternatingHexagons"/>
-    <dgm:cxn modelId="{AD286048-91E0-4F49-951E-7272125ED38F}" type="presOf" srcId="{AB59CB71-0E4F-4B58-954D-CAFE90A88E0E}" destId="{05E97131-A038-4CA4-9309-A8E0F4991A5F}" srcOrd="0" destOrd="0" presId="urn:microsoft.com/office/officeart/2008/layout/AlternatingHexagons"/>
     <dgm:cxn modelId="{71D3410B-CF9F-48DD-87DA-2C51C50B11EE}" type="presOf" srcId="{E55B6711-E1AC-448E-943E-ACEDE6D6093E}" destId="{A3BB2DBF-B237-440C-8552-B2BB05484322}" srcOrd="0" destOrd="0" presId="urn:microsoft.com/office/officeart/2008/layout/AlternatingHexagons"/>
     <dgm:cxn modelId="{31F30316-C916-42EC-9D20-A422F883E264}" type="presOf" srcId="{C00DBF81-73C0-4F9D-A0FA-97472FAD85A0}" destId="{E0BD3798-B758-4BB9-9760-3F26F3246A38}" srcOrd="0" destOrd="0" presId="urn:microsoft.com/office/officeart/2008/layout/AlternatingHexagons"/>
+    <dgm:cxn modelId="{2D01D539-EDC9-44DE-B69E-93C8505AC9CD}" srcId="{AB59CB71-0E4F-4B58-954D-CAFE90A88E0E}" destId="{99A1AF09-B0F8-4F9A-8085-BD076ABD6944}" srcOrd="1" destOrd="0" parTransId="{B9AF2EA0-F8E1-4E26-991F-743DFBE39B7C}" sibTransId="{20FA04F2-BB65-42F2-B644-C9AD8E2F74BC}"/>
+    <dgm:cxn modelId="{AD286048-91E0-4F49-951E-7272125ED38F}" type="presOf" srcId="{AB59CB71-0E4F-4B58-954D-CAFE90A88E0E}" destId="{05E97131-A038-4CA4-9309-A8E0F4991A5F}" srcOrd="0" destOrd="0" presId="urn:microsoft.com/office/officeart/2008/layout/AlternatingHexagons"/>
     <dgm:cxn modelId="{086FE16C-D8ED-4318-8F5A-F9B7C5E22EAD}" type="presOf" srcId="{743970C8-5A58-4A68-B235-18ECA26D2227}" destId="{3E59339A-1B4B-41D1-9E43-E6FFAF491AB8}" srcOrd="0" destOrd="0" presId="urn:microsoft.com/office/officeart/2008/layout/AlternatingHexagons"/>
+    <dgm:cxn modelId="{7DF3AE7B-C217-4F00-ADBE-2A376059EA0E}" type="presOf" srcId="{BB7D0D21-2CA1-428A-A44C-0B9802D97E06}" destId="{192CCC99-43DC-4F31-8797-06E70C1FD3C6}" srcOrd="0" destOrd="0" presId="urn:microsoft.com/office/officeart/2008/layout/AlternatingHexagons"/>
+    <dgm:cxn modelId="{78B28487-5D99-44CB-B4B6-2281F6D72327}" srcId="{AB59CB71-0E4F-4B58-954D-CAFE90A88E0E}" destId="{743970C8-5A58-4A68-B235-18ECA26D2227}" srcOrd="2" destOrd="0" parTransId="{DD6D4D24-C3B8-4E73-9167-0DB5B72F8A72}" sibTransId="{5B8EDA45-1E9D-468B-99E8-4E84B787DFAA}"/>
+    <dgm:cxn modelId="{54EE8592-E3C7-46C9-99F5-0290D45F4EC5}" type="presOf" srcId="{20FA04F2-BB65-42F2-B644-C9AD8E2F74BC}" destId="{39CCCEF4-CF39-4393-8B16-EE47756F0380}" srcOrd="0" destOrd="0" presId="urn:microsoft.com/office/officeart/2008/layout/AlternatingHexagons"/>
+    <dgm:cxn modelId="{E85A11A4-1D09-40A2-AAAC-3003DC3C704E}" type="presOf" srcId="{5BAC699F-C5AC-4312-8521-163B45BBB642}" destId="{D4F3BF5A-EE77-4C02-A61C-80136158F426}" srcOrd="0" destOrd="0" presId="urn:microsoft.com/office/officeart/2008/layout/AlternatingHexagons"/>
+    <dgm:cxn modelId="{7F3734D7-F5FE-4DA1-AA5A-E92268F6A172}" type="presOf" srcId="{5B8EDA45-1E9D-468B-99E8-4E84B787DFAA}" destId="{C1A43178-AB67-46D4-B413-71BB70D7587C}" srcOrd="0" destOrd="0" presId="urn:microsoft.com/office/officeart/2008/layout/AlternatingHexagons"/>
     <dgm:cxn modelId="{60D69BD9-5943-4B8D-9BB5-72683C40F274}" type="presOf" srcId="{99A1AF09-B0F8-4F9A-8085-BD076ABD6944}" destId="{BE200DAC-E1B3-4FCF-8A2B-FA702DCDEAA2}" srcOrd="0" destOrd="0" presId="urn:microsoft.com/office/officeart/2008/layout/AlternatingHexagons"/>
+    <dgm:cxn modelId="{50573DDC-E86C-4F19-AF44-22C094D24F80}" srcId="{AB59CB71-0E4F-4B58-954D-CAFE90A88E0E}" destId="{C00DBF81-73C0-4F9D-A0FA-97472FAD85A0}" srcOrd="3" destOrd="0" parTransId="{994AF96B-12E9-4DF6-B906-BE70121F25AD}" sibTransId="{5BAC699F-C5AC-4312-8521-163B45BBB642}"/>
     <dgm:cxn modelId="{E974FE7E-356E-4CF4-873A-5DA4EE94C5AF}" type="presParOf" srcId="{05E97131-A038-4CA4-9309-A8E0F4991A5F}" destId="{9DF5971F-4B61-4E8B-9617-57BB3E34BB06}" srcOrd="0" destOrd="0" presId="urn:microsoft.com/office/officeart/2008/layout/AlternatingHexagons"/>
     <dgm:cxn modelId="{711E294E-4E7B-46D1-BF4E-E741796CCB5D}" type="presParOf" srcId="{9DF5971F-4B61-4E8B-9617-57BB3E34BB06}" destId="{A3BB2DBF-B237-440C-8552-B2BB05484322}" srcOrd="0" destOrd="0" presId="urn:microsoft.com/office/officeart/2008/layout/AlternatingHexagons"/>
     <dgm:cxn modelId="{A9EBF2C8-9C8B-40DF-96DE-FA5C5B257AE3}" type="presParOf" srcId="{9DF5971F-4B61-4E8B-9617-57BB3E34BB06}" destId="{9B23C57B-7955-4774-AFF6-D52EE3CAB2E8}" srcOrd="1" destOrd="0" presId="urn:microsoft.com/office/officeart/2008/layout/AlternatingHexagons"/>
@@ -2802,7 +2692,7 @@
         </a:bodyPr>
         <a:lstStyle/>
         <a:p>
-          <a:pPr lvl="0" algn="ctr" defTabSz="933450">
+          <a:pPr marL="0" lvl="0" indent="0" algn="ctr" defTabSz="933450">
             <a:lnSpc>
               <a:spcPct val="90000"/>
             </a:lnSpc>
@@ -2812,20 +2702,16 @@
             <a:spcAft>
               <a:spcPct val="35000"/>
             </a:spcAft>
+            <a:buNone/>
           </a:pPr>
           <a:r>
-            <a:rPr lang="de-DE" sz="2100" kern="1200" dirty="0" smtClean="0">
+            <a:rPr lang="de-DE" sz="2100" kern="1200" dirty="0">
               <a:latin typeface="Open Sans" panose="020B0604020202020204" charset="0"/>
               <a:ea typeface="Open Sans" panose="020B0604020202020204" charset="0"/>
               <a:cs typeface="Open Sans" panose="020B0604020202020204" charset="0"/>
             </a:rPr>
             <a:t>Verbindung GMK und Mathe</a:t>
           </a:r>
-          <a:endParaRPr lang="de-DE" sz="2100" kern="1200" dirty="0">
-            <a:latin typeface="Open Sans" panose="020B0604020202020204" charset="0"/>
-            <a:ea typeface="Open Sans" panose="020B0604020202020204" charset="0"/>
-            <a:cs typeface="Open Sans" panose="020B0604020202020204" charset="0"/>
-          </a:endParaRPr>
         </a:p>
       </dsp:txBody>
       <dsp:txXfrm>
@@ -2935,7 +2821,7 @@
         </a:bodyPr>
         <a:lstStyle/>
         <a:p>
-          <a:pPr lvl="0" algn="ctr" defTabSz="755650" rtl="0">
+          <a:pPr marL="0" lvl="0" indent="0" algn="ctr" defTabSz="755650" rtl="0">
             <a:lnSpc>
               <a:spcPct val="90000"/>
             </a:lnSpc>
@@ -2945,20 +2831,16 @@
             <a:spcAft>
               <a:spcPct val="35000"/>
             </a:spcAft>
+            <a:buNone/>
           </a:pPr>
           <a:r>
-            <a:rPr lang="de-DE" sz="1700" kern="1200" dirty="0" smtClean="0">
+            <a:rPr lang="de-DE" sz="1700" kern="1200" dirty="0">
               <a:latin typeface="Open Sans" panose="020B0604020202020204" charset="0"/>
               <a:ea typeface="Open Sans" panose="020B0604020202020204" charset="0"/>
               <a:cs typeface="Open Sans" panose="020B0604020202020204" charset="0"/>
             </a:rPr>
             <a:t>(Wie) Beeinflusst die Vorgabe mathematischer Modelle unseren Alltag?</a:t>
           </a:r>
-          <a:endParaRPr lang="de-DE" sz="1700" kern="1200" dirty="0">
-            <a:latin typeface="Open Sans" panose="020B0604020202020204" charset="0"/>
-            <a:ea typeface="Open Sans" panose="020B0604020202020204" charset="0"/>
-            <a:cs typeface="Open Sans" panose="020B0604020202020204" charset="0"/>
-          </a:endParaRPr>
         </a:p>
       </dsp:txBody>
       <dsp:txXfrm>
@@ -3068,7 +2950,7 @@
         </a:bodyPr>
         <a:lstStyle/>
         <a:p>
-          <a:pPr lvl="0" algn="ctr" defTabSz="755650" rtl="0">
+          <a:pPr marL="0" lvl="0" indent="0" algn="ctr" defTabSz="755650" rtl="0">
             <a:lnSpc>
               <a:spcPct val="90000"/>
             </a:lnSpc>
@@ -3078,20 +2960,16 @@
             <a:spcAft>
               <a:spcPct val="35000"/>
             </a:spcAft>
+            <a:buNone/>
           </a:pPr>
           <a:r>
-            <a:rPr lang="de-DE" sz="1700" kern="1200" dirty="0" smtClean="0">
+            <a:rPr lang="de-DE" sz="1700" kern="1200" dirty="0">
               <a:latin typeface="Open Sans" panose="020B0604020202020204" charset="0"/>
               <a:ea typeface="Open Sans" panose="020B0604020202020204" charset="0"/>
               <a:cs typeface="Open Sans" panose="020B0604020202020204" charset="0"/>
             </a:rPr>
             <a:t>Sind mathematisch korrekte Modelle unantastbar?</a:t>
           </a:r>
-          <a:endParaRPr lang="de-DE" sz="1700" kern="1200" dirty="0">
-            <a:latin typeface="Open Sans" panose="020B0604020202020204" charset="0"/>
-            <a:ea typeface="Open Sans" panose="020B0604020202020204" charset="0"/>
-            <a:cs typeface="Open Sans" panose="020B0604020202020204" charset="0"/>
-          </a:endParaRPr>
         </a:p>
       </dsp:txBody>
       <dsp:txXfrm>
@@ -3201,7 +3079,7 @@
         </a:bodyPr>
         <a:lstStyle/>
         <a:p>
-          <a:pPr lvl="0" algn="ctr" defTabSz="755650" rtl="0">
+          <a:pPr marL="0" lvl="0" indent="0" algn="ctr" defTabSz="755650" rtl="0">
             <a:lnSpc>
               <a:spcPct val="90000"/>
             </a:lnSpc>
@@ -3211,9 +3089,10 @@
             <a:spcAft>
               <a:spcPct val="35000"/>
             </a:spcAft>
+            <a:buNone/>
           </a:pPr>
           <a:r>
-            <a:rPr lang="de-DE" sz="1700" kern="1200" dirty="0" smtClean="0">
+            <a:rPr lang="de-DE" sz="1700" kern="1200" dirty="0">
               <a:latin typeface="Open Sans" panose="020B0604020202020204" charset="0"/>
               <a:ea typeface="Open Sans" panose="020B0604020202020204" charset="0"/>
               <a:cs typeface="Open Sans" panose="020B0604020202020204" charset="0"/>
@@ -3221,25 +3100,20 @@
             <a:t>Wie funktioniert eigentlich unser Wahlsystem? </a:t>
           </a:r>
           <a:br>
-            <a:rPr lang="de-DE" sz="1700" kern="1200" dirty="0" smtClean="0">
+            <a:rPr lang="de-DE" sz="1700" kern="1200" dirty="0">
               <a:latin typeface="Open Sans" panose="020B0604020202020204" charset="0"/>
               <a:ea typeface="Open Sans" panose="020B0604020202020204" charset="0"/>
               <a:cs typeface="Open Sans" panose="020B0604020202020204" charset="0"/>
             </a:rPr>
           </a:br>
           <a:r>
-            <a:rPr lang="de-DE" sz="1700" kern="1200" dirty="0" smtClean="0">
+            <a:rPr lang="de-DE" sz="1700" kern="1200" dirty="0">
               <a:latin typeface="Open Sans" panose="020B0604020202020204" charset="0"/>
               <a:ea typeface="Open Sans" panose="020B0604020202020204" charset="0"/>
               <a:cs typeface="Open Sans" panose="020B0604020202020204" charset="0"/>
             </a:rPr>
             <a:t>Ist unser Wahlsystem (wirklich) so demokratisch?</a:t>
           </a:r>
-          <a:endParaRPr lang="de-DE" sz="1700" kern="1200" dirty="0">
-            <a:latin typeface="Open Sans" panose="020B0604020202020204" charset="0"/>
-            <a:ea typeface="Open Sans" panose="020B0604020202020204" charset="0"/>
-            <a:cs typeface="Open Sans" panose="020B0604020202020204" charset="0"/>
-          </a:endParaRPr>
         </a:p>
       </dsp:txBody>
       <dsp:txXfrm>
@@ -3316,7 +3190,7 @@
         </a:bodyPr>
         <a:lstStyle/>
         <a:p>
-          <a:pPr lvl="0" algn="ctr" defTabSz="889000">
+          <a:pPr marL="0" lvl="0" indent="0" algn="ctr" defTabSz="889000">
             <a:lnSpc>
               <a:spcPct val="90000"/>
             </a:lnSpc>
@@ -3326,20 +3200,16 @@
             <a:spcAft>
               <a:spcPct val="35000"/>
             </a:spcAft>
+            <a:buNone/>
           </a:pPr>
           <a:r>
-            <a:rPr lang="de-DE" sz="2000" kern="1200" dirty="0" smtClean="0">
+            <a:rPr lang="de-DE" sz="2000" kern="1200" dirty="0">
               <a:latin typeface="Open Sans" panose="020B0604020202020204" charset="0"/>
               <a:ea typeface="Open Sans" panose="020B0604020202020204" charset="0"/>
               <a:cs typeface="Open Sans" panose="020B0604020202020204" charset="0"/>
             </a:rPr>
             <a:t>Notion</a:t>
           </a:r>
-          <a:endParaRPr lang="de-DE" sz="2000" kern="1200" dirty="0">
-            <a:latin typeface="Open Sans" panose="020B0604020202020204" charset="0"/>
-            <a:ea typeface="Open Sans" panose="020B0604020202020204" charset="0"/>
-            <a:cs typeface="Open Sans" panose="020B0604020202020204" charset="0"/>
-          </a:endParaRPr>
         </a:p>
       </dsp:txBody>
       <dsp:txXfrm rot="-5400000">
@@ -3436,7 +3306,7 @@
         </a:bodyPr>
         <a:lstStyle/>
         <a:p>
-          <a:pPr lvl="0" algn="ctr" defTabSz="1333500">
+          <a:pPr marL="0" lvl="0" indent="0" algn="ctr" defTabSz="1333500">
             <a:lnSpc>
               <a:spcPct val="90000"/>
             </a:lnSpc>
@@ -3446,20 +3316,16 @@
             <a:spcAft>
               <a:spcPct val="35000"/>
             </a:spcAft>
+            <a:buNone/>
           </a:pPr>
           <a:r>
-            <a:rPr lang="de-DE" sz="3000" kern="1200" dirty="0" smtClean="0">
+            <a:rPr lang="de-DE" sz="3000" kern="1200" dirty="0">
               <a:latin typeface="Open Sans" panose="020B0604020202020204" charset="0"/>
               <a:ea typeface="Open Sans" panose="020B0604020202020204" charset="0"/>
               <a:cs typeface="Open Sans" panose="020B0604020202020204" charset="0"/>
             </a:rPr>
             <a:t>PPT</a:t>
           </a:r>
-          <a:endParaRPr lang="de-DE" sz="3000" kern="1200" dirty="0">
-            <a:latin typeface="Open Sans" panose="020B0604020202020204" charset="0"/>
-            <a:ea typeface="Open Sans" panose="020B0604020202020204" charset="0"/>
-            <a:cs typeface="Open Sans" panose="020B0604020202020204" charset="0"/>
-          </a:endParaRPr>
         </a:p>
       </dsp:txBody>
       <dsp:txXfrm rot="-5400000">
@@ -3524,7 +3390,7 @@
         </a:bodyPr>
         <a:lstStyle/>
         <a:p>
-          <a:pPr lvl="0" algn="ctr" defTabSz="1333500">
+          <a:pPr marL="0" lvl="0" indent="0" algn="ctr" defTabSz="1333500">
             <a:lnSpc>
               <a:spcPct val="90000"/>
             </a:lnSpc>
@@ -3534,20 +3400,16 @@
             <a:spcAft>
               <a:spcPct val="35000"/>
             </a:spcAft>
+            <a:buNone/>
           </a:pPr>
           <a:r>
-            <a:rPr lang="de-DE" sz="3000" kern="1200" dirty="0" smtClean="0">
+            <a:rPr lang="de-DE" sz="3000" kern="1200" dirty="0">
               <a:latin typeface="Open Sans" panose="020B0604020202020204" charset="0"/>
               <a:ea typeface="Open Sans" panose="020B0604020202020204" charset="0"/>
               <a:cs typeface="Open Sans" panose="020B0604020202020204" charset="0"/>
             </a:rPr>
             <a:t>H5P</a:t>
           </a:r>
-          <a:endParaRPr lang="de-DE" sz="3000" kern="1200" dirty="0">
-            <a:latin typeface="Open Sans" panose="020B0604020202020204" charset="0"/>
-            <a:ea typeface="Open Sans" panose="020B0604020202020204" charset="0"/>
-            <a:cs typeface="Open Sans" panose="020B0604020202020204" charset="0"/>
-          </a:endParaRPr>
         </a:p>
       </dsp:txBody>
       <dsp:txXfrm rot="-5400000">
@@ -3644,7 +3506,7 @@
         </a:bodyPr>
         <a:lstStyle/>
         <a:p>
-          <a:pPr lvl="0" algn="ctr" defTabSz="1244600">
+          <a:pPr marL="0" lvl="0" indent="0" algn="ctr" defTabSz="1244600">
             <a:lnSpc>
               <a:spcPct val="90000"/>
             </a:lnSpc>
@@ -3654,9 +3516,10 @@
             <a:spcAft>
               <a:spcPct val="35000"/>
             </a:spcAft>
+            <a:buNone/>
           </a:pPr>
           <a:r>
-            <a:rPr lang="de-DE" sz="2800" kern="1200" dirty="0" err="1" smtClean="0">
+            <a:rPr lang="de-DE" sz="2800" kern="1200" dirty="0" err="1">
               <a:latin typeface="Open Sans" panose="020B0604020202020204" charset="0"/>
               <a:ea typeface="Open Sans" panose="020B0604020202020204" charset="0"/>
               <a:cs typeface="Open Sans" panose="020B0604020202020204" charset="0"/>
@@ -3732,7 +3595,7 @@
         </a:bodyPr>
         <a:lstStyle/>
         <a:p>
-          <a:pPr lvl="0" algn="ctr" defTabSz="889000">
+          <a:pPr marL="0" lvl="0" indent="0" algn="ctr" defTabSz="889000">
             <a:lnSpc>
               <a:spcPct val="90000"/>
             </a:lnSpc>
@@ -3742,9 +3605,10 @@
             <a:spcAft>
               <a:spcPct val="35000"/>
             </a:spcAft>
+            <a:buNone/>
           </a:pPr>
           <a:r>
-            <a:rPr lang="de-DE" sz="2000" kern="1200" dirty="0" err="1" smtClean="0">
+            <a:rPr lang="de-DE" sz="2000" kern="1200" dirty="0" err="1">
               <a:latin typeface="Open Sans" panose="020B0604020202020204" charset="0"/>
               <a:ea typeface="Open Sans" panose="020B0604020202020204" charset="0"/>
               <a:cs typeface="Open Sans" panose="020B0604020202020204" charset="0"/>
@@ -3752,7 +3616,7 @@
             <a:t>Geo</a:t>
           </a:r>
           <a:r>
-            <a:rPr lang="de-DE" sz="2000" kern="1200" dirty="0" smtClean="0">
+            <a:rPr lang="de-DE" sz="2000" kern="1200" dirty="0">
               <a:latin typeface="Open Sans" panose="020B0604020202020204" charset="0"/>
               <a:ea typeface="Open Sans" panose="020B0604020202020204" charset="0"/>
               <a:cs typeface="Open Sans" panose="020B0604020202020204" charset="0"/>
@@ -3760,7 +3624,7 @@
             <a:t> </a:t>
           </a:r>
           <a:r>
-            <a:rPr lang="de-DE" sz="2000" kern="1200" dirty="0" err="1" smtClean="0">
+            <a:rPr lang="de-DE" sz="2000" kern="1200" dirty="0" err="1">
               <a:latin typeface="Open Sans" panose="020B0604020202020204" charset="0"/>
               <a:ea typeface="Open Sans" panose="020B0604020202020204" charset="0"/>
               <a:cs typeface="Open Sans" panose="020B0604020202020204" charset="0"/>
@@ -3865,7 +3729,7 @@
         </a:bodyPr>
         <a:lstStyle/>
         <a:p>
-          <a:pPr lvl="0" algn="ctr" defTabSz="1200150">
+          <a:pPr marL="0" lvl="0" indent="0" algn="ctr" defTabSz="1200150">
             <a:lnSpc>
               <a:spcPct val="90000"/>
             </a:lnSpc>
@@ -3875,9 +3739,10 @@
             <a:spcAft>
               <a:spcPct val="35000"/>
             </a:spcAft>
+            <a:buNone/>
           </a:pPr>
           <a:r>
-            <a:rPr lang="de-DE" sz="2700" kern="1200" dirty="0" err="1" smtClean="0">
+            <a:rPr lang="de-DE" sz="2700" kern="1200" dirty="0" err="1">
               <a:ln>
                 <a:solidFill>
                   <a:schemeClr val="accent3">
@@ -3964,7 +3829,7 @@
         </a:bodyPr>
         <a:lstStyle/>
         <a:p>
-          <a:pPr lvl="0" algn="ctr" defTabSz="1155700">
+          <a:pPr marL="0" lvl="0" indent="0" algn="ctr" defTabSz="1155700">
             <a:lnSpc>
               <a:spcPct val="90000"/>
             </a:lnSpc>
@@ -3974,9 +3839,10 @@
             <a:spcAft>
               <a:spcPct val="35000"/>
             </a:spcAft>
+            <a:buNone/>
           </a:pPr>
           <a:r>
-            <a:rPr lang="de-DE" sz="2600" kern="1200" dirty="0" smtClean="0">
+            <a:rPr lang="de-DE" sz="2600" kern="1200" dirty="0">
               <a:ln>
                 <a:solidFill>
                   <a:schemeClr val="accent3">
@@ -3990,18 +3856,6 @@
             </a:rPr>
             <a:t>Excel</a:t>
           </a:r>
-          <a:endParaRPr lang="de-DE" sz="2600" kern="1200" dirty="0">
-            <a:ln>
-              <a:solidFill>
-                <a:schemeClr val="accent3">
-                  <a:lumMod val="50000"/>
-                </a:schemeClr>
-              </a:solidFill>
-            </a:ln>
-            <a:latin typeface="Open Sans" panose="020B0604020202020204" charset="0"/>
-            <a:ea typeface="Open Sans" panose="020B0604020202020204" charset="0"/>
-            <a:cs typeface="Open Sans" panose="020B0604020202020204" charset="0"/>
-          </a:endParaRPr>
         </a:p>
       </dsp:txBody>
       <dsp:txXfrm rot="-5400000">
@@ -4084,7 +3938,7 @@
         </a:bodyPr>
         <a:lstStyle/>
         <a:p>
-          <a:pPr lvl="0" algn="ctr" defTabSz="1600200">
+          <a:pPr marL="0" lvl="0" indent="0" algn="ctr" defTabSz="1600200">
             <a:lnSpc>
               <a:spcPct val="90000"/>
             </a:lnSpc>
@@ -4094,6 +3948,7 @@
             <a:spcAft>
               <a:spcPct val="35000"/>
             </a:spcAft>
+            <a:buNone/>
           </a:pPr>
           <a:endParaRPr lang="de-DE" sz="3600" kern="1200"/>
         </a:p>
@@ -7457,11 +7312,7 @@
             </a:pPr>
             <a:r>
               <a:rPr lang="de" dirty="0"/>
-              <a:t>Modellierung: Überführung Rechnung auf Sitzplätze, was bedeutet das, ist das </a:t>
-            </a:r>
-            <a:r>
-              <a:rPr lang="de" dirty="0" smtClean="0"/>
-              <a:t>gut? (Diskussionspart)</a:t>
+              <a:t>Modellierung: Überführung Rechnung auf Sitzplätze, was bedeutet das, ist das gut? (Diskussionspart)</a:t>
             </a:r>
           </a:p>
           <a:p>
@@ -7475,7 +7326,7 @@
               <a:buNone/>
             </a:pPr>
             <a:r>
-              <a:rPr lang="de" dirty="0" smtClean="0"/>
+              <a:rPr lang="de" dirty="0"/>
               <a:t>Prüfen: Disskussionspart</a:t>
             </a:r>
           </a:p>
@@ -7490,14 +7341,14 @@
               <a:buNone/>
             </a:pPr>
             <a:r>
-              <a:rPr lang="de" dirty="0" smtClean="0"/>
+              <a:rPr lang="de" dirty="0"/>
               <a:t>GMK:</a:t>
             </a:r>
             <a:r>
-              <a:rPr lang="de" baseline="0" dirty="0" smtClean="0"/>
+              <a:rPr lang="de" baseline="0" dirty="0"/>
               <a:t> Wissen Verfahren, Paradoxon, Diskussion</a:t>
             </a:r>
-            <a:endParaRPr lang="de" dirty="0" smtClean="0"/>
+            <a:endParaRPr lang="de" dirty="0"/>
           </a:p>
           <a:p>
             <a:pPr marL="0" lvl="0" indent="0" algn="l" rtl="0">
@@ -7510,7 +7361,7 @@
               <a:buNone/>
             </a:pPr>
             <a:r>
-              <a:rPr lang="de" dirty="0" smtClean="0"/>
+              <a:rPr lang="de" dirty="0"/>
               <a:t>Demokratiebildung: Mündige Bürger, Allgemeinbildung, Herabsetzung des Wahlalters</a:t>
             </a:r>
             <a:endParaRPr dirty="0"/>
@@ -7788,19 +7639,19 @@
               <a:buNone/>
             </a:pPr>
             <a:r>
-              <a:rPr lang="de-DE" dirty="0" smtClean="0"/>
+              <a:rPr lang="de-DE" dirty="0"/>
               <a:t>Rechenvorschrift: </a:t>
             </a:r>
             <a:r>
-              <a:rPr lang="de-DE" dirty="0" err="1" smtClean="0"/>
+              <a:rPr lang="de-DE" dirty="0" err="1"/>
               <a:t>Divisorverfahren</a:t>
             </a:r>
             <a:r>
-              <a:rPr lang="de-DE" dirty="0" smtClean="0"/>
+              <a:rPr lang="de-DE" dirty="0"/>
               <a:t> -&gt; Divisor</a:t>
             </a:r>
             <a:r>
-              <a:rPr lang="de-DE" baseline="0" dirty="0" smtClean="0"/>
+              <a:rPr lang="de-DE" baseline="0" dirty="0"/>
               <a:t> Bestimmung sehr komplex, kein festes Schema</a:t>
             </a:r>
           </a:p>
@@ -7815,7 +7666,7 @@
               <a:buNone/>
             </a:pPr>
             <a:r>
-              <a:rPr lang="de-DE" baseline="0" dirty="0" smtClean="0"/>
+              <a:rPr lang="de-DE" baseline="0" dirty="0"/>
               <a:t>Höchstzahlenverfahren: festes Schema, einfache Berechnung</a:t>
             </a:r>
           </a:p>
@@ -8255,11 +8106,11 @@
               <a:buNone/>
             </a:pPr>
             <a:r>
-              <a:rPr lang="de-DE" dirty="0" smtClean="0"/>
+              <a:rPr lang="de-DE" dirty="0"/>
               <a:t>Beide</a:t>
             </a:r>
             <a:r>
-              <a:rPr lang="de-DE" baseline="0" dirty="0" smtClean="0"/>
+              <a:rPr lang="de-DE" baseline="0" dirty="0"/>
               <a:t> Herausforderungen gelöst:</a:t>
             </a:r>
           </a:p>
@@ -8275,11 +8126,11 @@
               <a:buChar char="-"/>
             </a:pPr>
             <a:r>
-              <a:rPr lang="de-DE" baseline="0" dirty="0" err="1" smtClean="0"/>
+              <a:rPr lang="de-DE" baseline="0" dirty="0" err="1"/>
               <a:t>Canva</a:t>
             </a:r>
             <a:r>
-              <a:rPr lang="de-DE" baseline="0" dirty="0" smtClean="0"/>
+              <a:rPr lang="de-DE" baseline="0" dirty="0"/>
               <a:t> für SuS merkbar</a:t>
             </a:r>
           </a:p>
@@ -8295,7 +8146,7 @@
               <a:buChar char="-"/>
             </a:pPr>
             <a:r>
-              <a:rPr lang="de-DE" baseline="0" dirty="0" smtClean="0"/>
+              <a:rPr lang="de-DE" baseline="0" dirty="0"/>
               <a:t>Zeitplan nicht merkbar für SuS</a:t>
             </a:r>
             <a:endParaRPr dirty="0"/>
@@ -8408,19 +8259,19 @@
               <a:buNone/>
             </a:pPr>
             <a:r>
-              <a:rPr lang="de-DE" dirty="0" err="1" smtClean="0"/>
+              <a:rPr lang="de-DE" dirty="0" err="1"/>
               <a:t>Menti</a:t>
             </a:r>
             <a:r>
-              <a:rPr lang="de-DE" dirty="0" smtClean="0"/>
+              <a:rPr lang="de-DE" dirty="0"/>
               <a:t>: keine Verknüpfung in Notion, an notwendigen</a:t>
             </a:r>
             <a:r>
-              <a:rPr lang="de-DE" baseline="0" dirty="0" smtClean="0"/>
+              <a:rPr lang="de-DE" baseline="0" dirty="0"/>
               <a:t> Stellen Bilder</a:t>
             </a:r>
             <a:r>
-              <a:rPr lang="de-DE" dirty="0" smtClean="0"/>
+              <a:rPr lang="de-DE" dirty="0"/>
               <a:t>, Umfragen per Handzeichen</a:t>
             </a:r>
           </a:p>
@@ -8435,15 +8286,15 @@
               <a:buNone/>
             </a:pPr>
             <a:r>
-              <a:rPr lang="de-DE" dirty="0" err="1" smtClean="0"/>
+              <a:rPr lang="de-DE" dirty="0" err="1"/>
               <a:t>Canva</a:t>
             </a:r>
             <a:r>
-              <a:rPr lang="de-DE" dirty="0" smtClean="0"/>
+              <a:rPr lang="de-DE" dirty="0"/>
               <a:t>: Sammeln</a:t>
             </a:r>
             <a:r>
-              <a:rPr lang="de-DE" baseline="0" dirty="0" smtClean="0"/>
+              <a:rPr lang="de-DE" baseline="0" dirty="0"/>
               <a:t> Ergebnisse an Tafel, permanent sichtbar, Link aus Notion entfernt</a:t>
             </a:r>
           </a:p>
@@ -8458,11 +8309,11 @@
               <a:buNone/>
             </a:pPr>
             <a:r>
-              <a:rPr lang="de-DE" baseline="0" dirty="0" err="1" smtClean="0"/>
+              <a:rPr lang="de-DE" baseline="0" dirty="0" err="1"/>
               <a:t>Canva</a:t>
             </a:r>
             <a:r>
-              <a:rPr lang="de-DE" baseline="0" dirty="0" smtClean="0"/>
+              <a:rPr lang="de-DE" baseline="0" dirty="0"/>
               <a:t> ohnehin weg</a:t>
             </a:r>
             <a:endParaRPr dirty="0"/>
@@ -8570,15 +8421,15 @@
               <a:buNone/>
             </a:pPr>
             <a:r>
-              <a:rPr lang="de-DE" dirty="0" smtClean="0"/>
+              <a:rPr lang="de-DE" dirty="0"/>
               <a:t>vorerst</a:t>
             </a:r>
             <a:r>
-              <a:rPr lang="de-DE" baseline="0" dirty="0" smtClean="0"/>
+              <a:rPr lang="de-DE" baseline="0" dirty="0"/>
               <a:t> </a:t>
             </a:r>
             <a:r>
-              <a:rPr lang="de-DE" dirty="0" smtClean="0"/>
+              <a:rPr lang="de-DE" dirty="0"/>
               <a:t>keine Zeitanpassung erforderlich</a:t>
             </a:r>
             <a:endParaRPr dirty="0"/>
@@ -9117,14 +8968,14 @@
               <a:buNone/>
             </a:pPr>
             <a:r>
-              <a:rPr lang="de-DE" dirty="0" smtClean="0"/>
+              <a:rPr lang="de-DE" dirty="0"/>
               <a:t>Probleme</a:t>
             </a:r>
             <a:r>
-              <a:rPr lang="de-DE" baseline="0" dirty="0" smtClean="0"/>
+              <a:rPr lang="de-DE" baseline="0" dirty="0"/>
               <a:t> bei Prozentrechnung ca. 50%</a:t>
             </a:r>
-            <a:endParaRPr lang="de-DE" dirty="0" smtClean="0"/>
+            <a:endParaRPr lang="de-DE" dirty="0"/>
           </a:p>
           <a:p>
             <a:pPr marL="0" lvl="0" indent="0" algn="l" rtl="0">
@@ -9137,7 +8988,7 @@
               <a:buNone/>
             </a:pPr>
             <a:r>
-              <a:rPr lang="de-DE" dirty="0" smtClean="0"/>
+              <a:rPr lang="de-DE" dirty="0"/>
               <a:t>Freies Feedback positiv</a:t>
             </a:r>
             <a:endParaRPr dirty="0"/>
@@ -9250,15 +9101,15 @@
               <a:buNone/>
             </a:pPr>
             <a:r>
-              <a:rPr lang="de-DE" dirty="0" smtClean="0"/>
+              <a:rPr lang="de-DE" dirty="0"/>
               <a:t>-</a:t>
             </a:r>
             <a:r>
-              <a:rPr lang="de-DE" baseline="0" dirty="0" smtClean="0"/>
+              <a:rPr lang="de-DE" baseline="0" dirty="0"/>
               <a:t>   </a:t>
             </a:r>
             <a:r>
-              <a:rPr lang="de-DE" dirty="0" smtClean="0"/>
+              <a:rPr lang="de-DE" dirty="0"/>
               <a:t>Wechsel Medien: Eine Person präsentiert, die andere für Wechsel zuständig</a:t>
             </a:r>
           </a:p>
@@ -9274,11 +9125,11 @@
               <a:buChar char="-"/>
             </a:pPr>
             <a:r>
-              <a:rPr lang="de-DE" dirty="0" smtClean="0"/>
+              <a:rPr lang="de-DE" dirty="0"/>
               <a:t>Erkennen,</a:t>
             </a:r>
             <a:r>
-              <a:rPr lang="de-DE" baseline="0" dirty="0" smtClean="0"/>
+              <a:rPr lang="de-DE" baseline="0" dirty="0"/>
               <a:t> dass man den Pfeil ausklappen kann, …</a:t>
             </a:r>
           </a:p>
@@ -9294,19 +9145,19 @@
               <a:buChar char="-"/>
             </a:pPr>
             <a:r>
-              <a:rPr lang="de-DE" dirty="0" smtClean="0"/>
+              <a:rPr lang="de-DE" dirty="0"/>
               <a:t>Element reagiert</a:t>
             </a:r>
             <a:r>
-              <a:rPr lang="de-DE" baseline="0" dirty="0" smtClean="0"/>
+              <a:rPr lang="de-DE" baseline="0" dirty="0"/>
               <a:t> nicht, Seite lädt nicht, </a:t>
             </a:r>
             <a:r>
-              <a:rPr lang="de-DE" baseline="0" dirty="0" err="1" smtClean="0"/>
+              <a:rPr lang="de-DE" baseline="0" dirty="0" err="1"/>
               <a:t>Canva</a:t>
             </a:r>
             <a:r>
-              <a:rPr lang="de-DE" baseline="0" dirty="0" smtClean="0"/>
+              <a:rPr lang="de-DE" baseline="0" dirty="0"/>
               <a:t> will nicht,…</a:t>
             </a:r>
           </a:p>
@@ -9322,7 +9173,7 @@
               <a:buChar char="-"/>
             </a:pPr>
             <a:r>
-              <a:rPr lang="de-DE" baseline="0" dirty="0" smtClean="0"/>
+              <a:rPr lang="de-DE" baseline="0" dirty="0"/>
               <a:t>Anpassung des Unterrichts an Störung</a:t>
             </a:r>
           </a:p>
@@ -9338,7 +9189,7 @@
               <a:buChar char="-"/>
             </a:pPr>
             <a:r>
-              <a:rPr lang="de-DE" baseline="0" dirty="0" smtClean="0"/>
+              <a:rPr lang="de-DE" baseline="0" dirty="0"/>
               <a:t>Materialien und Aufschriebe sind fest und können nicht im Unterricht bearbeitet werden</a:t>
             </a:r>
             <a:endParaRPr dirty="0"/>
@@ -9966,7 +9817,7 @@
               <a:buNone/>
             </a:pPr>
             <a:r>
-              <a:rPr lang="de-DE" dirty="0" smtClean="0"/>
+              <a:rPr lang="de-DE" dirty="0"/>
               <a:t>Ausprobieren</a:t>
             </a:r>
             <a:endParaRPr dirty="0"/>
@@ -10183,11 +10034,11 @@
               <a:buNone/>
             </a:pPr>
             <a:r>
-              <a:rPr lang="de-DE" dirty="0" smtClean="0"/>
+              <a:rPr lang="de-DE" dirty="0"/>
               <a:t>Diskussionsthema in allen Demokratien</a:t>
             </a:r>
             <a:r>
-              <a:rPr lang="de-DE" baseline="0" dirty="0" smtClean="0"/>
+              <a:rPr lang="de-DE" baseline="0" dirty="0"/>
               <a:t> -&gt; hohe Relevanz, auch aktuell in Deutschland</a:t>
             </a:r>
           </a:p>
@@ -10202,7 +10053,7 @@
               <a:buNone/>
             </a:pPr>
             <a:r>
-              <a:rPr lang="de-DE" baseline="0" dirty="0" smtClean="0"/>
+              <a:rPr lang="de-DE" baseline="0" dirty="0"/>
               <a:t>Mathematisches Problem: Rationale Zahlen auf Ganze Zahl abbilden</a:t>
             </a:r>
             <a:endParaRPr dirty="0"/>
@@ -10852,13 +10703,6 @@
   <p:clrMapOvr>
     <a:masterClrMapping/>
   </p:clrMapOvr>
-  <p:timing>
-    <p:tnLst>
-      <p:par>
-        <p:cTn id="1" dur="indefinite" restart="never" nodeType="tmRoot"/>
-      </p:par>
-    </p:tnLst>
-  </p:timing>
 </p:sldLayout>
 </file>
 
@@ -15492,10 +15336,10 @@
               <a:buNone/>
             </a:pPr>
             <a:r>
-              <a:rPr lang="de"/>
+              <a:rPr lang="de" dirty="0"/>
               <a:t>Mathematik hinter Wahlen</a:t>
             </a:r>
-            <a:endParaRPr/>
+            <a:endParaRPr dirty="0"/>
           </a:p>
         </p:txBody>
       </p:sp>
@@ -15662,13 +15506,6 @@
   <p:clrMapOvr>
     <a:masterClrMapping/>
   </p:clrMapOvr>
-  <p:timing>
-    <p:tnLst>
-      <p:par>
-        <p:cTn id="1" dur="indefinite" restart="never" nodeType="tmRoot"/>
-      </p:par>
-    </p:tnLst>
-  </p:timing>
 </p:sld>
 </file>
 
@@ -15689,8 +15526,8 @@
           <a:chExt cx="0" cy="0"/>
         </a:xfrm>
       </p:grpSpPr>
-      <mc:AlternateContent xmlns:mc="http://schemas.openxmlformats.org/markup-compatibility/2006">
-        <mc:Choice xmlns:a14="http://schemas.microsoft.com/office/drawing/2010/main" Requires="a14">
+      <mc:AlternateContent xmlns:mc="http://schemas.openxmlformats.org/markup-compatibility/2006" xmlns:a14="http://schemas.microsoft.com/office/drawing/2010/main">
+        <mc:Choice Requires="a14">
           <p:sp>
             <p:nvSpPr>
               <p:cNvPr id="115" name="Google Shape;115;p22"/>
@@ -15727,14 +15564,9 @@
                   <a:buChar char="●"/>
                 </a:pPr>
                 <a:r>
-                  <a:rPr lang="de" dirty="0" smtClean="0"/>
-                  <a:t>Diskussionsthema </a:t>
+                  <a:rPr lang="de" dirty="0"/>
+                  <a:t>Diskussionsthema in allen Demokratien </a:t>
                 </a:r>
-                <a:r>
-                  <a:rPr lang="de" dirty="0"/>
-                  <a:t>in allen Demokratien </a:t>
-                </a:r>
-                <a:endParaRPr lang="de" dirty="0" smtClean="0"/>
               </a:p>
               <a:p>
                 <a:pPr marL="457200" lvl="0" indent="-342900" algn="l" rtl="0">
@@ -15748,20 +15580,8 @@
                   <a:buChar char="●"/>
                 </a:pPr>
                 <a:r>
-                  <a:rPr lang="de" dirty="0" smtClean="0"/>
-                  <a:t>Problematik: </a:t>
-                </a:r>
-                <a:r>
-                  <a:rPr lang="de" dirty="0" smtClean="0"/>
-                  <a:t>Prozentzahl </a:t>
-                </a:r>
-                <a:r>
                   <a:rPr lang="de" dirty="0"/>
-                  <a:t>auf Ganze Zahlen </a:t>
-                </a:r>
-                <a:r>
-                  <a:rPr lang="de" dirty="0" smtClean="0"/>
-                  <a:t>abbilden </a:t>
+                  <a:t>Problematik: Prozentzahl auf Ganze Zahlen abbilden </a:t>
                 </a:r>
                 <a14:m>
                   <m:oMath xmlns:m="http://schemas.openxmlformats.org/officeDocument/2006/math">
@@ -15812,7 +15632,7 @@
             </p:txBody>
           </p:sp>
         </mc:Choice>
-        <mc:Fallback>
+        <mc:Fallback xmlns="">
           <p:sp>
             <p:nvSpPr>
               <p:cNvPr id="115" name="Google Shape;115;p22"/>
@@ -15913,13 +15733,6 @@
   <p:clrMapOvr>
     <a:masterClrMapping/>
   </p:clrMapOvr>
-  <p:timing>
-    <p:tnLst>
-      <p:par>
-        <p:cTn id="1" dur="indefinite" restart="never" nodeType="tmRoot"/>
-      </p:par>
-    </p:tnLst>
-  </p:timing>
 </p:sld>
 </file>
 
@@ -16029,13 +15842,6 @@
   <p:clrMapOvr>
     <a:masterClrMapping/>
   </p:clrMapOvr>
-  <p:timing>
-    <p:tnLst>
-      <p:par>
-        <p:cTn id="1" dur="indefinite" restart="never" nodeType="tmRoot"/>
-      </p:par>
-    </p:tnLst>
-  </p:timing>
 </p:sld>
 </file>
 
@@ -16091,7 +15897,7 @@
               <a:buNone/>
             </a:pPr>
             <a:r>
-              <a:rPr lang="de" dirty="0" smtClean="0"/>
+              <a:rPr lang="de" dirty="0"/>
               <a:t>4 Fachdidaktische Überlegungen – Bildungsplan</a:t>
             </a:r>
             <a:endParaRPr dirty="0"/>
@@ -16133,11 +15939,11 @@
               <a:buNone/>
             </a:pPr>
             <a:r>
-              <a:rPr lang="de" b="1" dirty="0" smtClean="0"/>
+              <a:rPr lang="de" b="1" dirty="0"/>
               <a:t>Mathematik Kompetenzen</a:t>
             </a:r>
             <a:r>
-              <a:rPr lang="de" dirty="0" smtClean="0"/>
+              <a:rPr lang="de" dirty="0"/>
               <a:t> </a:t>
             </a:r>
           </a:p>
@@ -16157,7 +15963,7 @@
                 <a:tab pos="2689225" algn="l"/>
               </a:tabLst>
             </a:pPr>
-            <a:endParaRPr lang="de" dirty="0" smtClean="0"/>
+            <a:endParaRPr lang="de" dirty="0"/>
           </a:p>
           <a:p>
             <a:pPr marL="0" indent="0">
@@ -16190,7 +15996,7 @@
               </a:spcAft>
               <a:buNone/>
             </a:pPr>
-            <a:endParaRPr lang="de" sz="600" dirty="0" smtClean="0"/>
+            <a:endParaRPr lang="de" sz="600" dirty="0"/>
           </a:p>
           <a:p>
             <a:pPr marL="0" lvl="0" indent="0" algn="l" rtl="0">
@@ -16202,7 +16008,7 @@
               </a:spcAft>
               <a:buNone/>
             </a:pPr>
-            <a:endParaRPr lang="de" sz="800" dirty="0" smtClean="0"/>
+            <a:endParaRPr lang="de" sz="800" dirty="0"/>
           </a:p>
           <a:p>
             <a:pPr marL="0" lvl="0" indent="0" algn="l" rtl="0">
@@ -16214,7 +16020,7 @@
               </a:spcAft>
               <a:buNone/>
             </a:pPr>
-            <a:endParaRPr lang="de" sz="800" dirty="0" smtClean="0"/>
+            <a:endParaRPr lang="de" sz="800" dirty="0"/>
           </a:p>
           <a:p>
             <a:pPr marL="0" lvl="0" indent="0" algn="l" rtl="0">
@@ -16227,16 +16033,8 @@
               <a:buNone/>
             </a:pPr>
             <a:r>
-              <a:rPr lang="de" b="1" dirty="0" smtClean="0"/>
-              <a:t>GMK </a:t>
-            </a:r>
-            <a:r>
               <a:rPr lang="de" b="1" dirty="0"/>
-              <a:t>- politische </a:t>
-            </a:r>
-            <a:r>
-              <a:rPr lang="de" b="1" dirty="0" smtClean="0"/>
-              <a:t>Teilhabe</a:t>
+              <a:t>GMK - politische Teilhabe</a:t>
             </a:r>
             <a:endParaRPr b="1" dirty="0"/>
           </a:p>
@@ -16254,16 +16052,8 @@
               </a:tabLst>
             </a:pPr>
             <a:r>
-              <a:rPr lang="de" dirty="0" smtClean="0"/>
-              <a:t>Klasse 11/12	Wahlsystem </a:t>
-            </a:r>
-            <a:r>
               <a:rPr lang="de" dirty="0"/>
-              <a:t>zum Bundestag </a:t>
-            </a:r>
-            <a:r>
-              <a:rPr lang="de" dirty="0" smtClean="0"/>
-              <a:t>bewerten</a:t>
+              <a:t>Klasse 11/12	Wahlsystem zum Bundestag bewerten</a:t>
             </a:r>
           </a:p>
           <a:p>
@@ -16280,10 +16070,9 @@
               </a:tabLst>
             </a:pPr>
             <a:r>
-              <a:rPr lang="de" b="1" dirty="0" smtClean="0"/>
+              <a:rPr lang="de" b="1" dirty="0"/>
               <a:t>Demokratiebildung</a:t>
             </a:r>
-            <a:endParaRPr lang="de" b="1" dirty="0"/>
           </a:p>
         </p:txBody>
       </p:sp>
@@ -16328,7 +16117,7 @@
                     <a:lstStyle/>
                     <a:p>
                       <a:r>
-                        <a:rPr lang="de-DE" sz="1500" b="0" dirty="0" smtClean="0">
+                        <a:rPr lang="de-DE" sz="1500" b="0" dirty="0">
                           <a:solidFill>
                             <a:schemeClr val="tx1"/>
                           </a:solidFill>
@@ -16338,14 +16127,6 @@
                         </a:rPr>
                         <a:t>Argumentieren</a:t>
                       </a:r>
-                      <a:endParaRPr lang="de-DE" sz="1500" b="0" dirty="0">
-                        <a:solidFill>
-                          <a:schemeClr val="tx1"/>
-                        </a:solidFill>
-                        <a:latin typeface="Open Sans" panose="020B0604020202020204" charset="0"/>
-                        <a:ea typeface="Open Sans" panose="020B0604020202020204" charset="0"/>
-                        <a:cs typeface="Open Sans" panose="020B0604020202020204" charset="0"/>
-                      </a:endParaRPr>
                     </a:p>
                   </a:txBody>
                   <a:tcPr anchor="ctr">
@@ -16379,7 +16160,7 @@
                     <a:p>
                       <a:pPr algn="l"/>
                       <a:r>
-                        <a:rPr lang="de-DE" sz="1500" b="0" dirty="0" smtClean="0">
+                        <a:rPr lang="de-DE" sz="1500" b="0" dirty="0">
                           <a:solidFill>
                             <a:schemeClr val="tx1"/>
                           </a:solidFill>
@@ -16389,14 +16170,6 @@
                         </a:rPr>
                         <a:t>Mathematische Verfahren und ihre Vorgehensweisen erläutern und begründen</a:t>
                       </a:r>
-                      <a:endParaRPr lang="de-DE" sz="1500" b="0" dirty="0">
-                        <a:solidFill>
-                          <a:schemeClr val="tx1"/>
-                        </a:solidFill>
-                        <a:latin typeface="Open Sans" panose="020B0604020202020204" charset="0"/>
-                        <a:ea typeface="Open Sans" panose="020B0604020202020204" charset="0"/>
-                        <a:cs typeface="Open Sans" panose="020B0604020202020204" charset="0"/>
-                      </a:endParaRPr>
                     </a:p>
                   </a:txBody>
                   <a:tcPr anchor="ctr">
@@ -16436,7 +16209,7 @@
                     <a:lstStyle/>
                     <a:p>
                       <a:r>
-                        <a:rPr lang="de-DE" sz="1500" b="0" dirty="0" smtClean="0">
+                        <a:rPr lang="de-DE" sz="1500" b="0" dirty="0">
                           <a:solidFill>
                             <a:schemeClr val="tx1"/>
                           </a:solidFill>
@@ -16446,14 +16219,6 @@
                         </a:rPr>
                         <a:t>Modellieren</a:t>
                       </a:r>
-                      <a:endParaRPr lang="de-DE" sz="1500" b="0" dirty="0">
-                        <a:solidFill>
-                          <a:schemeClr val="tx1"/>
-                        </a:solidFill>
-                        <a:latin typeface="Open Sans" panose="020B0604020202020204" charset="0"/>
-                        <a:ea typeface="Open Sans" panose="020B0604020202020204" charset="0"/>
-                        <a:cs typeface="Open Sans" panose="020B0604020202020204" charset="0"/>
-                      </a:endParaRPr>
                     </a:p>
                   </a:txBody>
                   <a:tcPr anchor="ctr">
@@ -16487,7 +16252,7 @@
                     <a:p>
                       <a:pPr algn="l"/>
                       <a:r>
-                        <a:rPr lang="de-DE" sz="1500" b="0" dirty="0" smtClean="0">
+                        <a:rPr lang="de-DE" sz="1500" b="0" dirty="0">
                           <a:solidFill>
                             <a:schemeClr val="tx1"/>
                           </a:solidFill>
@@ -16498,7 +16263,7 @@
                         <a:t>Interpretieren</a:t>
                       </a:r>
                       <a:r>
-                        <a:rPr lang="de-DE" sz="1500" b="0" baseline="0" dirty="0" smtClean="0">
+                        <a:rPr lang="de-DE" sz="1500" b="0" baseline="0" dirty="0">
                           <a:solidFill>
                             <a:schemeClr val="tx1"/>
                           </a:solidFill>
@@ -16555,7 +16320,7 @@
                     <a:lstStyle/>
                     <a:p>
                       <a:r>
-                        <a:rPr lang="de-DE" sz="1500" b="0" dirty="0" smtClean="0">
+                        <a:rPr lang="de-DE" sz="1500" b="0" dirty="0">
                           <a:solidFill>
                             <a:schemeClr val="tx1"/>
                           </a:solidFill>
@@ -16565,14 +16330,6 @@
                         </a:rPr>
                         <a:t>Mit symbolischen, formalen und technischen Elementen der Mathematik umgehen</a:t>
                       </a:r>
-                      <a:endParaRPr lang="de-DE" sz="1500" b="0" dirty="0">
-                        <a:solidFill>
-                          <a:schemeClr val="tx1"/>
-                        </a:solidFill>
-                        <a:latin typeface="Open Sans" panose="020B0604020202020204" charset="0"/>
-                        <a:ea typeface="Open Sans" panose="020B0604020202020204" charset="0"/>
-                        <a:cs typeface="Open Sans" panose="020B0604020202020204" charset="0"/>
-                      </a:endParaRPr>
                     </a:p>
                   </a:txBody>
                   <a:tcPr anchor="ctr">
@@ -16606,7 +16363,7 @@
                     <a:p>
                       <a:pPr algn="l"/>
                       <a:r>
-                        <a:rPr lang="de-DE" sz="1500" b="0" dirty="0" smtClean="0">
+                        <a:rPr lang="de-DE" sz="1500" b="0" dirty="0">
                           <a:solidFill>
                             <a:schemeClr val="tx1"/>
                           </a:solidFill>
@@ -16617,7 +16374,7 @@
                         <a:t>Ergebnisse und die Eignung des Verfahrens kritisch</a:t>
                       </a:r>
                       <a:r>
-                        <a:rPr lang="de-DE" sz="1500" b="0" baseline="0" dirty="0" smtClean="0">
+                        <a:rPr lang="de-DE" sz="1500" b="0" baseline="0" dirty="0">
                           <a:solidFill>
                             <a:schemeClr val="tx1"/>
                           </a:solidFill>
@@ -16681,13 +16438,6 @@
   <p:clrMapOvr>
     <a:masterClrMapping/>
   </p:clrMapOvr>
-  <p:timing>
-    <p:tnLst>
-      <p:par>
-        <p:cTn id="1" dur="indefinite" restart="never" nodeType="tmRoot"/>
-      </p:par>
-    </p:tnLst>
-  </p:timing>
 </p:sld>
 </file>
 
@@ -16743,7 +16493,7 @@
               <a:buNone/>
             </a:pPr>
             <a:r>
-              <a:rPr lang="de" dirty="0" smtClean="0"/>
+              <a:rPr lang="de" dirty="0"/>
               <a:t>4 Fachdidaktische Überlegungen – Vorwissen</a:t>
             </a:r>
             <a:endParaRPr dirty="0"/>
@@ -16812,18 +16562,13 @@
                     <a:lstStyle/>
                     <a:p>
                       <a:r>
-                        <a:rPr lang="de-DE" sz="1800" dirty="0" smtClean="0">
+                        <a:rPr lang="de-DE" sz="1800" dirty="0">
                           <a:latin typeface="Open Sans" panose="020B0604020202020204" charset="0"/>
                           <a:ea typeface="Open Sans" panose="020B0604020202020204" charset="0"/>
                           <a:cs typeface="Open Sans" panose="020B0604020202020204" charset="0"/>
                         </a:rPr>
                         <a:t>GMK</a:t>
                       </a:r>
-                      <a:endParaRPr lang="de-DE" sz="1800" dirty="0">
-                        <a:latin typeface="Open Sans" panose="020B0604020202020204" charset="0"/>
-                        <a:ea typeface="Open Sans" panose="020B0604020202020204" charset="0"/>
-                        <a:cs typeface="Open Sans" panose="020B0604020202020204" charset="0"/>
-                      </a:endParaRPr>
                     </a:p>
                   </a:txBody>
                   <a:tcPr/>
@@ -16834,18 +16579,13 @@
                     <a:lstStyle/>
                     <a:p>
                       <a:r>
-                        <a:rPr lang="de-DE" sz="1800" dirty="0" smtClean="0">
+                        <a:rPr lang="de-DE" sz="1800" dirty="0">
                           <a:latin typeface="Open Sans" panose="020B0604020202020204" charset="0"/>
                           <a:ea typeface="Open Sans" panose="020B0604020202020204" charset="0"/>
                           <a:cs typeface="Open Sans" panose="020B0604020202020204" charset="0"/>
                         </a:rPr>
                         <a:t>Mathematik</a:t>
                       </a:r>
-                      <a:endParaRPr lang="de-DE" sz="1800" dirty="0">
-                        <a:latin typeface="Open Sans" panose="020B0604020202020204" charset="0"/>
-                        <a:ea typeface="Open Sans" panose="020B0604020202020204" charset="0"/>
-                        <a:cs typeface="Open Sans" panose="020B0604020202020204" charset="0"/>
-                      </a:endParaRPr>
                     </a:p>
                   </a:txBody>
                   <a:tcPr/>
@@ -16863,18 +16603,13 @@
                     <a:lstStyle/>
                     <a:p>
                       <a:r>
-                        <a:rPr lang="de-DE" sz="1800" dirty="0" smtClean="0">
+                        <a:rPr lang="de-DE" sz="1800" dirty="0">
                           <a:latin typeface="Open Sans" panose="020B0604020202020204" charset="0"/>
                           <a:ea typeface="Open Sans" panose="020B0604020202020204" charset="0"/>
                           <a:cs typeface="Open Sans" panose="020B0604020202020204" charset="0"/>
                         </a:rPr>
                         <a:t>Benötigt</a:t>
                       </a:r>
-                      <a:endParaRPr lang="de-DE" sz="1800" dirty="0">
-                        <a:latin typeface="Open Sans" panose="020B0604020202020204" charset="0"/>
-                        <a:ea typeface="Open Sans" panose="020B0604020202020204" charset="0"/>
-                        <a:cs typeface="Open Sans" panose="020B0604020202020204" charset="0"/>
-                      </a:endParaRPr>
                     </a:p>
                   </a:txBody>
                   <a:tcPr/>
@@ -16889,7 +16624,7 @@
                         <a:buChar char="•"/>
                       </a:pPr>
                       <a:r>
-                        <a:rPr lang="de-DE" sz="1800" dirty="0" smtClean="0">
+                        <a:rPr lang="de-DE" sz="1800" dirty="0">
                           <a:latin typeface="Open Sans" panose="020B0604020202020204" charset="0"/>
                           <a:ea typeface="Open Sans" panose="020B0604020202020204" charset="0"/>
                           <a:cs typeface="Open Sans" panose="020B0604020202020204" charset="0"/>
@@ -16903,7 +16638,7 @@
                         <a:buChar char="o"/>
                       </a:pPr>
                       <a:r>
-                        <a:rPr lang="de-DE" sz="1800" dirty="0" smtClean="0">
+                        <a:rPr lang="de-DE" sz="1800" dirty="0">
                           <a:latin typeface="Open Sans" panose="020B0604020202020204" charset="0"/>
                           <a:ea typeface="Open Sans" panose="020B0604020202020204" charset="0"/>
                           <a:cs typeface="Open Sans" panose="020B0604020202020204" charset="0"/>
@@ -16911,7 +16646,7 @@
                         <a:t>Bundes-,</a:t>
                       </a:r>
                       <a:r>
-                        <a:rPr lang="de-DE" sz="1800" baseline="0" dirty="0" smtClean="0">
+                        <a:rPr lang="de-DE" sz="1800" baseline="0" dirty="0">
                           <a:latin typeface="Open Sans" panose="020B0604020202020204" charset="0"/>
                           <a:ea typeface="Open Sans" panose="020B0604020202020204" charset="0"/>
                           <a:cs typeface="Open Sans" panose="020B0604020202020204" charset="0"/>
@@ -16925,7 +16660,7 @@
                         <a:buChar char="o"/>
                       </a:pPr>
                       <a:r>
-                        <a:rPr lang="de-DE" sz="1800" baseline="0" dirty="0" smtClean="0">
+                        <a:rPr lang="de-DE" sz="1800" baseline="0" dirty="0">
                           <a:latin typeface="Open Sans" panose="020B0604020202020204" charset="0"/>
                           <a:ea typeface="Open Sans" panose="020B0604020202020204" charset="0"/>
                           <a:cs typeface="Open Sans" panose="020B0604020202020204" charset="0"/>
@@ -16951,7 +16686,7 @@
                         <a:buChar char="•"/>
                       </a:pPr>
                       <a:r>
-                        <a:rPr lang="de-DE" sz="1800" dirty="0" smtClean="0">
+                        <a:rPr lang="de-DE" sz="1800" dirty="0">
                           <a:latin typeface="Open Sans" panose="020B0604020202020204" charset="0"/>
                           <a:ea typeface="Open Sans" panose="020B0604020202020204" charset="0"/>
                           <a:cs typeface="Open Sans" panose="020B0604020202020204" charset="0"/>
@@ -16965,7 +16700,7 @@
                         <a:buChar char="•"/>
                       </a:pPr>
                       <a:r>
-                        <a:rPr lang="de-DE" sz="1800" dirty="0" smtClean="0">
+                        <a:rPr lang="de-DE" sz="1800" dirty="0">
                           <a:latin typeface="Open Sans" panose="020B0604020202020204" charset="0"/>
                           <a:ea typeface="Open Sans" panose="020B0604020202020204" charset="0"/>
                           <a:cs typeface="Open Sans" panose="020B0604020202020204" charset="0"/>
@@ -16979,18 +16714,13 @@
                         <a:buChar char="•"/>
                       </a:pPr>
                       <a:r>
-                        <a:rPr lang="de-DE" sz="1800" dirty="0" smtClean="0">
+                        <a:rPr lang="de-DE" sz="1800" dirty="0">
                           <a:latin typeface="Open Sans" panose="020B0604020202020204" charset="0"/>
                           <a:ea typeface="Open Sans" panose="020B0604020202020204" charset="0"/>
                           <a:cs typeface="Open Sans" panose="020B0604020202020204" charset="0"/>
                         </a:rPr>
                         <a:t>Norm. Modellierung</a:t>
                       </a:r>
-                      <a:endParaRPr lang="de-DE" sz="1800" dirty="0">
-                        <a:latin typeface="Open Sans" panose="020B0604020202020204" charset="0"/>
-                        <a:ea typeface="Open Sans" panose="020B0604020202020204" charset="0"/>
-                        <a:cs typeface="Open Sans" panose="020B0604020202020204" charset="0"/>
-                      </a:endParaRPr>
                     </a:p>
                   </a:txBody>
                   <a:tcPr/>
@@ -17008,18 +16738,13 @@
                     <a:lstStyle/>
                     <a:p>
                       <a:r>
-                        <a:rPr lang="de-DE" sz="1800" dirty="0" smtClean="0">
+                        <a:rPr lang="de-DE" sz="1800" dirty="0">
                           <a:latin typeface="Open Sans" panose="020B0604020202020204" charset="0"/>
                           <a:ea typeface="Open Sans" panose="020B0604020202020204" charset="0"/>
                           <a:cs typeface="Open Sans" panose="020B0604020202020204" charset="0"/>
                         </a:rPr>
                         <a:t>Vorhanden</a:t>
                       </a:r>
-                      <a:endParaRPr lang="de-DE" sz="1800" dirty="0">
-                        <a:latin typeface="Open Sans" panose="020B0604020202020204" charset="0"/>
-                        <a:ea typeface="Open Sans" panose="020B0604020202020204" charset="0"/>
-                        <a:cs typeface="Open Sans" panose="020B0604020202020204" charset="0"/>
-                      </a:endParaRPr>
                     </a:p>
                   </a:txBody>
                   <a:tcPr/>
@@ -17030,7 +16755,7 @@
                     <a:lstStyle/>
                     <a:p>
                       <a:r>
-                        <a:rPr lang="de-DE" sz="1800" dirty="0" smtClean="0">
+                        <a:rPr lang="de-DE" sz="1800" dirty="0">
                           <a:latin typeface="Open Sans" panose="020B0604020202020204" charset="0"/>
                           <a:ea typeface="Open Sans" panose="020B0604020202020204" charset="0"/>
                           <a:cs typeface="Open Sans" panose="020B0604020202020204" charset="0"/>
@@ -17041,18 +16766,13 @@
                     <a:p>
                       <a:pPr marL="177800" indent="0"/>
                       <a:r>
-                        <a:rPr lang="de-DE" sz="1800" dirty="0" smtClean="0">
+                        <a:rPr lang="de-DE" sz="1800" dirty="0">
                           <a:latin typeface="Open Sans" panose="020B0604020202020204" charset="0"/>
                           <a:ea typeface="Open Sans" panose="020B0604020202020204" charset="0"/>
                           <a:cs typeface="Open Sans" panose="020B0604020202020204" charset="0"/>
                         </a:rPr>
                         <a:t>Klasse 8/9/10 Wahlsystem zum Bundestag erklären</a:t>
                       </a:r>
-                      <a:endParaRPr lang="de-DE" sz="1800" dirty="0">
-                        <a:latin typeface="Open Sans" panose="020B0604020202020204" charset="0"/>
-                        <a:ea typeface="Open Sans" panose="020B0604020202020204" charset="0"/>
-                        <a:cs typeface="Open Sans" panose="020B0604020202020204" charset="0"/>
-                      </a:endParaRPr>
                     </a:p>
                   </a:txBody>
                   <a:tcPr/>
@@ -17064,7 +16784,7 @@
                     <a:p>
                       <a:pPr marL="446088" indent="-446088"/>
                       <a:r>
-                        <a:rPr lang="de-DE" sz="1800" dirty="0" smtClean="0">
+                        <a:rPr lang="de-DE" sz="1800" dirty="0">
                           <a:latin typeface="Open Sans" panose="020B0604020202020204" charset="0"/>
                           <a:ea typeface="Open Sans" panose="020B0604020202020204" charset="0"/>
                           <a:cs typeface="Open Sans" panose="020B0604020202020204" charset="0"/>
@@ -17075,18 +16795,13 @@
                     <a:p>
                       <a:pPr marL="177800" indent="0"/>
                       <a:r>
-                        <a:rPr lang="de-DE" sz="1800" dirty="0" smtClean="0">
+                        <a:rPr lang="de-DE" sz="1800" dirty="0">
                           <a:latin typeface="Open Sans" panose="020B0604020202020204" charset="0"/>
                           <a:ea typeface="Open Sans" panose="020B0604020202020204" charset="0"/>
                           <a:cs typeface="Open Sans" panose="020B0604020202020204" charset="0"/>
                         </a:rPr>
                         <a:t>Klasse 7/8/9 Prozentwert, Grundwert und Prozentsatz identifizieren und berechnen</a:t>
                       </a:r>
-                      <a:endParaRPr lang="de-DE" sz="1800" dirty="0">
-                        <a:latin typeface="Open Sans" panose="020B0604020202020204" charset="0"/>
-                        <a:ea typeface="Open Sans" panose="020B0604020202020204" charset="0"/>
-                        <a:cs typeface="Open Sans" panose="020B0604020202020204" charset="0"/>
-                      </a:endParaRPr>
                     </a:p>
                   </a:txBody>
                   <a:tcPr/>
@@ -17111,13 +16826,6 @@
   <p:clrMapOvr>
     <a:masterClrMapping/>
   </p:clrMapOvr>
-  <p:timing>
-    <p:tnLst>
-      <p:par>
-        <p:cTn id="1" dur="indefinite" restart="never" nodeType="tmRoot"/>
-      </p:par>
-    </p:tnLst>
-  </p:timing>
 </p:sld>
 </file>
 
@@ -17174,7 +16882,7 @@
               <a:buNone/>
             </a:pPr>
             <a:r>
-              <a:rPr lang="de" b="1" dirty="0" smtClean="0"/>
+              <a:rPr lang="de" b="1" dirty="0"/>
               <a:t>Mathematik</a:t>
             </a:r>
           </a:p>
@@ -17183,15 +16891,15 @@
               <a:buNone/>
             </a:pPr>
             <a:r>
-              <a:rPr lang="de-DE" dirty="0" smtClean="0"/>
+              <a:rPr lang="de-DE" dirty="0"/>
               <a:t>V</a:t>
             </a:r>
             <a:r>
-              <a:rPr lang="de" dirty="0" smtClean="0"/>
+              <a:rPr lang="de" dirty="0"/>
               <a:t>ersch. Verfahren für D‘Hondt und </a:t>
             </a:r>
             <a:r>
-              <a:rPr lang="de" dirty="0" smtClean="0">
+              <a:rPr lang="de" dirty="0">
                 <a:latin typeface="Open Sans" panose="020B0604020202020204" charset="0"/>
                 <a:ea typeface="Open Sans" panose="020B0604020202020204" charset="0"/>
                 <a:cs typeface="Open Sans" panose="020B0604020202020204" charset="0"/>
@@ -17199,7 +16907,7 @@
               <a:t>Sainte-Langu</a:t>
             </a:r>
             <a:r>
-              <a:rPr lang="de" dirty="0" smtClean="0">
+              <a:rPr lang="de" dirty="0">
                 <a:solidFill>
                   <a:srgbClr val="202122"/>
                 </a:solidFill>
@@ -17218,7 +16926,7 @@
             <a:pPr marL="357188" lvl="0" indent="0">
               <a:buNone/>
             </a:pPr>
-            <a:endParaRPr lang="de" sz="1400" dirty="0" smtClean="0">
+            <a:endParaRPr lang="de" sz="1400" dirty="0">
               <a:solidFill>
                 <a:srgbClr val="202122"/>
               </a:solidFill>
@@ -17239,7 +16947,7 @@
               </a:tabLst>
             </a:pPr>
             <a:r>
-              <a:rPr lang="de-DE" dirty="0" smtClean="0">
+              <a:rPr lang="de-DE" dirty="0">
                 <a:solidFill>
                   <a:srgbClr val="202122"/>
                 </a:solidFill>
@@ -17254,7 +16962,7 @@
               <a:t>D</a:t>
             </a:r>
             <a:r>
-              <a:rPr lang="de" dirty="0" smtClean="0">
+              <a:rPr lang="de" dirty="0">
                 <a:solidFill>
                   <a:srgbClr val="202122"/>
                 </a:solidFill>
@@ -17284,7 +16992,7 @@
               </a:tabLst>
             </a:pPr>
             <a:r>
-              <a:rPr lang="de-DE" b="1" dirty="0" smtClean="0">
+              <a:rPr lang="de-DE" b="1" dirty="0">
                 <a:solidFill>
                   <a:srgbClr val="FF0000"/>
                 </a:solidFill>
@@ -17292,7 +17000,7 @@
               <a:t>P</a:t>
             </a:r>
             <a:r>
-              <a:rPr lang="de" b="1" dirty="0" smtClean="0">
+              <a:rPr lang="de" b="1" dirty="0">
                 <a:solidFill>
                   <a:srgbClr val="FF0000"/>
                 </a:solidFill>
@@ -17311,7 +17019,7 @@
               <a:buSzPts val="1800"/>
               <a:buNone/>
             </a:pPr>
-            <a:endParaRPr lang="de" b="1" dirty="0" smtClean="0"/>
+            <a:endParaRPr lang="de" b="1" dirty="0"/>
           </a:p>
           <a:p>
             <a:pPr marL="0" lvl="0" indent="0" algn="l" rtl="0">
@@ -17325,7 +17033,7 @@
               <a:buNone/>
             </a:pPr>
             <a:r>
-              <a:rPr lang="de" b="1" dirty="0" smtClean="0"/>
+              <a:rPr lang="de" b="1" dirty="0"/>
               <a:t>GMK</a:t>
             </a:r>
           </a:p>
@@ -17334,7 +17042,7 @@
               <a:buNone/>
             </a:pPr>
             <a:r>
-              <a:rPr lang="de" dirty="0" smtClean="0"/>
+              <a:rPr lang="de" dirty="0"/>
               <a:t>keine Überhangmandate</a:t>
             </a:r>
           </a:p>
@@ -17343,7 +17051,7 @@
               <a:buNone/>
             </a:pPr>
             <a:r>
-              <a:rPr lang="de" dirty="0" smtClean="0"/>
+              <a:rPr lang="de" dirty="0"/>
               <a:t>keine 5 %- Hürde</a:t>
             </a:r>
           </a:p>
@@ -17385,11 +17093,7 @@
             </a:pPr>
             <a:r>
               <a:rPr lang="de" dirty="0"/>
-              <a:t>4 Fachdidaktische Überlegungen - </a:t>
-            </a:r>
-            <a:r>
-              <a:rPr lang="de" dirty="0" smtClean="0"/>
-              <a:t>Reduktion</a:t>
+              <a:t>4 Fachdidaktische Überlegungen - Reduktion</a:t>
             </a:r>
             <a:endParaRPr dirty="0"/>
           </a:p>
@@ -17509,13 +17213,6 @@
   <p:clrMapOvr>
     <a:masterClrMapping/>
   </p:clrMapOvr>
-  <p:timing>
-    <p:tnLst>
-      <p:par>
-        <p:cTn id="1" dur="indefinite" restart="never" nodeType="tmRoot"/>
-      </p:par>
-    </p:tnLst>
-  </p:timing>
 </p:sld>
 </file>
 
@@ -17614,23 +17311,7 @@
             </a:pPr>
             <a:r>
               <a:rPr lang="de" dirty="0"/>
-              <a:t>Werkzeuge/Medien, Funktion, Medieneinsatz, Effekte der Technik, </a:t>
-            </a:r>
-            <a:r>
-              <a:rPr lang="de" dirty="0" smtClean="0"/>
-              <a:t>herausforderungen, </a:t>
-            </a:r>
-            <a:r>
-              <a:rPr lang="de" dirty="0"/>
-              <a:t>kompetenzbereiche, </a:t>
-            </a:r>
-            <a:r>
-              <a:rPr lang="de" dirty="0" smtClean="0"/>
-              <a:t>KMK </a:t>
-            </a:r>
-            <a:r>
-              <a:rPr lang="de" dirty="0"/>
-              <a:t>strategie</a:t>
+              <a:t>Werkzeuge/Medien, Funktion, Medieneinsatz, Effekte der Technik, herausforderungen, kompetenzbereiche, KMK strategie</a:t>
             </a:r>
             <a:endParaRPr dirty="0"/>
           </a:p>
@@ -17641,13 +17322,6 @@
   <p:clrMapOvr>
     <a:masterClrMapping/>
   </p:clrMapOvr>
-  <p:timing>
-    <p:tnLst>
-      <p:par>
-        <p:cTn id="1" dur="indefinite" restart="never" nodeType="tmRoot"/>
-      </p:par>
-    </p:tnLst>
-  </p:timing>
 </p:sld>
 </file>
 
@@ -17685,10 +17359,9 @@
           <a:p>
             <a:pPr algn="ctr"/>
             <a:r>
-              <a:rPr lang="de-DE" dirty="0" smtClean="0"/>
+              <a:rPr lang="de-DE" dirty="0"/>
               <a:t>5 Mediendidaktische Überlegungen</a:t>
             </a:r>
-            <a:endParaRPr lang="de-DE" dirty="0"/>
           </a:p>
         </p:txBody>
       </p:sp>
@@ -17724,13 +17397,6 @@
   <p:clrMapOvr>
     <a:masterClrMapping/>
   </p:clrMapOvr>
-  <p:timing>
-    <p:tnLst>
-      <p:par>
-        <p:cTn id="1" dur="indefinite" restart="never" nodeType="tmRoot"/>
-      </p:par>
-    </p:tnLst>
-  </p:timing>
 </p:sld>
 </file>
 
@@ -17768,18 +17434,13 @@
           <a:p>
             <a:pPr algn="ctr"/>
             <a:r>
-              <a:rPr lang="de-DE" dirty="0" smtClean="0">
+              <a:rPr lang="de-DE" dirty="0">
                 <a:solidFill>
                   <a:srgbClr val="FF0000"/>
                 </a:solidFill>
               </a:rPr>
               <a:t>Abgleich der Inhalte mit Präsentation Lea</a:t>
             </a:r>
-            <a:endParaRPr lang="de-DE" dirty="0">
-              <a:solidFill>
-                <a:srgbClr val="FF0000"/>
-              </a:solidFill>
-            </a:endParaRPr>
           </a:p>
         </p:txBody>
       </p:sp>
@@ -17812,13 +17473,6 @@
   <p:clrMapOvr>
     <a:masterClrMapping/>
   </p:clrMapOvr>
-  <p:timing>
-    <p:tnLst>
-      <p:par>
-        <p:cTn id="1" dur="indefinite" restart="never" nodeType="tmRoot"/>
-      </p:par>
-    </p:tnLst>
-  </p:timing>
 </p:sld>
 </file>
 
@@ -17912,10 +17566,9 @@
           <a:p>
             <a:pPr algn="ctr"/>
             <a:r>
-              <a:rPr lang="de-DE" dirty="0" smtClean="0"/>
+              <a:rPr lang="de-DE" dirty="0"/>
               <a:t>5 Mediendidaktische Überlegung - PPT</a:t>
             </a:r>
-            <a:endParaRPr lang="de-DE" dirty="0"/>
           </a:p>
         </p:txBody>
       </p:sp>
@@ -17993,18 +17646,13 @@
           <a:lstStyle/>
           <a:p>
             <a:r>
-              <a:rPr lang="de-DE" sz="2000" dirty="0" smtClean="0">
+              <a:rPr lang="de-DE" sz="2000" dirty="0">
                 <a:latin typeface="Open Sans" panose="020B0604020202020204" charset="0"/>
                 <a:ea typeface="Open Sans" panose="020B0604020202020204" charset="0"/>
                 <a:cs typeface="Open Sans" panose="020B0604020202020204" charset="0"/>
               </a:rPr>
               <a:t>Funktion</a:t>
             </a:r>
-            <a:endParaRPr lang="de-DE" sz="2000" dirty="0">
-              <a:latin typeface="Open Sans" panose="020B0604020202020204" charset="0"/>
-              <a:ea typeface="Open Sans" panose="020B0604020202020204" charset="0"/>
-              <a:cs typeface="Open Sans" panose="020B0604020202020204" charset="0"/>
-            </a:endParaRPr>
           </a:p>
         </p:txBody>
       </p:sp>
@@ -18082,18 +17730,13 @@
           <a:lstStyle/>
           <a:p>
             <a:r>
-              <a:rPr lang="de-DE" sz="2000" dirty="0" smtClean="0">
+              <a:rPr lang="de-DE" sz="2000" dirty="0">
                 <a:latin typeface="Open Sans" panose="020B0604020202020204" charset="0"/>
                 <a:ea typeface="Open Sans" panose="020B0604020202020204" charset="0"/>
                 <a:cs typeface="Open Sans" panose="020B0604020202020204" charset="0"/>
               </a:rPr>
               <a:t>Herausforderungen</a:t>
             </a:r>
-            <a:endParaRPr lang="de-DE" sz="2000" dirty="0">
-              <a:latin typeface="Open Sans" panose="020B0604020202020204" charset="0"/>
-              <a:ea typeface="Open Sans" panose="020B0604020202020204" charset="0"/>
-              <a:cs typeface="Open Sans" panose="020B0604020202020204" charset="0"/>
-            </a:endParaRPr>
           </a:p>
         </p:txBody>
       </p:sp>
@@ -18120,18 +17763,13 @@
           <a:lstStyle/>
           <a:p>
             <a:r>
-              <a:rPr lang="de-DE" sz="2000" dirty="0" smtClean="0">
+              <a:rPr lang="de-DE" sz="2000" dirty="0">
                 <a:latin typeface="Open Sans" panose="020B0604020202020204" charset="0"/>
                 <a:ea typeface="Open Sans" panose="020B0604020202020204" charset="0"/>
                 <a:cs typeface="Open Sans" panose="020B0604020202020204" charset="0"/>
               </a:rPr>
               <a:t>Alternativen</a:t>
             </a:r>
-            <a:endParaRPr lang="de-DE" sz="2000" dirty="0">
-              <a:latin typeface="Open Sans" panose="020B0604020202020204" charset="0"/>
-              <a:ea typeface="Open Sans" panose="020B0604020202020204" charset="0"/>
-              <a:cs typeface="Open Sans" panose="020B0604020202020204" charset="0"/>
-            </a:endParaRPr>
           </a:p>
         </p:txBody>
       </p:sp>
@@ -18158,7 +17796,7 @@
           <a:lstStyle/>
           <a:p>
             <a:r>
-              <a:rPr lang="de-DE" sz="1800" dirty="0" smtClean="0">
+              <a:rPr lang="de-DE" sz="1800" dirty="0">
                 <a:latin typeface="Open Sans" panose="020B0604020202020204" charset="0"/>
                 <a:ea typeface="Open Sans" panose="020B0604020202020204" charset="0"/>
                 <a:cs typeface="Open Sans" panose="020B0604020202020204" charset="0"/>
@@ -18167,7 +17805,7 @@
             </a:r>
           </a:p>
           <a:p>
-            <a:endParaRPr lang="de-DE" dirty="0" smtClean="0">
+            <a:endParaRPr lang="de-DE" dirty="0">
               <a:latin typeface="Open Sans" panose="020B0604020202020204" charset="0"/>
               <a:ea typeface="Open Sans" panose="020B0604020202020204" charset="0"/>
               <a:cs typeface="Open Sans" panose="020B0604020202020204" charset="0"/>
@@ -18184,15 +17822,7 @@
                 <a:ea typeface="Open Sans" panose="020B0604020202020204" charset="0"/>
                 <a:cs typeface="Open Sans" panose="020B0604020202020204" charset="0"/>
               </a:rPr>
-              <a:t>s</a:t>
-            </a:r>
-            <a:r>
-              <a:rPr lang="de-DE" sz="1800" dirty="0" smtClean="0">
-                <a:latin typeface="Open Sans" panose="020B0604020202020204" charset="0"/>
-                <a:ea typeface="Open Sans" panose="020B0604020202020204" charset="0"/>
-                <a:cs typeface="Open Sans" panose="020B0604020202020204" charset="0"/>
-              </a:rPr>
-              <a:t>chnelles Zeigen von Infos</a:t>
+              <a:t>schnelles Zeigen von Infos</a:t>
             </a:r>
           </a:p>
           <a:p>
@@ -18201,7 +17831,7 @@
               <a:buChar char="•"/>
             </a:pPr>
             <a:r>
-              <a:rPr lang="de-DE" sz="1800" dirty="0" smtClean="0">
+              <a:rPr lang="de-DE" sz="1800" dirty="0">
                 <a:latin typeface="Open Sans" panose="020B0604020202020204" charset="0"/>
                 <a:ea typeface="Open Sans" panose="020B0604020202020204" charset="0"/>
                 <a:cs typeface="Open Sans" panose="020B0604020202020204" charset="0"/>
@@ -18215,18 +17845,13 @@
               <a:buChar char="•"/>
             </a:pPr>
             <a:r>
-              <a:rPr lang="de-DE" sz="1800" dirty="0" smtClean="0">
+              <a:rPr lang="de-DE" sz="1800" dirty="0">
                 <a:latin typeface="Open Sans" panose="020B0604020202020204" charset="0"/>
                 <a:ea typeface="Open Sans" panose="020B0604020202020204" charset="0"/>
                 <a:cs typeface="Open Sans" panose="020B0604020202020204" charset="0"/>
               </a:rPr>
               <a:t>vertraut</a:t>
             </a:r>
-            <a:endParaRPr lang="de-DE" sz="1800" dirty="0">
-              <a:latin typeface="Open Sans" panose="020B0604020202020204" charset="0"/>
-              <a:ea typeface="Open Sans" panose="020B0604020202020204" charset="0"/>
-              <a:cs typeface="Open Sans" panose="020B0604020202020204" charset="0"/>
-            </a:endParaRPr>
           </a:p>
         </p:txBody>
       </p:sp>
@@ -18257,7 +17882,7 @@
               <a:buChar char="•"/>
             </a:pPr>
             <a:r>
-              <a:rPr lang="de-DE" sz="1800" dirty="0" smtClean="0">
+              <a:rPr lang="de-DE" sz="1800" dirty="0">
                 <a:latin typeface="Open Sans" panose="020B0604020202020204" charset="0"/>
                 <a:ea typeface="Open Sans" panose="020B0604020202020204" charset="0"/>
                 <a:cs typeface="Open Sans" panose="020B0604020202020204" charset="0"/>
@@ -18271,7 +17896,7 @@
               <a:buChar char="•"/>
             </a:pPr>
             <a:r>
-              <a:rPr lang="de-DE" sz="1800" dirty="0" smtClean="0">
+              <a:rPr lang="de-DE" sz="1800" dirty="0">
                 <a:latin typeface="Open Sans" panose="020B0604020202020204" charset="0"/>
                 <a:ea typeface="Open Sans" panose="020B0604020202020204" charset="0"/>
                 <a:cs typeface="Open Sans" panose="020B0604020202020204" charset="0"/>
@@ -18285,7 +17910,7 @@
               <a:buChar char="•"/>
             </a:pPr>
             <a:r>
-              <a:rPr lang="de-DE" sz="1800" dirty="0" smtClean="0">
+              <a:rPr lang="de-DE" sz="1800" dirty="0">
                 <a:latin typeface="Open Sans" panose="020B0604020202020204" charset="0"/>
                 <a:ea typeface="Open Sans" panose="020B0604020202020204" charset="0"/>
                 <a:cs typeface="Open Sans" panose="020B0604020202020204" charset="0"/>
@@ -18322,7 +17947,7 @@
               <a:buChar char="•"/>
             </a:pPr>
             <a:r>
-              <a:rPr lang="de-DE" sz="1800" dirty="0" smtClean="0">
+              <a:rPr lang="de-DE" sz="1800" dirty="0">
                 <a:latin typeface="Open Sans" panose="020B0604020202020204" charset="0"/>
                 <a:ea typeface="Open Sans" panose="020B0604020202020204" charset="0"/>
                 <a:cs typeface="Open Sans" panose="020B0604020202020204" charset="0"/>
@@ -18336,7 +17961,7 @@
               <a:buChar char="•"/>
             </a:pPr>
             <a:r>
-              <a:rPr lang="de-DE" sz="1800" dirty="0" smtClean="0">
+              <a:rPr lang="de-DE" sz="1800" dirty="0">
                 <a:latin typeface="Open Sans" panose="020B0604020202020204" charset="0"/>
                 <a:ea typeface="Open Sans" panose="020B0604020202020204" charset="0"/>
                 <a:cs typeface="Open Sans" panose="020B0604020202020204" charset="0"/>
@@ -18350,7 +17975,7 @@
               <a:buChar char="•"/>
             </a:pPr>
             <a:r>
-              <a:rPr lang="de-DE" sz="1800" dirty="0" smtClean="0">
+              <a:rPr lang="de-DE" sz="1800" dirty="0">
                 <a:latin typeface="Open Sans" panose="020B0604020202020204" charset="0"/>
                 <a:ea typeface="Open Sans" panose="020B0604020202020204" charset="0"/>
                 <a:cs typeface="Open Sans" panose="020B0604020202020204" charset="0"/>
@@ -18370,13 +17995,6 @@
   <p:clrMapOvr>
     <a:masterClrMapping/>
   </p:clrMapOvr>
-  <p:timing>
-    <p:tnLst>
-      <p:par>
-        <p:cTn id="1" dur="indefinite" restart="never" nodeType="tmRoot"/>
-      </p:par>
-    </p:tnLst>
-  </p:timing>
 </p:sld>
 </file>
 
@@ -18432,7 +18050,7 @@
               <a:buNone/>
             </a:pPr>
             <a:r>
-              <a:rPr lang="de" dirty="0" smtClean="0"/>
+              <a:rPr lang="de" dirty="0"/>
               <a:t>0 Ablauf</a:t>
             </a:r>
             <a:endParaRPr dirty="0"/>
@@ -18601,13 +18219,6 @@
   <p:clrMapOvr>
     <a:masterClrMapping/>
   </p:clrMapOvr>
-  <p:timing>
-    <p:tnLst>
-      <p:par>
-        <p:cTn id="1" dur="indefinite" restart="never" nodeType="tmRoot"/>
-      </p:par>
-    </p:tnLst>
-  </p:timing>
 </p:sld>
 </file>
 
@@ -18701,10 +18312,9 @@
           <a:p>
             <a:pPr algn="ctr"/>
             <a:r>
-              <a:rPr lang="de-DE" dirty="0" smtClean="0"/>
+              <a:rPr lang="de-DE" dirty="0"/>
               <a:t>5 Mediendidaktische Überlegung - Notion</a:t>
             </a:r>
-            <a:endParaRPr lang="de-DE" dirty="0"/>
           </a:p>
         </p:txBody>
       </p:sp>
@@ -18782,18 +18392,13 @@
           <a:lstStyle/>
           <a:p>
             <a:r>
-              <a:rPr lang="de-DE" sz="2000" dirty="0" smtClean="0">
+              <a:rPr lang="de-DE" sz="2000" dirty="0">
                 <a:latin typeface="Open Sans" panose="020B0604020202020204" charset="0"/>
                 <a:ea typeface="Open Sans" panose="020B0604020202020204" charset="0"/>
                 <a:cs typeface="Open Sans" panose="020B0604020202020204" charset="0"/>
               </a:rPr>
               <a:t>Funktion</a:t>
             </a:r>
-            <a:endParaRPr lang="de-DE" sz="2000" dirty="0">
-              <a:latin typeface="Open Sans" panose="020B0604020202020204" charset="0"/>
-              <a:ea typeface="Open Sans" panose="020B0604020202020204" charset="0"/>
-              <a:cs typeface="Open Sans" panose="020B0604020202020204" charset="0"/>
-            </a:endParaRPr>
           </a:p>
         </p:txBody>
       </p:sp>
@@ -18871,18 +18476,13 @@
           <a:lstStyle/>
           <a:p>
             <a:r>
-              <a:rPr lang="de-DE" sz="2000" dirty="0" smtClean="0">
+              <a:rPr lang="de-DE" sz="2000" dirty="0">
                 <a:latin typeface="Open Sans" panose="020B0604020202020204" charset="0"/>
                 <a:ea typeface="Open Sans" panose="020B0604020202020204" charset="0"/>
                 <a:cs typeface="Open Sans" panose="020B0604020202020204" charset="0"/>
               </a:rPr>
               <a:t>Herausforderungen</a:t>
             </a:r>
-            <a:endParaRPr lang="de-DE" sz="2000" dirty="0">
-              <a:latin typeface="Open Sans" panose="020B0604020202020204" charset="0"/>
-              <a:ea typeface="Open Sans" panose="020B0604020202020204" charset="0"/>
-              <a:cs typeface="Open Sans" panose="020B0604020202020204" charset="0"/>
-            </a:endParaRPr>
           </a:p>
         </p:txBody>
       </p:sp>
@@ -18909,18 +18509,13 @@
           <a:lstStyle/>
           <a:p>
             <a:r>
-              <a:rPr lang="de-DE" sz="2000" dirty="0" smtClean="0">
+              <a:rPr lang="de-DE" sz="2000" dirty="0">
                 <a:latin typeface="Open Sans" panose="020B0604020202020204" charset="0"/>
                 <a:ea typeface="Open Sans" panose="020B0604020202020204" charset="0"/>
                 <a:cs typeface="Open Sans" panose="020B0604020202020204" charset="0"/>
               </a:rPr>
               <a:t>Alternativen</a:t>
             </a:r>
-            <a:endParaRPr lang="de-DE" sz="2000" dirty="0">
-              <a:latin typeface="Open Sans" panose="020B0604020202020204" charset="0"/>
-              <a:ea typeface="Open Sans" panose="020B0604020202020204" charset="0"/>
-              <a:cs typeface="Open Sans" panose="020B0604020202020204" charset="0"/>
-            </a:endParaRPr>
           </a:p>
         </p:txBody>
       </p:sp>
@@ -18947,7 +18542,7 @@
           <a:lstStyle/>
           <a:p>
             <a:r>
-              <a:rPr lang="de-DE" sz="1800" dirty="0" smtClean="0">
+              <a:rPr lang="de-DE" sz="1800" dirty="0">
                 <a:latin typeface="Open Sans" panose="020B0604020202020204" charset="0"/>
                 <a:ea typeface="Open Sans" panose="020B0604020202020204" charset="0"/>
                 <a:cs typeface="Open Sans" panose="020B0604020202020204" charset="0"/>
@@ -18957,7 +18552,7 @@
           </a:p>
           <a:p>
             <a:r>
-              <a:rPr lang="de-DE" sz="1800" dirty="0" smtClean="0">
+              <a:rPr lang="de-DE" sz="1800" dirty="0">
                 <a:latin typeface="Open Sans" panose="020B0604020202020204" charset="0"/>
                 <a:ea typeface="Open Sans" panose="020B0604020202020204" charset="0"/>
                 <a:cs typeface="Open Sans" panose="020B0604020202020204" charset="0"/>
@@ -18966,7 +18561,7 @@
             </a:r>
           </a:p>
           <a:p>
-            <a:endParaRPr lang="de-DE" dirty="0" smtClean="0">
+            <a:endParaRPr lang="de-DE" dirty="0">
               <a:latin typeface="Open Sans" panose="020B0604020202020204" charset="0"/>
               <a:ea typeface="Open Sans" panose="020B0604020202020204" charset="0"/>
               <a:cs typeface="Open Sans" panose="020B0604020202020204" charset="0"/>
@@ -18978,7 +18573,7 @@
               <a:buChar char="•"/>
             </a:pPr>
             <a:r>
-              <a:rPr lang="de-DE" sz="1800" dirty="0" smtClean="0">
+              <a:rPr lang="de-DE" sz="1800" dirty="0">
                 <a:latin typeface="Open Sans" panose="020B0604020202020204" charset="0"/>
                 <a:ea typeface="Open Sans" panose="020B0604020202020204" charset="0"/>
                 <a:cs typeface="Open Sans" panose="020B0604020202020204" charset="0"/>
@@ -18992,7 +18587,7 @@
               <a:buChar char="•"/>
             </a:pPr>
             <a:r>
-              <a:rPr lang="de-DE" sz="1800" dirty="0" smtClean="0">
+              <a:rPr lang="de-DE" sz="1800" dirty="0">
                 <a:latin typeface="Open Sans" panose="020B0604020202020204" charset="0"/>
                 <a:ea typeface="Open Sans" panose="020B0604020202020204" charset="0"/>
                 <a:cs typeface="Open Sans" panose="020B0604020202020204" charset="0"/>
@@ -19006,7 +18601,7 @@
               <a:buChar char="•"/>
             </a:pPr>
             <a:r>
-              <a:rPr lang="de-DE" sz="1800" dirty="0" smtClean="0">
+              <a:rPr lang="de-DE" sz="1800" dirty="0">
                 <a:latin typeface="Open Sans" panose="020B0604020202020204" charset="0"/>
                 <a:ea typeface="Open Sans" panose="020B0604020202020204" charset="0"/>
                 <a:cs typeface="Open Sans" panose="020B0604020202020204" charset="0"/>
@@ -19043,7 +18638,7 @@
               <a:buChar char="•"/>
             </a:pPr>
             <a:r>
-              <a:rPr lang="de-DE" sz="1800" dirty="0" smtClean="0">
+              <a:rPr lang="de-DE" sz="1800" dirty="0">
                 <a:latin typeface="Open Sans" panose="020B0604020202020204" charset="0"/>
                 <a:ea typeface="Open Sans" panose="020B0604020202020204" charset="0"/>
                 <a:cs typeface="Open Sans" panose="020B0604020202020204" charset="0"/>
@@ -19057,7 +18652,7 @@
               <a:buChar char="•"/>
             </a:pPr>
             <a:r>
-              <a:rPr lang="de-DE" sz="1800" dirty="0" smtClean="0">
+              <a:rPr lang="de-DE" sz="1800" dirty="0">
                 <a:latin typeface="Open Sans" panose="020B0604020202020204" charset="0"/>
                 <a:ea typeface="Open Sans" panose="020B0604020202020204" charset="0"/>
                 <a:cs typeface="Open Sans" panose="020B0604020202020204" charset="0"/>
@@ -19071,7 +18666,7 @@
               <a:buChar char="•"/>
             </a:pPr>
             <a:r>
-              <a:rPr lang="de-DE" sz="1800" dirty="0" smtClean="0">
+              <a:rPr lang="de-DE" sz="1800" dirty="0">
                 <a:latin typeface="Open Sans" panose="020B0604020202020204" charset="0"/>
                 <a:ea typeface="Open Sans" panose="020B0604020202020204" charset="0"/>
                 <a:cs typeface="Open Sans" panose="020B0604020202020204" charset="0"/>
@@ -19085,7 +18680,7 @@
               <a:buChar char="•"/>
             </a:pPr>
             <a:r>
-              <a:rPr lang="de-DE" sz="1800" dirty="0" smtClean="0">
+              <a:rPr lang="de-DE" sz="1800" dirty="0">
                 <a:latin typeface="Open Sans" panose="020B0604020202020204" charset="0"/>
                 <a:ea typeface="Open Sans" panose="020B0604020202020204" charset="0"/>
                 <a:cs typeface="Open Sans" panose="020B0604020202020204" charset="0"/>
@@ -19122,7 +18717,7 @@
               <a:buChar char="•"/>
             </a:pPr>
             <a:r>
-              <a:rPr lang="de-DE" sz="1800" dirty="0" smtClean="0">
+              <a:rPr lang="de-DE" sz="1800" dirty="0">
                 <a:latin typeface="Open Sans" panose="020B0604020202020204" charset="0"/>
                 <a:ea typeface="Open Sans" panose="020B0604020202020204" charset="0"/>
                 <a:cs typeface="Open Sans" panose="020B0604020202020204" charset="0"/>
@@ -19136,7 +18731,7 @@
               <a:buChar char="•"/>
             </a:pPr>
             <a:r>
-              <a:rPr lang="de-DE" sz="1800" dirty="0" smtClean="0">
+              <a:rPr lang="de-DE" sz="1800" dirty="0">
                 <a:latin typeface="Open Sans" panose="020B0604020202020204" charset="0"/>
                 <a:ea typeface="Open Sans" panose="020B0604020202020204" charset="0"/>
                 <a:cs typeface="Open Sans" panose="020B0604020202020204" charset="0"/>
@@ -19156,13 +18751,6 @@
   <p:clrMapOvr>
     <a:masterClrMapping/>
   </p:clrMapOvr>
-  <p:timing>
-    <p:tnLst>
-      <p:par>
-        <p:cTn id="1" dur="indefinite" restart="never" nodeType="tmRoot"/>
-      </p:par>
-    </p:tnLst>
-  </p:timing>
 </p:sld>
 </file>
 
@@ -19256,10 +18844,9 @@
           <a:p>
             <a:pPr algn="ctr"/>
             <a:r>
-              <a:rPr lang="de-DE" dirty="0" smtClean="0"/>
+              <a:rPr lang="de-DE" dirty="0"/>
               <a:t>5 Mediendidaktische Überlegung – H5P</a:t>
             </a:r>
-            <a:endParaRPr lang="de-DE" dirty="0"/>
           </a:p>
         </p:txBody>
       </p:sp>
@@ -19337,18 +18924,13 @@
           <a:lstStyle/>
           <a:p>
             <a:r>
-              <a:rPr lang="de-DE" sz="2000" dirty="0" smtClean="0">
+              <a:rPr lang="de-DE" sz="2000" dirty="0">
                 <a:latin typeface="Open Sans" panose="020B0604020202020204" charset="0"/>
                 <a:ea typeface="Open Sans" panose="020B0604020202020204" charset="0"/>
                 <a:cs typeface="Open Sans" panose="020B0604020202020204" charset="0"/>
               </a:rPr>
               <a:t>Funktion</a:t>
             </a:r>
-            <a:endParaRPr lang="de-DE" sz="2000" dirty="0">
-              <a:latin typeface="Open Sans" panose="020B0604020202020204" charset="0"/>
-              <a:ea typeface="Open Sans" panose="020B0604020202020204" charset="0"/>
-              <a:cs typeface="Open Sans" panose="020B0604020202020204" charset="0"/>
-            </a:endParaRPr>
           </a:p>
         </p:txBody>
       </p:sp>
@@ -19426,18 +19008,13 @@
           <a:lstStyle/>
           <a:p>
             <a:r>
-              <a:rPr lang="de-DE" sz="2000" dirty="0" smtClean="0">
+              <a:rPr lang="de-DE" sz="2000" dirty="0">
                 <a:latin typeface="Open Sans" panose="020B0604020202020204" charset="0"/>
                 <a:ea typeface="Open Sans" panose="020B0604020202020204" charset="0"/>
                 <a:cs typeface="Open Sans" panose="020B0604020202020204" charset="0"/>
               </a:rPr>
               <a:t>Herausforderungen</a:t>
             </a:r>
-            <a:endParaRPr lang="de-DE" sz="2000" dirty="0">
-              <a:latin typeface="Open Sans" panose="020B0604020202020204" charset="0"/>
-              <a:ea typeface="Open Sans" panose="020B0604020202020204" charset="0"/>
-              <a:cs typeface="Open Sans" panose="020B0604020202020204" charset="0"/>
-            </a:endParaRPr>
           </a:p>
         </p:txBody>
       </p:sp>
@@ -19464,18 +19041,13 @@
           <a:lstStyle/>
           <a:p>
             <a:r>
-              <a:rPr lang="de-DE" sz="2000" dirty="0" smtClean="0">
+              <a:rPr lang="de-DE" sz="2000" dirty="0">
                 <a:latin typeface="Open Sans" panose="020B0604020202020204" charset="0"/>
                 <a:ea typeface="Open Sans" panose="020B0604020202020204" charset="0"/>
                 <a:cs typeface="Open Sans" panose="020B0604020202020204" charset="0"/>
               </a:rPr>
               <a:t>Alternativen</a:t>
             </a:r>
-            <a:endParaRPr lang="de-DE" sz="2000" dirty="0">
-              <a:latin typeface="Open Sans" panose="020B0604020202020204" charset="0"/>
-              <a:ea typeface="Open Sans" panose="020B0604020202020204" charset="0"/>
-              <a:cs typeface="Open Sans" panose="020B0604020202020204" charset="0"/>
-            </a:endParaRPr>
           </a:p>
         </p:txBody>
       </p:sp>
@@ -19502,7 +19074,7 @@
           <a:lstStyle/>
           <a:p>
             <a:r>
-              <a:rPr lang="de-DE" sz="1800" dirty="0" smtClean="0">
+              <a:rPr lang="de-DE" sz="1800" dirty="0">
                 <a:latin typeface="Open Sans" panose="020B0604020202020204" charset="0"/>
                 <a:ea typeface="Open Sans" panose="020B0604020202020204" charset="0"/>
                 <a:cs typeface="Open Sans" panose="020B0604020202020204" charset="0"/>
@@ -19512,7 +19084,7 @@
           </a:p>
           <a:p>
             <a:r>
-              <a:rPr lang="de-DE" sz="1800" dirty="0" smtClean="0">
+              <a:rPr lang="de-DE" sz="1800" dirty="0">
                 <a:latin typeface="Open Sans" panose="020B0604020202020204" charset="0"/>
                 <a:ea typeface="Open Sans" panose="020B0604020202020204" charset="0"/>
                 <a:cs typeface="Open Sans" panose="020B0604020202020204" charset="0"/>
@@ -19522,14 +19094,14 @@
           </a:p>
           <a:p>
             <a:r>
-              <a:rPr lang="de-DE" sz="1800" dirty="0" smtClean="0">
+              <a:rPr lang="de-DE" sz="1800" dirty="0">
                 <a:latin typeface="Open Sans" panose="020B0604020202020204" charset="0"/>
                 <a:ea typeface="Open Sans" panose="020B0604020202020204" charset="0"/>
                 <a:cs typeface="Open Sans" panose="020B0604020202020204" charset="0"/>
               </a:rPr>
               <a:t>Kontrollmöglichkeit</a:t>
             </a:r>
-            <a:endParaRPr lang="de-DE" dirty="0" smtClean="0">
+            <a:endParaRPr lang="de-DE" dirty="0">
               <a:latin typeface="Open Sans" panose="020B0604020202020204" charset="0"/>
               <a:ea typeface="Open Sans" panose="020B0604020202020204" charset="0"/>
               <a:cs typeface="Open Sans" panose="020B0604020202020204" charset="0"/>
@@ -19541,7 +19113,7 @@
               <a:buChar char="•"/>
             </a:pPr>
             <a:r>
-              <a:rPr lang="de-DE" sz="1800" dirty="0" smtClean="0">
+              <a:rPr lang="de-DE" sz="1800" dirty="0">
                 <a:latin typeface="Open Sans" panose="020B0604020202020204" charset="0"/>
                 <a:ea typeface="Open Sans" panose="020B0604020202020204" charset="0"/>
                 <a:cs typeface="Open Sans" panose="020B0604020202020204" charset="0"/>
@@ -19555,7 +19127,7 @@
               <a:buChar char="•"/>
             </a:pPr>
             <a:r>
-              <a:rPr lang="de-DE" sz="1800" dirty="0" smtClean="0">
+              <a:rPr lang="de-DE" sz="1800" dirty="0">
                 <a:latin typeface="Open Sans" panose="020B0604020202020204" charset="0"/>
                 <a:ea typeface="Open Sans" panose="020B0604020202020204" charset="0"/>
                 <a:cs typeface="Open Sans" panose="020B0604020202020204" charset="0"/>
@@ -19563,7 +19135,7 @@
               <a:t>spielerischeres Lösen der </a:t>
             </a:r>
             <a:r>
-              <a:rPr lang="de-DE" sz="1800" dirty="0" err="1" smtClean="0">
+              <a:rPr lang="de-DE" sz="1800" dirty="0" err="1">
                 <a:latin typeface="Open Sans" panose="020B0604020202020204" charset="0"/>
                 <a:ea typeface="Open Sans" panose="020B0604020202020204" charset="0"/>
                 <a:cs typeface="Open Sans" panose="020B0604020202020204" charset="0"/>
@@ -19571,7 +19143,7 @@
               <a:t>Aufg</a:t>
             </a:r>
             <a:r>
-              <a:rPr lang="de-DE" sz="1800" dirty="0" smtClean="0">
+              <a:rPr lang="de-DE" sz="1800" dirty="0">
                 <a:latin typeface="Open Sans" panose="020B0604020202020204" charset="0"/>
                 <a:ea typeface="Open Sans" panose="020B0604020202020204" charset="0"/>
                 <a:cs typeface="Open Sans" panose="020B0604020202020204" charset="0"/>
@@ -19585,7 +19157,7 @@
               <a:buChar char="•"/>
             </a:pPr>
             <a:r>
-              <a:rPr lang="de-DE" sz="1800" dirty="0" smtClean="0">
+              <a:rPr lang="de-DE" sz="1800" dirty="0">
                 <a:latin typeface="Open Sans" panose="020B0604020202020204" charset="0"/>
                 <a:ea typeface="Open Sans" panose="020B0604020202020204" charset="0"/>
                 <a:cs typeface="Open Sans" panose="020B0604020202020204" charset="0"/>
@@ -19599,7 +19171,7 @@
               <a:buChar char="•"/>
             </a:pPr>
             <a:r>
-              <a:rPr lang="de-DE" sz="1800" dirty="0" smtClean="0">
+              <a:rPr lang="de-DE" sz="1800" dirty="0">
                 <a:latin typeface="Open Sans" panose="020B0604020202020204" charset="0"/>
                 <a:ea typeface="Open Sans" panose="020B0604020202020204" charset="0"/>
                 <a:cs typeface="Open Sans" panose="020B0604020202020204" charset="0"/>
@@ -19636,7 +19208,7 @@
               <a:buChar char="•"/>
             </a:pPr>
             <a:r>
-              <a:rPr lang="de-DE" sz="1800" dirty="0" smtClean="0">
+              <a:rPr lang="de-DE" sz="1800" dirty="0">
                 <a:latin typeface="Open Sans" panose="020B0604020202020204" charset="0"/>
                 <a:ea typeface="Open Sans" panose="020B0604020202020204" charset="0"/>
                 <a:cs typeface="Open Sans" panose="020B0604020202020204" charset="0"/>
@@ -19650,7 +19222,7 @@
               <a:buChar char="•"/>
             </a:pPr>
             <a:r>
-              <a:rPr lang="de-DE" sz="1800" dirty="0" smtClean="0">
+              <a:rPr lang="de-DE" sz="1800" dirty="0">
                 <a:latin typeface="Open Sans" panose="020B0604020202020204" charset="0"/>
                 <a:ea typeface="Open Sans" panose="020B0604020202020204" charset="0"/>
                 <a:cs typeface="Open Sans" panose="020B0604020202020204" charset="0"/>
@@ -19661,7 +19233,7 @@
           <a:p>
             <a:pPr marL="177800"/>
             <a:r>
-              <a:rPr lang="de-DE" sz="1800" dirty="0" smtClean="0">
+              <a:rPr lang="de-DE" sz="1800" dirty="0">
                 <a:latin typeface="Open Sans" panose="020B0604020202020204" charset="0"/>
                 <a:ea typeface="Open Sans" panose="020B0604020202020204" charset="0"/>
                 <a:cs typeface="Open Sans" panose="020B0604020202020204" charset="0"/>
@@ -19698,7 +19270,7 @@
               <a:buChar char="•"/>
             </a:pPr>
             <a:r>
-              <a:rPr lang="de-DE" sz="1800" dirty="0" smtClean="0">
+              <a:rPr lang="de-DE" sz="1800" dirty="0">
                 <a:latin typeface="Open Sans" panose="020B0604020202020204" charset="0"/>
                 <a:ea typeface="Open Sans" panose="020B0604020202020204" charset="0"/>
                 <a:cs typeface="Open Sans" panose="020B0604020202020204" charset="0"/>
@@ -19718,13 +19290,6 @@
   <p:clrMapOvr>
     <a:masterClrMapping/>
   </p:clrMapOvr>
-  <p:timing>
-    <p:tnLst>
-      <p:par>
-        <p:cTn id="1" dur="indefinite" restart="never" nodeType="tmRoot"/>
-      </p:par>
-    </p:tnLst>
-  </p:timing>
 </p:sld>
 </file>
 
@@ -19818,11 +19383,11 @@
           <a:p>
             <a:pPr algn="ctr"/>
             <a:r>
-              <a:rPr lang="de-DE" dirty="0" smtClean="0"/>
+              <a:rPr lang="de-DE" dirty="0"/>
               <a:t>5 Mediendidaktische Überlegung – </a:t>
             </a:r>
             <a:r>
-              <a:rPr lang="de-DE" dirty="0" err="1" smtClean="0"/>
+              <a:rPr lang="de-DE" dirty="0" err="1"/>
               <a:t>GeoGebra</a:t>
             </a:r>
             <a:endParaRPr lang="de-DE" dirty="0"/>
@@ -19903,18 +19468,13 @@
           <a:lstStyle/>
           <a:p>
             <a:r>
-              <a:rPr lang="de-DE" sz="2000" dirty="0" smtClean="0">
+              <a:rPr lang="de-DE" sz="2000" dirty="0">
                 <a:latin typeface="Open Sans" panose="020B0604020202020204" charset="0"/>
                 <a:ea typeface="Open Sans" panose="020B0604020202020204" charset="0"/>
                 <a:cs typeface="Open Sans" panose="020B0604020202020204" charset="0"/>
               </a:rPr>
               <a:t>Funktion</a:t>
             </a:r>
-            <a:endParaRPr lang="de-DE" sz="2000" dirty="0">
-              <a:latin typeface="Open Sans" panose="020B0604020202020204" charset="0"/>
-              <a:ea typeface="Open Sans" panose="020B0604020202020204" charset="0"/>
-              <a:cs typeface="Open Sans" panose="020B0604020202020204" charset="0"/>
-            </a:endParaRPr>
           </a:p>
         </p:txBody>
       </p:sp>
@@ -19992,18 +19552,13 @@
           <a:lstStyle/>
           <a:p>
             <a:r>
-              <a:rPr lang="de-DE" sz="2000" dirty="0" smtClean="0">
+              <a:rPr lang="de-DE" sz="2000" dirty="0">
                 <a:latin typeface="Open Sans" panose="020B0604020202020204" charset="0"/>
                 <a:ea typeface="Open Sans" panose="020B0604020202020204" charset="0"/>
                 <a:cs typeface="Open Sans" panose="020B0604020202020204" charset="0"/>
               </a:rPr>
               <a:t>Herausforderungen</a:t>
             </a:r>
-            <a:endParaRPr lang="de-DE" sz="2000" dirty="0">
-              <a:latin typeface="Open Sans" panose="020B0604020202020204" charset="0"/>
-              <a:ea typeface="Open Sans" panose="020B0604020202020204" charset="0"/>
-              <a:cs typeface="Open Sans" panose="020B0604020202020204" charset="0"/>
-            </a:endParaRPr>
           </a:p>
         </p:txBody>
       </p:sp>
@@ -20030,18 +19585,13 @@
           <a:lstStyle/>
           <a:p>
             <a:r>
-              <a:rPr lang="de-DE" sz="2000" dirty="0" smtClean="0">
+              <a:rPr lang="de-DE" sz="2000" dirty="0">
                 <a:latin typeface="Open Sans" panose="020B0604020202020204" charset="0"/>
                 <a:ea typeface="Open Sans" panose="020B0604020202020204" charset="0"/>
                 <a:cs typeface="Open Sans" panose="020B0604020202020204" charset="0"/>
               </a:rPr>
               <a:t>Alternativen</a:t>
             </a:r>
-            <a:endParaRPr lang="de-DE" sz="2000" dirty="0">
-              <a:latin typeface="Open Sans" panose="020B0604020202020204" charset="0"/>
-              <a:ea typeface="Open Sans" panose="020B0604020202020204" charset="0"/>
-              <a:cs typeface="Open Sans" panose="020B0604020202020204" charset="0"/>
-            </a:endParaRPr>
           </a:p>
         </p:txBody>
       </p:sp>
@@ -20068,7 +19618,7 @@
           <a:lstStyle/>
           <a:p>
             <a:r>
-              <a:rPr lang="de-DE" sz="1800" dirty="0" smtClean="0">
+              <a:rPr lang="de-DE" sz="1800" dirty="0">
                 <a:latin typeface="Open Sans" panose="020B0604020202020204" charset="0"/>
                 <a:ea typeface="Open Sans" panose="020B0604020202020204" charset="0"/>
                 <a:cs typeface="Open Sans" panose="020B0604020202020204" charset="0"/>
@@ -20077,7 +19627,7 @@
             </a:r>
           </a:p>
           <a:p>
-            <a:endParaRPr lang="de-DE" dirty="0" smtClean="0">
+            <a:endParaRPr lang="de-DE" dirty="0">
               <a:latin typeface="Open Sans" panose="020B0604020202020204" charset="0"/>
               <a:ea typeface="Open Sans" panose="020B0604020202020204" charset="0"/>
               <a:cs typeface="Open Sans" panose="020B0604020202020204" charset="0"/>
@@ -20089,7 +19639,7 @@
               <a:buChar char="•"/>
             </a:pPr>
             <a:r>
-              <a:rPr lang="de-DE" sz="1800" dirty="0" smtClean="0">
+              <a:rPr lang="de-DE" sz="1800" dirty="0">
                 <a:latin typeface="Open Sans" panose="020B0604020202020204" charset="0"/>
                 <a:ea typeface="Open Sans" panose="020B0604020202020204" charset="0"/>
                 <a:cs typeface="Open Sans" panose="020B0604020202020204" charset="0"/>
@@ -20103,7 +19653,7 @@
               <a:buChar char="•"/>
             </a:pPr>
             <a:r>
-              <a:rPr lang="de-DE" sz="1800" dirty="0" smtClean="0">
+              <a:rPr lang="de-DE" sz="1800" dirty="0">
                 <a:latin typeface="Open Sans" panose="020B0604020202020204" charset="0"/>
                 <a:ea typeface="Open Sans" panose="020B0604020202020204" charset="0"/>
                 <a:cs typeface="Open Sans" panose="020B0604020202020204" charset="0"/>
@@ -20117,7 +19667,7 @@
               <a:buChar char="•"/>
             </a:pPr>
             <a:r>
-              <a:rPr lang="de-DE" sz="1800" dirty="0" smtClean="0">
+              <a:rPr lang="de-DE" sz="1800" dirty="0">
                 <a:latin typeface="Open Sans" panose="020B0604020202020204" charset="0"/>
                 <a:ea typeface="Open Sans" panose="020B0604020202020204" charset="0"/>
                 <a:cs typeface="Open Sans" panose="020B0604020202020204" charset="0"/>
@@ -20131,7 +19681,7 @@
               <a:buChar char="•"/>
             </a:pPr>
             <a:r>
-              <a:rPr lang="de-DE" sz="1800" dirty="0" smtClean="0">
+              <a:rPr lang="de-DE" sz="1800" dirty="0">
                 <a:latin typeface="Open Sans" panose="020B0604020202020204" charset="0"/>
                 <a:ea typeface="Open Sans" panose="020B0604020202020204" charset="0"/>
                 <a:cs typeface="Open Sans" panose="020B0604020202020204" charset="0"/>
@@ -20168,7 +19718,7 @@
               <a:buChar char="•"/>
             </a:pPr>
             <a:r>
-              <a:rPr lang="de-DE" sz="1800" dirty="0" smtClean="0">
+              <a:rPr lang="de-DE" sz="1800" dirty="0">
                 <a:latin typeface="Open Sans" panose="020B0604020202020204" charset="0"/>
                 <a:ea typeface="Open Sans" panose="020B0604020202020204" charset="0"/>
                 <a:cs typeface="Open Sans" panose="020B0604020202020204" charset="0"/>
@@ -20179,7 +19729,7 @@
           <a:p>
             <a:pPr marL="177800"/>
             <a:r>
-              <a:rPr lang="de-DE" sz="1800" dirty="0" smtClean="0">
+              <a:rPr lang="de-DE" sz="1800" dirty="0">
                 <a:latin typeface="Open Sans" panose="020B0604020202020204" charset="0"/>
                 <a:ea typeface="Open Sans" panose="020B0604020202020204" charset="0"/>
                 <a:cs typeface="Open Sans" panose="020B0604020202020204" charset="0"/>
@@ -20192,7 +19742,7 @@
               <a:buFont typeface="Arial" panose="020B0604020202020204" pitchFamily="34" charset="0"/>
               <a:buChar char="•"/>
             </a:pPr>
-            <a:endParaRPr lang="de-DE" sz="1800" dirty="0" smtClean="0">
+            <a:endParaRPr lang="de-DE" sz="1800" dirty="0">
               <a:latin typeface="Open Sans" panose="020B0604020202020204" charset="0"/>
               <a:ea typeface="Open Sans" panose="020B0604020202020204" charset="0"/>
               <a:cs typeface="Open Sans" panose="020B0604020202020204" charset="0"/>
@@ -20227,7 +19777,7 @@
               <a:buChar char="•"/>
             </a:pPr>
             <a:r>
-              <a:rPr lang="de-DE" sz="1800" dirty="0" smtClean="0">
+              <a:rPr lang="de-DE" sz="1800" dirty="0">
                 <a:latin typeface="Open Sans" panose="020B0604020202020204" charset="0"/>
                 <a:ea typeface="Open Sans" panose="020B0604020202020204" charset="0"/>
                 <a:cs typeface="Open Sans" panose="020B0604020202020204" charset="0"/>
@@ -20241,7 +19791,7 @@
               <a:buChar char="•"/>
             </a:pPr>
             <a:r>
-              <a:rPr lang="de-DE" sz="1800" dirty="0" smtClean="0">
+              <a:rPr lang="de-DE" sz="1800" dirty="0">
                 <a:latin typeface="Open Sans" panose="020B0604020202020204" charset="0"/>
                 <a:ea typeface="Open Sans" panose="020B0604020202020204" charset="0"/>
                 <a:cs typeface="Open Sans" panose="020B0604020202020204" charset="0"/>
@@ -20255,7 +19805,7 @@
               <a:buChar char="•"/>
             </a:pPr>
             <a:r>
-              <a:rPr lang="de-DE" sz="1800" dirty="0" smtClean="0">
+              <a:rPr lang="de-DE" sz="1800" dirty="0">
                 <a:latin typeface="Open Sans" panose="020B0604020202020204" charset="0"/>
                 <a:ea typeface="Open Sans" panose="020B0604020202020204" charset="0"/>
                 <a:cs typeface="Open Sans" panose="020B0604020202020204" charset="0"/>
@@ -20275,13 +19825,6 @@
   <p:clrMapOvr>
     <a:masterClrMapping/>
   </p:clrMapOvr>
-  <p:timing>
-    <p:tnLst>
-      <p:par>
-        <p:cTn id="1" dur="indefinite" restart="never" nodeType="tmRoot"/>
-      </p:par>
-    </p:tnLst>
-  </p:timing>
 </p:sld>
 </file>
 
@@ -20375,10 +19918,9 @@
           <a:p>
             <a:pPr algn="ctr"/>
             <a:r>
-              <a:rPr lang="de-DE" dirty="0" smtClean="0"/>
+              <a:rPr lang="de-DE" dirty="0"/>
               <a:t>5 Mediendidaktische Überlegung – GGB - Excel</a:t>
             </a:r>
-            <a:endParaRPr lang="de-DE" dirty="0"/>
           </a:p>
         </p:txBody>
       </p:sp>
@@ -20456,18 +19998,13 @@
           <a:lstStyle/>
           <a:p>
             <a:r>
-              <a:rPr lang="de-DE" sz="2000" dirty="0" smtClean="0">
+              <a:rPr lang="de-DE" sz="2000" dirty="0">
                 <a:latin typeface="Open Sans" panose="020B0604020202020204" charset="0"/>
                 <a:ea typeface="Open Sans" panose="020B0604020202020204" charset="0"/>
                 <a:cs typeface="Open Sans" panose="020B0604020202020204" charset="0"/>
               </a:rPr>
               <a:t>Funktion</a:t>
             </a:r>
-            <a:endParaRPr lang="de-DE" sz="2000" dirty="0">
-              <a:latin typeface="Open Sans" panose="020B0604020202020204" charset="0"/>
-              <a:ea typeface="Open Sans" panose="020B0604020202020204" charset="0"/>
-              <a:cs typeface="Open Sans" panose="020B0604020202020204" charset="0"/>
-            </a:endParaRPr>
           </a:p>
         </p:txBody>
       </p:sp>
@@ -20545,18 +20082,13 @@
           <a:lstStyle/>
           <a:p>
             <a:r>
-              <a:rPr lang="de-DE" sz="2000" dirty="0" smtClean="0">
+              <a:rPr lang="de-DE" sz="2000" dirty="0">
                 <a:latin typeface="Open Sans" panose="020B0604020202020204" charset="0"/>
                 <a:ea typeface="Open Sans" panose="020B0604020202020204" charset="0"/>
                 <a:cs typeface="Open Sans" panose="020B0604020202020204" charset="0"/>
               </a:rPr>
               <a:t>Herausforderungen</a:t>
             </a:r>
-            <a:endParaRPr lang="de-DE" sz="2000" dirty="0">
-              <a:latin typeface="Open Sans" panose="020B0604020202020204" charset="0"/>
-              <a:ea typeface="Open Sans" panose="020B0604020202020204" charset="0"/>
-              <a:cs typeface="Open Sans" panose="020B0604020202020204" charset="0"/>
-            </a:endParaRPr>
           </a:p>
         </p:txBody>
       </p:sp>
@@ -20583,18 +20115,13 @@
           <a:lstStyle/>
           <a:p>
             <a:r>
-              <a:rPr lang="de-DE" sz="2000" dirty="0" smtClean="0">
+              <a:rPr lang="de-DE" sz="2000" dirty="0">
                 <a:latin typeface="Open Sans" panose="020B0604020202020204" charset="0"/>
                 <a:ea typeface="Open Sans" panose="020B0604020202020204" charset="0"/>
                 <a:cs typeface="Open Sans" panose="020B0604020202020204" charset="0"/>
               </a:rPr>
               <a:t>Alternativen</a:t>
             </a:r>
-            <a:endParaRPr lang="de-DE" sz="2000" dirty="0">
-              <a:latin typeface="Open Sans" panose="020B0604020202020204" charset="0"/>
-              <a:ea typeface="Open Sans" panose="020B0604020202020204" charset="0"/>
-              <a:cs typeface="Open Sans" panose="020B0604020202020204" charset="0"/>
-            </a:endParaRPr>
           </a:p>
         </p:txBody>
       </p:sp>
@@ -20621,7 +20148,7 @@
           <a:lstStyle/>
           <a:p>
             <a:r>
-              <a:rPr lang="de-DE" sz="1800" dirty="0" smtClean="0">
+              <a:rPr lang="de-DE" sz="1800" dirty="0">
                 <a:latin typeface="Open Sans" panose="020B0604020202020204" charset="0"/>
                 <a:ea typeface="Open Sans" panose="020B0604020202020204" charset="0"/>
                 <a:cs typeface="Open Sans" panose="020B0604020202020204" charset="0"/>
@@ -20630,7 +20157,7 @@
             </a:r>
           </a:p>
           <a:p>
-            <a:endParaRPr lang="de-DE" dirty="0" smtClean="0">
+            <a:endParaRPr lang="de-DE" dirty="0">
               <a:latin typeface="Open Sans" panose="020B0604020202020204" charset="0"/>
               <a:ea typeface="Open Sans" panose="020B0604020202020204" charset="0"/>
               <a:cs typeface="Open Sans" panose="020B0604020202020204" charset="0"/>
@@ -20642,7 +20169,7 @@
               <a:buChar char="•"/>
             </a:pPr>
             <a:r>
-              <a:rPr lang="de-DE" sz="1800" dirty="0" smtClean="0">
+              <a:rPr lang="de-DE" sz="1800" dirty="0">
                 <a:latin typeface="Open Sans" panose="020B0604020202020204" charset="0"/>
                 <a:ea typeface="Open Sans" panose="020B0604020202020204" charset="0"/>
                 <a:cs typeface="Open Sans" panose="020B0604020202020204" charset="0"/>
@@ -20656,7 +20183,7 @@
               <a:buChar char="•"/>
             </a:pPr>
             <a:r>
-              <a:rPr lang="de-DE" sz="1800" dirty="0" smtClean="0">
+              <a:rPr lang="de-DE" sz="1800" dirty="0">
                 <a:latin typeface="Open Sans" panose="020B0604020202020204" charset="0"/>
                 <a:ea typeface="Open Sans" panose="020B0604020202020204" charset="0"/>
                 <a:cs typeface="Open Sans" panose="020B0604020202020204" charset="0"/>
@@ -20670,7 +20197,7 @@
               <a:buChar char="•"/>
             </a:pPr>
             <a:r>
-              <a:rPr lang="de-DE" sz="1800" dirty="0" err="1" smtClean="0">
+              <a:rPr lang="de-DE" sz="1800" dirty="0" err="1">
                 <a:latin typeface="Open Sans" panose="020B0604020202020204" charset="0"/>
                 <a:ea typeface="Open Sans" panose="020B0604020202020204" charset="0"/>
                 <a:cs typeface="Open Sans" panose="020B0604020202020204" charset="0"/>
@@ -20678,7 +20205,7 @@
               <a:t>tw</a:t>
             </a:r>
             <a:r>
-              <a:rPr lang="de-DE" sz="1800" dirty="0" smtClean="0">
+              <a:rPr lang="de-DE" sz="1800" dirty="0">
                 <a:latin typeface="Open Sans" panose="020B0604020202020204" charset="0"/>
                 <a:ea typeface="Open Sans" panose="020B0604020202020204" charset="0"/>
                 <a:cs typeface="Open Sans" panose="020B0604020202020204" charset="0"/>
@@ -20692,7 +20219,7 @@
               <a:buChar char="•"/>
             </a:pPr>
             <a:r>
-              <a:rPr lang="de-DE" sz="1800" dirty="0" smtClean="0">
+              <a:rPr lang="de-DE" sz="1800" dirty="0">
                 <a:latin typeface="Open Sans" panose="020B0604020202020204" charset="0"/>
                 <a:ea typeface="Open Sans" panose="020B0604020202020204" charset="0"/>
                 <a:cs typeface="Open Sans" panose="020B0604020202020204" charset="0"/>
@@ -20729,7 +20256,7 @@
               <a:buChar char="•"/>
             </a:pPr>
             <a:r>
-              <a:rPr lang="de-DE" sz="1800" dirty="0" smtClean="0">
+              <a:rPr lang="de-DE" sz="1800" dirty="0">
                 <a:latin typeface="Open Sans" panose="020B0604020202020204" charset="0"/>
                 <a:ea typeface="Open Sans" panose="020B0604020202020204" charset="0"/>
                 <a:cs typeface="Open Sans" panose="020B0604020202020204" charset="0"/>
@@ -20743,7 +20270,7 @@
               <a:buChar char="•"/>
             </a:pPr>
             <a:r>
-              <a:rPr lang="de-DE" sz="1800" dirty="0" smtClean="0">
+              <a:rPr lang="de-DE" sz="1800" dirty="0">
                 <a:latin typeface="Open Sans" panose="020B0604020202020204" charset="0"/>
                 <a:ea typeface="Open Sans" panose="020B0604020202020204" charset="0"/>
                 <a:cs typeface="Open Sans" panose="020B0604020202020204" charset="0"/>
@@ -20757,7 +20284,7 @@
               <a:buChar char="•"/>
             </a:pPr>
             <a:r>
-              <a:rPr lang="de-DE" sz="1800" dirty="0" smtClean="0">
+              <a:rPr lang="de-DE" sz="1800" dirty="0">
                 <a:latin typeface="Open Sans" panose="020B0604020202020204" charset="0"/>
                 <a:ea typeface="Open Sans" panose="020B0604020202020204" charset="0"/>
                 <a:cs typeface="Open Sans" panose="020B0604020202020204" charset="0"/>
@@ -20765,7 +20292,7 @@
               <a:t>Schreibweise 0</a:t>
             </a:r>
             <a:r>
-              <a:rPr lang="de-DE" sz="1800" b="1" dirty="0" smtClean="0">
+              <a:rPr lang="de-DE" sz="1800" b="1" dirty="0">
                 <a:latin typeface="Open Sans" panose="020B0604020202020204" charset="0"/>
                 <a:ea typeface="Open Sans" panose="020B0604020202020204" charset="0"/>
                 <a:cs typeface="Open Sans" panose="020B0604020202020204" charset="0"/>
@@ -20773,7 +20300,7 @@
               <a:t>.</a:t>
             </a:r>
             <a:r>
-              <a:rPr lang="de-DE" sz="1800" dirty="0" smtClean="0">
+              <a:rPr lang="de-DE" sz="1800" dirty="0">
                 <a:latin typeface="Open Sans" panose="020B0604020202020204" charset="0"/>
                 <a:ea typeface="Open Sans" panose="020B0604020202020204" charset="0"/>
                 <a:cs typeface="Open Sans" panose="020B0604020202020204" charset="0"/>
@@ -20810,7 +20337,7 @@
               <a:buChar char="•"/>
             </a:pPr>
             <a:r>
-              <a:rPr lang="de-DE" sz="1800" dirty="0" smtClean="0">
+              <a:rPr lang="de-DE" sz="1800" dirty="0">
                 <a:latin typeface="Open Sans" panose="020B0604020202020204" charset="0"/>
                 <a:ea typeface="Open Sans" panose="020B0604020202020204" charset="0"/>
                 <a:cs typeface="Open Sans" panose="020B0604020202020204" charset="0"/>
@@ -20824,7 +20351,7 @@
               <a:buChar char="•"/>
             </a:pPr>
             <a:r>
-              <a:rPr lang="de-DE" sz="1800" dirty="0" smtClean="0">
+              <a:rPr lang="de-DE" sz="1800" dirty="0">
                 <a:latin typeface="Open Sans" panose="020B0604020202020204" charset="0"/>
                 <a:ea typeface="Open Sans" panose="020B0604020202020204" charset="0"/>
                 <a:cs typeface="Open Sans" panose="020B0604020202020204" charset="0"/>
@@ -20844,13 +20371,6 @@
   <p:clrMapOvr>
     <a:masterClrMapping/>
   </p:clrMapOvr>
-  <p:timing>
-    <p:tnLst>
-      <p:par>
-        <p:cTn id="1" dur="indefinite" restart="never" nodeType="tmRoot"/>
-      </p:par>
-    </p:tnLst>
-  </p:timing>
 </p:sld>
 </file>
 
@@ -20944,11 +20464,11 @@
           <a:p>
             <a:pPr algn="ctr"/>
             <a:r>
-              <a:rPr lang="de-DE" dirty="0" smtClean="0"/>
+              <a:rPr lang="de-DE" dirty="0"/>
               <a:t>5 Mediendidaktische Überlegung – </a:t>
             </a:r>
             <a:r>
-              <a:rPr lang="de-DE" dirty="0" err="1" smtClean="0"/>
+              <a:rPr lang="de-DE" dirty="0" err="1"/>
               <a:t>Mentimeter</a:t>
             </a:r>
             <a:endParaRPr lang="de-DE" dirty="0"/>
@@ -21029,18 +20549,13 @@
           <a:lstStyle/>
           <a:p>
             <a:r>
-              <a:rPr lang="de-DE" sz="2000" dirty="0" smtClean="0">
+              <a:rPr lang="de-DE" sz="2000" dirty="0">
                 <a:latin typeface="Open Sans" panose="020B0604020202020204" charset="0"/>
                 <a:ea typeface="Open Sans" panose="020B0604020202020204" charset="0"/>
                 <a:cs typeface="Open Sans" panose="020B0604020202020204" charset="0"/>
               </a:rPr>
               <a:t>Funktion</a:t>
             </a:r>
-            <a:endParaRPr lang="de-DE" sz="2000" dirty="0">
-              <a:latin typeface="Open Sans" panose="020B0604020202020204" charset="0"/>
-              <a:ea typeface="Open Sans" panose="020B0604020202020204" charset="0"/>
-              <a:cs typeface="Open Sans" panose="020B0604020202020204" charset="0"/>
-            </a:endParaRPr>
           </a:p>
         </p:txBody>
       </p:sp>
@@ -21118,18 +20633,13 @@
           <a:lstStyle/>
           <a:p>
             <a:r>
-              <a:rPr lang="de-DE" sz="2000" dirty="0" smtClean="0">
+              <a:rPr lang="de-DE" sz="2000" dirty="0">
                 <a:latin typeface="Open Sans" panose="020B0604020202020204" charset="0"/>
                 <a:ea typeface="Open Sans" panose="020B0604020202020204" charset="0"/>
                 <a:cs typeface="Open Sans" panose="020B0604020202020204" charset="0"/>
               </a:rPr>
               <a:t>Herausforderungen</a:t>
             </a:r>
-            <a:endParaRPr lang="de-DE" sz="2000" dirty="0">
-              <a:latin typeface="Open Sans" panose="020B0604020202020204" charset="0"/>
-              <a:ea typeface="Open Sans" panose="020B0604020202020204" charset="0"/>
-              <a:cs typeface="Open Sans" panose="020B0604020202020204" charset="0"/>
-            </a:endParaRPr>
           </a:p>
         </p:txBody>
       </p:sp>
@@ -21156,18 +20666,13 @@
           <a:lstStyle/>
           <a:p>
             <a:r>
-              <a:rPr lang="de-DE" sz="2000" dirty="0" smtClean="0">
+              <a:rPr lang="de-DE" sz="2000" dirty="0">
                 <a:latin typeface="Open Sans" panose="020B0604020202020204" charset="0"/>
                 <a:ea typeface="Open Sans" panose="020B0604020202020204" charset="0"/>
                 <a:cs typeface="Open Sans" panose="020B0604020202020204" charset="0"/>
               </a:rPr>
               <a:t>Alternativen</a:t>
             </a:r>
-            <a:endParaRPr lang="de-DE" sz="2000" dirty="0">
-              <a:latin typeface="Open Sans" panose="020B0604020202020204" charset="0"/>
-              <a:ea typeface="Open Sans" panose="020B0604020202020204" charset="0"/>
-              <a:cs typeface="Open Sans" panose="020B0604020202020204" charset="0"/>
-            </a:endParaRPr>
           </a:p>
         </p:txBody>
       </p:sp>
@@ -21194,7 +20699,7 @@
           <a:lstStyle/>
           <a:p>
             <a:r>
-              <a:rPr lang="de-DE" sz="1800" dirty="0" smtClean="0">
+              <a:rPr lang="de-DE" sz="1800" dirty="0">
                 <a:latin typeface="Open Sans" panose="020B0604020202020204" charset="0"/>
                 <a:ea typeface="Open Sans" panose="020B0604020202020204" charset="0"/>
                 <a:cs typeface="Open Sans" panose="020B0604020202020204" charset="0"/>
@@ -21203,7 +20708,7 @@
             </a:r>
           </a:p>
           <a:p>
-            <a:endParaRPr lang="de-DE" dirty="0" smtClean="0">
+            <a:endParaRPr lang="de-DE" dirty="0">
               <a:latin typeface="Open Sans" panose="020B0604020202020204" charset="0"/>
               <a:ea typeface="Open Sans" panose="020B0604020202020204" charset="0"/>
               <a:cs typeface="Open Sans" panose="020B0604020202020204" charset="0"/>
@@ -21215,7 +20720,7 @@
               <a:buChar char="•"/>
             </a:pPr>
             <a:r>
-              <a:rPr lang="de-DE" sz="1800" dirty="0" smtClean="0">
+              <a:rPr lang="de-DE" sz="1800" dirty="0">
                 <a:latin typeface="Open Sans" panose="020B0604020202020204" charset="0"/>
                 <a:ea typeface="Open Sans" panose="020B0604020202020204" charset="0"/>
                 <a:cs typeface="Open Sans" panose="020B0604020202020204" charset="0"/>
@@ -21229,7 +20734,7 @@
               <a:buChar char="•"/>
             </a:pPr>
             <a:r>
-              <a:rPr lang="de-DE" sz="1800" dirty="0" smtClean="0">
+              <a:rPr lang="de-DE" sz="1800" dirty="0">
                 <a:latin typeface="Open Sans" panose="020B0604020202020204" charset="0"/>
                 <a:ea typeface="Open Sans" panose="020B0604020202020204" charset="0"/>
                 <a:cs typeface="Open Sans" panose="020B0604020202020204" charset="0"/>
@@ -21243,7 +20748,7 @@
               <a:buChar char="•"/>
             </a:pPr>
             <a:r>
-              <a:rPr lang="de-DE" sz="1800" dirty="0" smtClean="0">
+              <a:rPr lang="de-DE" sz="1800" dirty="0">
                 <a:latin typeface="Open Sans" panose="020B0604020202020204" charset="0"/>
                 <a:ea typeface="Open Sans" panose="020B0604020202020204" charset="0"/>
                 <a:cs typeface="Open Sans" panose="020B0604020202020204" charset="0"/>
@@ -21257,7 +20762,7 @@
               <a:buChar char="•"/>
             </a:pPr>
             <a:r>
-              <a:rPr lang="de-DE" sz="1800" dirty="0" smtClean="0">
+              <a:rPr lang="de-DE" sz="1800" dirty="0">
                 <a:latin typeface="Open Sans" panose="020B0604020202020204" charset="0"/>
                 <a:ea typeface="Open Sans" panose="020B0604020202020204" charset="0"/>
                 <a:cs typeface="Open Sans" panose="020B0604020202020204" charset="0"/>
@@ -21294,7 +20799,7 @@
               <a:buChar char="•"/>
             </a:pPr>
             <a:r>
-              <a:rPr lang="de-DE" sz="1800" dirty="0" smtClean="0">
+              <a:rPr lang="de-DE" sz="1800" dirty="0">
                 <a:latin typeface="Open Sans" panose="020B0604020202020204" charset="0"/>
                 <a:ea typeface="Open Sans" panose="020B0604020202020204" charset="0"/>
                 <a:cs typeface="Open Sans" panose="020B0604020202020204" charset="0"/>
@@ -21308,7 +20813,7 @@
               <a:buChar char="•"/>
             </a:pPr>
             <a:r>
-              <a:rPr lang="de-DE" sz="1800" dirty="0" smtClean="0">
+              <a:rPr lang="de-DE" sz="1800" dirty="0">
                 <a:latin typeface="Open Sans" panose="020B0604020202020204" charset="0"/>
                 <a:ea typeface="Open Sans" panose="020B0604020202020204" charset="0"/>
                 <a:cs typeface="Open Sans" panose="020B0604020202020204" charset="0"/>
@@ -21322,7 +20827,7 @@
               <a:buChar char="•"/>
             </a:pPr>
             <a:r>
-              <a:rPr lang="de-DE" sz="1800" dirty="0" smtClean="0">
+              <a:rPr lang="de-DE" sz="1800" dirty="0">
                 <a:latin typeface="Open Sans" panose="020B0604020202020204" charset="0"/>
                 <a:ea typeface="Open Sans" panose="020B0604020202020204" charset="0"/>
                 <a:cs typeface="Open Sans" panose="020B0604020202020204" charset="0"/>
@@ -21336,7 +20841,7 @@
               <a:buChar char="•"/>
             </a:pPr>
             <a:r>
-              <a:rPr lang="de-DE" sz="1800" dirty="0" smtClean="0">
+              <a:rPr lang="de-DE" sz="1800" dirty="0">
                 <a:latin typeface="Open Sans" panose="020B0604020202020204" charset="0"/>
                 <a:ea typeface="Open Sans" panose="020B0604020202020204" charset="0"/>
                 <a:cs typeface="Open Sans" panose="020B0604020202020204" charset="0"/>
@@ -21373,7 +20878,7 @@
               <a:buChar char="•"/>
             </a:pPr>
             <a:r>
-              <a:rPr lang="de-DE" sz="1800" dirty="0" smtClean="0">
+              <a:rPr lang="de-DE" sz="1800" dirty="0">
                 <a:latin typeface="Open Sans" panose="020B0604020202020204" charset="0"/>
                 <a:ea typeface="Open Sans" panose="020B0604020202020204" charset="0"/>
                 <a:cs typeface="Open Sans" panose="020B0604020202020204" charset="0"/>
@@ -21386,7 +20891,7 @@
               <a:buFont typeface="Arial" panose="020B0604020202020204" pitchFamily="34" charset="0"/>
               <a:buChar char="•"/>
             </a:pPr>
-            <a:endParaRPr lang="de-DE" sz="1800" dirty="0" smtClean="0">
+            <a:endParaRPr lang="de-DE" sz="1800" dirty="0">
               <a:latin typeface="Open Sans" panose="020B0604020202020204" charset="0"/>
               <a:ea typeface="Open Sans" panose="020B0604020202020204" charset="0"/>
               <a:cs typeface="Open Sans" panose="020B0604020202020204" charset="0"/>
@@ -21404,13 +20909,6 @@
   <p:clrMapOvr>
     <a:masterClrMapping/>
   </p:clrMapOvr>
-  <p:timing>
-    <p:tnLst>
-      <p:par>
-        <p:cTn id="1" dur="indefinite" restart="never" nodeType="tmRoot"/>
-      </p:par>
-    </p:tnLst>
-  </p:timing>
 </p:sld>
 </file>
 
@@ -21504,11 +21002,11 @@
           <a:p>
             <a:pPr algn="ctr"/>
             <a:r>
-              <a:rPr lang="de-DE" dirty="0" smtClean="0"/>
+              <a:rPr lang="de-DE" dirty="0"/>
               <a:t>5 Mediendidaktische Überlegung – </a:t>
             </a:r>
             <a:r>
-              <a:rPr lang="de-DE" dirty="0" err="1" smtClean="0"/>
+              <a:rPr lang="de-DE" dirty="0" err="1"/>
               <a:t>Canva</a:t>
             </a:r>
             <a:endParaRPr lang="de-DE" dirty="0"/>
@@ -21589,18 +21087,13 @@
           <a:lstStyle/>
           <a:p>
             <a:r>
-              <a:rPr lang="de-DE" sz="2000" dirty="0" smtClean="0">
+              <a:rPr lang="de-DE" sz="2000" dirty="0">
                 <a:latin typeface="Open Sans" panose="020B0604020202020204" charset="0"/>
                 <a:ea typeface="Open Sans" panose="020B0604020202020204" charset="0"/>
                 <a:cs typeface="Open Sans" panose="020B0604020202020204" charset="0"/>
               </a:rPr>
               <a:t>Funktion</a:t>
             </a:r>
-            <a:endParaRPr lang="de-DE" sz="2000" dirty="0">
-              <a:latin typeface="Open Sans" panose="020B0604020202020204" charset="0"/>
-              <a:ea typeface="Open Sans" panose="020B0604020202020204" charset="0"/>
-              <a:cs typeface="Open Sans" panose="020B0604020202020204" charset="0"/>
-            </a:endParaRPr>
           </a:p>
         </p:txBody>
       </p:sp>
@@ -21678,18 +21171,13 @@
           <a:lstStyle/>
           <a:p>
             <a:r>
-              <a:rPr lang="de-DE" sz="2000" dirty="0" smtClean="0">
+              <a:rPr lang="de-DE" sz="2000" dirty="0">
                 <a:latin typeface="Open Sans" panose="020B0604020202020204" charset="0"/>
                 <a:ea typeface="Open Sans" panose="020B0604020202020204" charset="0"/>
                 <a:cs typeface="Open Sans" panose="020B0604020202020204" charset="0"/>
               </a:rPr>
               <a:t>Herausforderungen</a:t>
             </a:r>
-            <a:endParaRPr lang="de-DE" sz="2000" dirty="0">
-              <a:latin typeface="Open Sans" panose="020B0604020202020204" charset="0"/>
-              <a:ea typeface="Open Sans" panose="020B0604020202020204" charset="0"/>
-              <a:cs typeface="Open Sans" panose="020B0604020202020204" charset="0"/>
-            </a:endParaRPr>
           </a:p>
         </p:txBody>
       </p:sp>
@@ -21716,18 +21204,13 @@
           <a:lstStyle/>
           <a:p>
             <a:r>
-              <a:rPr lang="de-DE" sz="2000" dirty="0" smtClean="0">
+              <a:rPr lang="de-DE" sz="2000" dirty="0">
                 <a:latin typeface="Open Sans" panose="020B0604020202020204" charset="0"/>
                 <a:ea typeface="Open Sans" panose="020B0604020202020204" charset="0"/>
                 <a:cs typeface="Open Sans" panose="020B0604020202020204" charset="0"/>
               </a:rPr>
               <a:t>Alternativen</a:t>
             </a:r>
-            <a:endParaRPr lang="de-DE" sz="2000" dirty="0">
-              <a:latin typeface="Open Sans" panose="020B0604020202020204" charset="0"/>
-              <a:ea typeface="Open Sans" panose="020B0604020202020204" charset="0"/>
-              <a:cs typeface="Open Sans" panose="020B0604020202020204" charset="0"/>
-            </a:endParaRPr>
           </a:p>
         </p:txBody>
       </p:sp>
@@ -21754,7 +21237,7 @@
           <a:lstStyle/>
           <a:p>
             <a:r>
-              <a:rPr lang="de-DE" sz="1800" dirty="0" smtClean="0">
+              <a:rPr lang="de-DE" sz="1800" dirty="0">
                 <a:latin typeface="Open Sans" panose="020B0604020202020204" charset="0"/>
                 <a:ea typeface="Open Sans" panose="020B0604020202020204" charset="0"/>
                 <a:cs typeface="Open Sans" panose="020B0604020202020204" charset="0"/>
@@ -21763,7 +21246,7 @@
             </a:r>
           </a:p>
           <a:p>
-            <a:endParaRPr lang="de-DE" dirty="0" smtClean="0">
+            <a:endParaRPr lang="de-DE" dirty="0">
               <a:latin typeface="Open Sans" panose="020B0604020202020204" charset="0"/>
               <a:ea typeface="Open Sans" panose="020B0604020202020204" charset="0"/>
               <a:cs typeface="Open Sans" panose="020B0604020202020204" charset="0"/>
@@ -21775,7 +21258,7 @@
               <a:buChar char="•"/>
             </a:pPr>
             <a:r>
-              <a:rPr lang="de-DE" sz="1800" dirty="0" smtClean="0">
+              <a:rPr lang="de-DE" sz="1800" dirty="0">
                 <a:latin typeface="Open Sans" panose="020B0604020202020204" charset="0"/>
                 <a:ea typeface="Open Sans" panose="020B0604020202020204" charset="0"/>
                 <a:cs typeface="Open Sans" panose="020B0604020202020204" charset="0"/>
@@ -21789,7 +21272,7 @@
               <a:buChar char="•"/>
             </a:pPr>
             <a:r>
-              <a:rPr lang="de-DE" sz="1800" dirty="0" smtClean="0">
+              <a:rPr lang="de-DE" sz="1800" dirty="0">
                 <a:latin typeface="Open Sans" panose="020B0604020202020204" charset="0"/>
                 <a:ea typeface="Open Sans" panose="020B0604020202020204" charset="0"/>
                 <a:cs typeface="Open Sans" panose="020B0604020202020204" charset="0"/>
@@ -21826,7 +21309,7 @@
               <a:buChar char="•"/>
             </a:pPr>
             <a:r>
-              <a:rPr lang="de-DE" sz="1800" dirty="0" smtClean="0">
+              <a:rPr lang="de-DE" sz="1800" dirty="0">
                 <a:latin typeface="Open Sans" panose="020B0604020202020204" charset="0"/>
                 <a:ea typeface="Open Sans" panose="020B0604020202020204" charset="0"/>
                 <a:cs typeface="Open Sans" panose="020B0604020202020204" charset="0"/>
@@ -21840,7 +21323,7 @@
               <a:buChar char="•"/>
             </a:pPr>
             <a:r>
-              <a:rPr lang="de-DE" sz="1800" dirty="0" smtClean="0">
+              <a:rPr lang="de-DE" sz="1800" dirty="0">
                 <a:latin typeface="Open Sans" panose="020B0604020202020204" charset="0"/>
                 <a:ea typeface="Open Sans" panose="020B0604020202020204" charset="0"/>
                 <a:cs typeface="Open Sans" panose="020B0604020202020204" charset="0"/>
@@ -21851,7 +21334,7 @@
           <a:p>
             <a:pPr marL="177800"/>
             <a:r>
-              <a:rPr lang="de-DE" sz="1800" dirty="0" smtClean="0">
+              <a:rPr lang="de-DE" sz="1800" dirty="0">
                 <a:latin typeface="Open Sans" panose="020B0604020202020204" charset="0"/>
                 <a:ea typeface="Open Sans" panose="020B0604020202020204" charset="0"/>
                 <a:cs typeface="Open Sans" panose="020B0604020202020204" charset="0"/>
@@ -21865,7 +21348,7 @@
               <a:buChar char="•"/>
             </a:pPr>
             <a:r>
-              <a:rPr lang="de-DE" sz="1800" dirty="0" smtClean="0">
+              <a:rPr lang="de-DE" sz="1800" dirty="0">
                 <a:latin typeface="Open Sans" panose="020B0604020202020204" charset="0"/>
                 <a:ea typeface="Open Sans" panose="020B0604020202020204" charset="0"/>
                 <a:cs typeface="Open Sans" panose="020B0604020202020204" charset="0"/>
@@ -21879,7 +21362,7 @@
               <a:buChar char="•"/>
             </a:pPr>
             <a:r>
-              <a:rPr lang="de-DE" sz="1800" dirty="0" smtClean="0">
+              <a:rPr lang="de-DE" sz="1800" dirty="0">
                 <a:latin typeface="Open Sans" panose="020B0604020202020204" charset="0"/>
                 <a:ea typeface="Open Sans" panose="020B0604020202020204" charset="0"/>
                 <a:cs typeface="Open Sans" panose="020B0604020202020204" charset="0"/>
@@ -21916,7 +21399,7 @@
               <a:buChar char="•"/>
             </a:pPr>
             <a:r>
-              <a:rPr lang="de-DE" sz="1800" dirty="0" smtClean="0">
+              <a:rPr lang="de-DE" sz="1800" dirty="0">
                 <a:latin typeface="Open Sans" panose="020B0604020202020204" charset="0"/>
                 <a:ea typeface="Open Sans" panose="020B0604020202020204" charset="0"/>
                 <a:cs typeface="Open Sans" panose="020B0604020202020204" charset="0"/>
@@ -21930,7 +21413,7 @@
               <a:buChar char="•"/>
             </a:pPr>
             <a:r>
-              <a:rPr lang="de-DE" sz="1800" dirty="0" smtClean="0">
+              <a:rPr lang="de-DE" sz="1800" dirty="0">
                 <a:latin typeface="Open Sans" panose="020B0604020202020204" charset="0"/>
                 <a:ea typeface="Open Sans" panose="020B0604020202020204" charset="0"/>
                 <a:cs typeface="Open Sans" panose="020B0604020202020204" charset="0"/>
@@ -21950,13 +21433,6 @@
   <p:clrMapOvr>
     <a:masterClrMapping/>
   </p:clrMapOvr>
-  <p:timing>
-    <p:tnLst>
-      <p:par>
-        <p:cTn id="1" dur="indefinite" restart="never" nodeType="tmRoot"/>
-      </p:par>
-    </p:tnLst>
-  </p:timing>
 </p:sld>
 </file>
 
@@ -22222,18 +21698,13 @@
                 </a:spcAft>
               </a:pPr>
               <a:r>
-                <a:rPr lang="de-DE" sz="2000" kern="1200" dirty="0" smtClean="0">
+                <a:rPr lang="de-DE" sz="2000" kern="1200" dirty="0">
                   <a:latin typeface="Open Sans" panose="020B0604020202020204" charset="0"/>
                   <a:ea typeface="Open Sans" panose="020B0604020202020204" charset="0"/>
                   <a:cs typeface="Open Sans" panose="020B0604020202020204" charset="0"/>
                 </a:rPr>
                 <a:t>Kompetenzen in der digitalen Welt</a:t>
               </a:r>
-              <a:endParaRPr lang="de-DE" sz="2000" kern="1200" dirty="0">
-                <a:latin typeface="Open Sans" panose="020B0604020202020204" charset="0"/>
-                <a:ea typeface="Open Sans" panose="020B0604020202020204" charset="0"/>
-                <a:cs typeface="Open Sans" panose="020B0604020202020204" charset="0"/>
-              </a:endParaRPr>
             </a:p>
           </p:txBody>
         </p:sp>
@@ -22362,18 +21833,13 @@
                 </a:spcAft>
               </a:pPr>
               <a:r>
-                <a:rPr lang="de-DE" sz="2000" kern="1200" dirty="0" smtClean="0">
+                <a:rPr lang="de-DE" sz="2000" kern="1200" dirty="0">
                   <a:latin typeface="Open Sans" panose="020B0604020202020204" charset="0"/>
                   <a:ea typeface="Open Sans" panose="020B0604020202020204" charset="0"/>
                   <a:cs typeface="Open Sans" panose="020B0604020202020204" charset="0"/>
                 </a:rPr>
                 <a:t>5. Problemlösen und Handeln</a:t>
               </a:r>
-              <a:endParaRPr lang="de-DE" sz="2000" kern="1200" dirty="0">
-                <a:latin typeface="Open Sans" panose="020B0604020202020204" charset="0"/>
-                <a:ea typeface="Open Sans" panose="020B0604020202020204" charset="0"/>
-                <a:cs typeface="Open Sans" panose="020B0604020202020204" charset="0"/>
-              </a:endParaRPr>
             </a:p>
           </p:txBody>
         </p:sp>
@@ -22496,18 +21962,13 @@
                 </a:spcAft>
               </a:pPr>
               <a:r>
-                <a:rPr lang="de-DE" sz="2000" kern="1200" dirty="0" smtClean="0">
+                <a:rPr lang="de-DE" sz="2000" kern="1200" dirty="0">
                   <a:latin typeface="Open Sans" panose="020B0604020202020204" charset="0"/>
                   <a:ea typeface="Open Sans" panose="020B0604020202020204" charset="0"/>
                   <a:cs typeface="Open Sans" panose="020B0604020202020204" charset="0"/>
                 </a:rPr>
                 <a:t>5.4 Digitale Werkzeuge und Medien zum Lernen, Arbeiten und Problemlösen nutzen</a:t>
               </a:r>
-              <a:endParaRPr lang="de-DE" sz="2000" kern="1200" dirty="0">
-                <a:latin typeface="Open Sans" panose="020B0604020202020204" charset="0"/>
-                <a:ea typeface="Open Sans" panose="020B0604020202020204" charset="0"/>
-                <a:cs typeface="Open Sans" panose="020B0604020202020204" charset="0"/>
-              </a:endParaRPr>
             </a:p>
           </p:txBody>
         </p:sp>
@@ -22581,13 +22042,6 @@
   <p:clrMapOvr>
     <a:masterClrMapping/>
   </p:clrMapOvr>
-  <p:timing>
-    <p:tnLst>
-      <p:par>
-        <p:cTn id="1" dur="indefinite" restart="never" nodeType="tmRoot"/>
-      </p:par>
-    </p:tnLst>
-  </p:timing>
 </p:sld>
 </file>
 
@@ -22697,13 +22151,6 @@
   <p:clrMapOvr>
     <a:masterClrMapping/>
   </p:clrMapOvr>
-  <p:timing>
-    <p:tnLst>
-      <p:par>
-        <p:cTn id="1" dur="indefinite" restart="never" nodeType="tmRoot"/>
-      </p:par>
-    </p:tnLst>
-  </p:timing>
 </p:sld>
 </file>
 
@@ -22760,10 +22207,10 @@
               <a:buNone/>
             </a:pPr>
             <a:r>
-              <a:rPr lang="de-DE" b="1" dirty="0" err="1" smtClean="0"/>
+              <a:rPr lang="de-DE" b="1" dirty="0" err="1"/>
               <a:t>Canva</a:t>
             </a:r>
-            <a:endParaRPr lang="de-DE" b="1" dirty="0" smtClean="0"/>
+            <a:endParaRPr lang="de-DE" b="1" dirty="0"/>
           </a:p>
           <a:p>
             <a:pPr marL="360363" lvl="0" indent="0" algn="l" rtl="0">
@@ -22777,10 +22224,9 @@
               <a:buNone/>
             </a:pPr>
             <a:r>
-              <a:rPr lang="de-DE" dirty="0" smtClean="0"/>
+              <a:rPr lang="de-DE" dirty="0"/>
               <a:t>Zugriffsschwierigkeiten</a:t>
             </a:r>
-            <a:endParaRPr lang="de-DE" dirty="0"/>
           </a:p>
           <a:p>
             <a:pPr marL="360363" lvl="0" indent="0" algn="l" rtl="0">
@@ -22794,7 +22240,7 @@
               <a:buNone/>
             </a:pPr>
             <a:r>
-              <a:rPr lang="de-DE" dirty="0" smtClean="0"/>
+              <a:rPr lang="de-DE" dirty="0"/>
               <a:t>Fremde Inhalte auf Board -&gt; SuS?</a:t>
             </a:r>
           </a:p>
@@ -22810,7 +22256,7 @@
               <a:buNone/>
             </a:pPr>
             <a:r>
-              <a:rPr lang="de-DE" dirty="0" smtClean="0"/>
+              <a:rPr lang="de-DE" dirty="0"/>
               <a:t>Ergebnisse der SuS mündlich sammeln, ohne Bilder</a:t>
             </a:r>
           </a:p>
@@ -22826,10 +22272,9 @@
               <a:buNone/>
             </a:pPr>
             <a:r>
-              <a:rPr lang="de-DE" dirty="0" smtClean="0"/>
+              <a:rPr lang="de-DE" dirty="0"/>
               <a:t>Werte auf Tafel festhalten</a:t>
             </a:r>
-            <a:endParaRPr lang="de-DE" dirty="0"/>
           </a:p>
           <a:p>
             <a:pPr marL="898525" lvl="0" indent="0" algn="l" rtl="0">
@@ -22849,37 +22294,34 @@
               <a:buNone/>
             </a:pPr>
             <a:r>
-              <a:rPr lang="de-DE" b="1" dirty="0" smtClean="0"/>
+              <a:rPr lang="de-DE" b="1" dirty="0"/>
               <a:t>Zeitplan</a:t>
             </a:r>
-            <a:endParaRPr lang="de-DE" b="1" dirty="0"/>
           </a:p>
           <a:p>
             <a:pPr marL="360363" lvl="0" indent="0">
               <a:buNone/>
             </a:pPr>
             <a:r>
-              <a:rPr lang="de-DE" dirty="0" smtClean="0"/>
+              <a:rPr lang="de-DE" dirty="0"/>
               <a:t>Verzug bei Übungsphase zu Niemeyer</a:t>
             </a:r>
-            <a:endParaRPr lang="de-DE" dirty="0"/>
           </a:p>
           <a:p>
             <a:pPr marL="360363" lvl="0" indent="0">
               <a:buNone/>
             </a:pPr>
             <a:r>
-              <a:rPr lang="de-DE" dirty="0" smtClean="0"/>
+              <a:rPr lang="de-DE" dirty="0"/>
               <a:t>Schwierigkeit Prozentrechnung</a:t>
             </a:r>
-            <a:endParaRPr lang="de-DE" dirty="0"/>
           </a:p>
           <a:p>
             <a:pPr marL="898525" lvl="0" indent="0">
               <a:buNone/>
             </a:pPr>
             <a:r>
-              <a:rPr lang="de-DE" dirty="0" smtClean="0"/>
+              <a:rPr lang="de-DE" dirty="0"/>
               <a:t>Einzelne Erklärungen, Erklärung für ganzen Kurs</a:t>
             </a:r>
           </a:p>
@@ -22888,10 +22330,9 @@
               <a:buNone/>
             </a:pPr>
             <a:r>
-              <a:rPr lang="de-DE" dirty="0" smtClean="0"/>
+              <a:rPr lang="de-DE" dirty="0"/>
               <a:t>Kürzung Diskussionspart</a:t>
             </a:r>
-            <a:endParaRPr lang="de-DE" dirty="0"/>
           </a:p>
         </p:txBody>
       </p:sp>
@@ -22931,15 +22372,7 @@
             </a:pPr>
             <a:r>
               <a:rPr lang="de" dirty="0"/>
-              <a:t>6 Reflektion - Planung </a:t>
-            </a:r>
-            <a:r>
-              <a:rPr lang="de" dirty="0" smtClean="0"/>
-              <a:t>vs. </a:t>
-            </a:r>
-            <a:r>
-              <a:rPr lang="de" dirty="0"/>
-              <a:t>Realisierung</a:t>
+              <a:t>6 Reflektion - Planung vs. Realisierung</a:t>
             </a:r>
             <a:endParaRPr dirty="0"/>
           </a:p>
@@ -23059,13 +22492,6 @@
   <p:clrMapOvr>
     <a:masterClrMapping/>
   </p:clrMapOvr>
-  <p:timing>
-    <p:tnLst>
-      <p:par>
-        <p:cTn id="1" dur="indefinite" restart="never" nodeType="tmRoot"/>
-      </p:par>
-    </p:tnLst>
-  </p:timing>
 </p:sld>
 </file>
 
@@ -23123,15 +22549,7 @@
             </a:pPr>
             <a:r>
               <a:rPr lang="de" b="1" dirty="0"/>
-              <a:t>Verwendung durch </a:t>
-            </a:r>
-            <a:r>
-              <a:rPr lang="de" b="1" dirty="0" smtClean="0"/>
-              <a:t>andere </a:t>
-            </a:r>
-            <a:r>
-              <a:rPr lang="de" b="1" dirty="0"/>
-              <a:t>Lehrkräfte ohne Anmeldung</a:t>
+              <a:t>Verwendung durch andere Lehrkräfte ohne Anmeldung</a:t>
             </a:r>
             <a:endParaRPr b="1" dirty="0"/>
           </a:p>
@@ -23147,7 +22565,7 @@
               <a:buNone/>
             </a:pPr>
             <a:r>
-              <a:rPr lang="de" dirty="0" smtClean="0"/>
+              <a:rPr lang="de" dirty="0"/>
               <a:t>kein Mentimeter</a:t>
             </a:r>
           </a:p>
@@ -23163,14 +22581,13 @@
               <a:buNone/>
             </a:pPr>
             <a:r>
-              <a:rPr lang="de-DE" dirty="0" smtClean="0"/>
+              <a:rPr lang="de-DE" dirty="0"/>
               <a:t>K</a:t>
             </a:r>
             <a:r>
-              <a:rPr lang="de" dirty="0" smtClean="0"/>
+              <a:rPr lang="de" dirty="0"/>
               <a:t>ein Canva</a:t>
             </a:r>
-            <a:endParaRPr lang="de" dirty="0" smtClean="0"/>
           </a:p>
         </p:txBody>
       </p:sp>
@@ -23304,13 +22721,6 @@
   <p:clrMapOvr>
     <a:masterClrMapping/>
   </p:clrMapOvr>
-  <p:timing>
-    <p:tnLst>
-      <p:par>
-        <p:cTn id="1" dur="indefinite" restart="never" nodeType="tmRoot"/>
-      </p:par>
-    </p:tnLst>
-  </p:timing>
 </p:sld>
 </file>
 
@@ -23416,13 +22826,6 @@
   <p:clrMapOvr>
     <a:masterClrMapping/>
   </p:clrMapOvr>
-  <p:timing>
-    <p:tnLst>
-      <p:par>
-        <p:cTn id="1" dur="indefinite" restart="never" nodeType="tmRoot"/>
-      </p:par>
-    </p:tnLst>
-  </p:timing>
 </p:sld>
 </file>
 
@@ -23479,7 +22882,7 @@
               <a:buNone/>
             </a:pPr>
             <a:r>
-              <a:rPr lang="de-DE" b="1" dirty="0" smtClean="0"/>
+              <a:rPr lang="de-DE" b="1" dirty="0"/>
               <a:t>Zusätzliche Hinweise und Tipps</a:t>
             </a:r>
             <a:endParaRPr b="1" dirty="0"/>
@@ -23489,7 +22892,7 @@
               <a:buNone/>
             </a:pPr>
             <a:r>
-              <a:rPr lang="de-DE" dirty="0" smtClean="0"/>
+              <a:rPr lang="de-DE" dirty="0"/>
               <a:t>Hervorheben der Information</a:t>
             </a:r>
           </a:p>
@@ -23498,18 +22901,9 @@
               <a:buNone/>
             </a:pPr>
             <a:r>
-              <a:rPr lang="de" dirty="0" smtClean="0"/>
-              <a:t>Erklärung </a:t>
-            </a:r>
-            <a:r>
               <a:rPr lang="de" dirty="0"/>
-              <a:t>und Beispiel zur </a:t>
-            </a:r>
-            <a:r>
-              <a:rPr lang="de" dirty="0" smtClean="0"/>
-              <a:t>Prozentrechnung</a:t>
-            </a:r>
-            <a:endParaRPr lang="de" dirty="0"/>
+              <a:t>Erklärung und Beispiel zur Prozentrechnung</a:t>
+            </a:r>
           </a:p>
         </p:txBody>
       </p:sp>
@@ -23698,13 +23092,6 @@
   <p:clrMapOvr>
     <a:masterClrMapping/>
   </p:clrMapOvr>
-  <p:timing>
-    <p:tnLst>
-      <p:par>
-        <p:cTn id="1" dur="indefinite" restart="never" nodeType="tmRoot"/>
-      </p:par>
-    </p:tnLst>
-  </p:timing>
 </p:sld>
 </file>
 
@@ -23761,7 +23148,7 @@
               <a:buNone/>
             </a:pPr>
             <a:r>
-              <a:rPr lang="de" b="1" dirty="0" smtClean="0"/>
+              <a:rPr lang="de" b="1" dirty="0"/>
               <a:t>Weitere Zeitpuffer</a:t>
             </a:r>
             <a:endParaRPr b="1" dirty="0"/>
@@ -23778,10 +23165,10 @@
               <a:buNone/>
             </a:pPr>
             <a:r>
-              <a:rPr lang="de-DE" dirty="0" smtClean="0"/>
+              <a:rPr lang="de-DE" dirty="0"/>
               <a:t>Für Schnelle bei Niemeyer</a:t>
             </a:r>
-            <a:endParaRPr lang="de" dirty="0" smtClean="0"/>
+            <a:endParaRPr lang="de" dirty="0"/>
           </a:p>
         </p:txBody>
       </p:sp>
@@ -23920,13 +23307,6 @@
   <p:clrMapOvr>
     <a:masterClrMapping/>
   </p:clrMapOvr>
-  <p:timing>
-    <p:tnLst>
-      <p:par>
-        <p:cTn id="1" dur="indefinite" restart="never" nodeType="tmRoot"/>
-      </p:par>
-    </p:tnLst>
-  </p:timing>
 </p:sld>
 </file>
 
@@ -23983,7 +23363,7 @@
               <a:buNone/>
             </a:pPr>
             <a:r>
-              <a:rPr lang="de" b="1" dirty="0" smtClean="0"/>
+              <a:rPr lang="de" b="1" dirty="0"/>
               <a:t>Ablaufanpassung</a:t>
             </a:r>
             <a:endParaRPr b="1" dirty="0"/>
@@ -24000,7 +23380,7 @@
               <a:buNone/>
             </a:pPr>
             <a:r>
-              <a:rPr lang="de-DE" dirty="0" smtClean="0"/>
+              <a:rPr lang="de-DE" dirty="0"/>
               <a:t>Qualitätskriterien im LSG</a:t>
             </a:r>
           </a:p>
@@ -24016,10 +23396,10 @@
               <a:buNone/>
             </a:pPr>
             <a:r>
-              <a:rPr lang="de-DE" dirty="0" smtClean="0"/>
+              <a:rPr lang="de-DE" dirty="0"/>
               <a:t>Vorüberlegung Paradoxon direkt</a:t>
             </a:r>
-            <a:endParaRPr lang="de" dirty="0" smtClean="0"/>
+            <a:endParaRPr lang="de" dirty="0"/>
           </a:p>
         </p:txBody>
       </p:sp>
@@ -24162,7 +23542,7 @@
           <a:p>
             <a:pPr algn="ctr"/>
             <a:r>
-              <a:rPr lang="de-DE" dirty="0" err="1" smtClean="0">
+              <a:rPr lang="de-DE" dirty="0" err="1">
                 <a:solidFill>
                   <a:sysClr val="windowText" lastClr="000000"/>
                 </a:solidFill>
@@ -24173,7 +23553,7 @@
               <a:t>Aufg</a:t>
             </a:r>
             <a:r>
-              <a:rPr lang="de-DE" dirty="0" smtClean="0">
+              <a:rPr lang="de-DE" dirty="0">
                 <a:solidFill>
                   <a:sysClr val="windowText" lastClr="000000"/>
                 </a:solidFill>
@@ -24183,14 +23563,6 @@
               </a:rPr>
               <a:t>. Qualitätskriterien</a:t>
             </a:r>
-            <a:endParaRPr lang="de-DE" dirty="0">
-              <a:solidFill>
-                <a:sysClr val="windowText" lastClr="000000"/>
-              </a:solidFill>
-              <a:latin typeface="Open Sans" panose="020B0604020202020204" charset="0"/>
-              <a:ea typeface="Open Sans" panose="020B0604020202020204" charset="0"/>
-              <a:cs typeface="Open Sans" panose="020B0604020202020204" charset="0"/>
-            </a:endParaRPr>
           </a:p>
         </p:txBody>
       </p:sp>
@@ -24239,7 +23611,7 @@
           <a:p>
             <a:pPr algn="ctr"/>
             <a:r>
-              <a:rPr lang="de-DE" dirty="0" err="1" smtClean="0">
+              <a:rPr lang="de-DE" dirty="0" err="1">
                 <a:solidFill>
                   <a:sysClr val="windowText" lastClr="000000"/>
                 </a:solidFill>
@@ -24250,7 +23622,7 @@
               <a:t>Aufg</a:t>
             </a:r>
             <a:r>
-              <a:rPr lang="de-DE" dirty="0" smtClean="0">
+              <a:rPr lang="de-DE" dirty="0">
                 <a:solidFill>
                   <a:sysClr val="windowText" lastClr="000000"/>
                 </a:solidFill>
@@ -24260,14 +23632,6 @@
               </a:rPr>
               <a:t>. Eigenes Verfahren</a:t>
             </a:r>
-            <a:endParaRPr lang="de-DE" dirty="0">
-              <a:solidFill>
-                <a:sysClr val="windowText" lastClr="000000"/>
-              </a:solidFill>
-              <a:latin typeface="Open Sans" panose="020B0604020202020204" charset="0"/>
-              <a:ea typeface="Open Sans" panose="020B0604020202020204" charset="0"/>
-              <a:cs typeface="Open Sans" panose="020B0604020202020204" charset="0"/>
-            </a:endParaRPr>
           </a:p>
         </p:txBody>
       </p:sp>
@@ -24316,7 +23680,7 @@
           <a:p>
             <a:pPr algn="ctr"/>
             <a:r>
-              <a:rPr lang="de-DE" dirty="0" smtClean="0">
+              <a:rPr lang="de-DE" dirty="0">
                 <a:solidFill>
                   <a:sysClr val="windowText" lastClr="000000"/>
                 </a:solidFill>
@@ -24326,14 +23690,6 @@
               </a:rPr>
               <a:t>Sammeln Qualitätskriterien</a:t>
             </a:r>
-            <a:endParaRPr lang="de-DE" dirty="0">
-              <a:solidFill>
-                <a:sysClr val="windowText" lastClr="000000"/>
-              </a:solidFill>
-              <a:latin typeface="Open Sans" panose="020B0604020202020204" charset="0"/>
-              <a:ea typeface="Open Sans" panose="020B0604020202020204" charset="0"/>
-              <a:cs typeface="Open Sans" panose="020B0604020202020204" charset="0"/>
-            </a:endParaRPr>
           </a:p>
         </p:txBody>
       </p:sp>
@@ -24418,7 +23774,7 @@
           <a:p>
             <a:pPr algn="ctr"/>
             <a:r>
-              <a:rPr lang="de-DE" dirty="0" smtClean="0">
+              <a:rPr lang="de-DE" dirty="0">
                 <a:solidFill>
                   <a:sysClr val="windowText" lastClr="000000"/>
                 </a:solidFill>
@@ -24428,14 +23784,6 @@
               </a:rPr>
               <a:t>Sammeln Verfahren</a:t>
             </a:r>
-            <a:endParaRPr lang="de-DE" dirty="0">
-              <a:solidFill>
-                <a:sysClr val="windowText" lastClr="000000"/>
-              </a:solidFill>
-              <a:latin typeface="Open Sans" panose="020B0604020202020204" charset="0"/>
-              <a:ea typeface="Open Sans" panose="020B0604020202020204" charset="0"/>
-              <a:cs typeface="Open Sans" panose="020B0604020202020204" charset="0"/>
-            </a:endParaRPr>
           </a:p>
         </p:txBody>
       </p:sp>
@@ -24487,7 +23835,7 @@
           <a:p>
             <a:pPr algn="ctr"/>
             <a:r>
-              <a:rPr lang="de-DE" dirty="0" err="1" smtClean="0">
+              <a:rPr lang="de-DE" dirty="0" err="1">
                 <a:solidFill>
                   <a:schemeClr val="bg1">
                     <a:lumMod val="65000"/>
@@ -24500,7 +23848,7 @@
               <a:t>Aufg</a:t>
             </a:r>
             <a:r>
-              <a:rPr lang="de-DE" dirty="0" smtClean="0">
+              <a:rPr lang="de-DE" dirty="0">
                 <a:solidFill>
                   <a:schemeClr val="bg1">
                     <a:lumMod val="65000"/>
@@ -24512,16 +23860,6 @@
               </a:rPr>
               <a:t>. Qualitätskriterien</a:t>
             </a:r>
-            <a:endParaRPr lang="de-DE" dirty="0">
-              <a:solidFill>
-                <a:schemeClr val="bg1">
-                  <a:lumMod val="65000"/>
-                </a:schemeClr>
-              </a:solidFill>
-              <a:latin typeface="Open Sans" panose="020B0604020202020204" charset="0"/>
-              <a:ea typeface="Open Sans" panose="020B0604020202020204" charset="0"/>
-              <a:cs typeface="Open Sans" panose="020B0604020202020204" charset="0"/>
-            </a:endParaRPr>
           </a:p>
         </p:txBody>
       </p:sp>
@@ -24570,7 +23908,7 @@
           <a:p>
             <a:pPr algn="ctr"/>
             <a:r>
-              <a:rPr lang="de-DE" dirty="0" err="1" smtClean="0">
+              <a:rPr lang="de-DE" dirty="0" err="1">
                 <a:solidFill>
                   <a:sysClr val="windowText" lastClr="000000"/>
                 </a:solidFill>
@@ -24581,7 +23919,7 @@
               <a:t>Aufg</a:t>
             </a:r>
             <a:r>
-              <a:rPr lang="de-DE" dirty="0" smtClean="0">
+              <a:rPr lang="de-DE" dirty="0">
                 <a:solidFill>
                   <a:sysClr val="windowText" lastClr="000000"/>
                 </a:solidFill>
@@ -24591,14 +23929,6 @@
               </a:rPr>
               <a:t>. Eigenes Verfahren</a:t>
             </a:r>
-            <a:endParaRPr lang="de-DE" dirty="0">
-              <a:solidFill>
-                <a:sysClr val="windowText" lastClr="000000"/>
-              </a:solidFill>
-              <a:latin typeface="Open Sans" panose="020B0604020202020204" charset="0"/>
-              <a:ea typeface="Open Sans" panose="020B0604020202020204" charset="0"/>
-              <a:cs typeface="Open Sans" panose="020B0604020202020204" charset="0"/>
-            </a:endParaRPr>
           </a:p>
         </p:txBody>
       </p:sp>
@@ -24647,7 +23977,7 @@
           <a:p>
             <a:pPr algn="ctr"/>
             <a:r>
-              <a:rPr lang="de-DE" dirty="0" smtClean="0">
+              <a:rPr lang="de-DE" dirty="0">
                 <a:solidFill>
                   <a:sysClr val="windowText" lastClr="000000"/>
                 </a:solidFill>
@@ -24657,14 +23987,6 @@
               </a:rPr>
               <a:t>Sammeln Qualitätskriterien</a:t>
             </a:r>
-            <a:endParaRPr lang="de-DE" dirty="0">
-              <a:solidFill>
-                <a:sysClr val="windowText" lastClr="000000"/>
-              </a:solidFill>
-              <a:latin typeface="Open Sans" panose="020B0604020202020204" charset="0"/>
-              <a:ea typeface="Open Sans" panose="020B0604020202020204" charset="0"/>
-              <a:cs typeface="Open Sans" panose="020B0604020202020204" charset="0"/>
-            </a:endParaRPr>
           </a:p>
         </p:txBody>
       </p:sp>
@@ -24713,7 +24035,7 @@
           <a:p>
             <a:pPr algn="ctr"/>
             <a:r>
-              <a:rPr lang="de-DE" dirty="0" smtClean="0">
+              <a:rPr lang="de-DE" dirty="0">
                 <a:solidFill>
                   <a:sysClr val="windowText" lastClr="000000"/>
                 </a:solidFill>
@@ -24723,14 +24045,6 @@
               </a:rPr>
               <a:t>Sammeln Verfahren</a:t>
             </a:r>
-            <a:endParaRPr lang="de-DE" dirty="0">
-              <a:solidFill>
-                <a:sysClr val="windowText" lastClr="000000"/>
-              </a:solidFill>
-              <a:latin typeface="Open Sans" panose="020B0604020202020204" charset="0"/>
-              <a:ea typeface="Open Sans" panose="020B0604020202020204" charset="0"/>
-              <a:cs typeface="Open Sans" panose="020B0604020202020204" charset="0"/>
-            </a:endParaRPr>
           </a:p>
         </p:txBody>
       </p:sp>
@@ -24940,13 +24254,6 @@
   <p:clrMapOvr>
     <a:masterClrMapping/>
   </p:clrMapOvr>
-  <p:timing>
-    <p:tnLst>
-      <p:par>
-        <p:cTn id="1" dur="indefinite" restart="never" nodeType="tmRoot"/>
-      </p:par>
-    </p:tnLst>
-  </p:timing>
 </p:sld>
 </file>
 
@@ -25003,7 +24310,7 @@
               <a:buChar char="●"/>
             </a:pPr>
             <a:r>
-              <a:rPr lang="de" dirty="0" smtClean="0"/>
+              <a:rPr lang="de" dirty="0"/>
               <a:t>Einstieg mit Mentimeter-Umfrage über Handy</a:t>
             </a:r>
           </a:p>
@@ -25019,7 +24326,7 @@
               <a:buNone/>
             </a:pPr>
             <a:r>
-              <a:rPr lang="de" dirty="0" smtClean="0"/>
+              <a:rPr lang="de" dirty="0"/>
               <a:t>Handys direkt wieder wegpacken</a:t>
             </a:r>
           </a:p>
@@ -25035,7 +24342,7 @@
               <a:buChar char="●"/>
             </a:pPr>
             <a:r>
-              <a:rPr lang="de" dirty="0" smtClean="0"/>
+              <a:rPr lang="de" dirty="0"/>
               <a:t>Alle am Laptop beschäftigt, während Erklärungen</a:t>
             </a:r>
           </a:p>
@@ -25051,7 +24358,7 @@
               <a:buNone/>
             </a:pPr>
             <a:r>
-              <a:rPr lang="de" dirty="0" smtClean="0"/>
+              <a:rPr lang="de" dirty="0"/>
               <a:t>Erst Vorstellen, dann Laptop öffnen</a:t>
             </a:r>
           </a:p>
@@ -25067,10 +24374,9 @@
               <a:buNone/>
             </a:pPr>
             <a:r>
-              <a:rPr lang="de" dirty="0" smtClean="0"/>
+              <a:rPr lang="de" dirty="0"/>
               <a:t>Laptop schließen, wenn Aufgabe fertig</a:t>
             </a:r>
-            <a:endParaRPr lang="de" dirty="0"/>
           </a:p>
           <a:p>
             <a:pPr marL="177800" lvl="0" indent="-177800" algn="l" rtl="0">
@@ -25084,7 +24390,7 @@
               <a:buChar char="●"/>
             </a:pPr>
             <a:r>
-              <a:rPr lang="de" dirty="0" smtClean="0"/>
+              <a:rPr lang="de" dirty="0"/>
               <a:t>Diskussion schwer zu folgen</a:t>
             </a:r>
           </a:p>
@@ -25100,10 +24406,9 @@
               <a:buNone/>
             </a:pPr>
             <a:r>
-              <a:rPr lang="de" dirty="0" smtClean="0"/>
+              <a:rPr lang="de" dirty="0"/>
               <a:t>Notieren, wer für was plädiert</a:t>
             </a:r>
-            <a:endParaRPr lang="de" dirty="0"/>
           </a:p>
           <a:p>
             <a:pPr marL="177800" lvl="0" indent="-177800" algn="l" rtl="0">
@@ -25117,7 +24422,7 @@
               <a:buChar char="●"/>
             </a:pPr>
             <a:r>
-              <a:rPr lang="de" dirty="0" smtClean="0"/>
+              <a:rPr lang="de" dirty="0"/>
               <a:t>Differenzierung nur „Für Schnelle“</a:t>
             </a:r>
           </a:p>
@@ -25133,7 +24438,7 @@
               <a:buNone/>
             </a:pPr>
             <a:r>
-              <a:rPr lang="de" dirty="0" smtClean="0"/>
+              <a:rPr lang="de" dirty="0"/>
               <a:t>Ideen?</a:t>
             </a:r>
           </a:p>
@@ -25175,11 +24480,7 @@
             </a:pPr>
             <a:r>
               <a:rPr lang="de" dirty="0"/>
-              <a:t>6 </a:t>
-            </a:r>
-            <a:r>
-              <a:rPr lang="de" dirty="0" smtClean="0"/>
-              <a:t>Reflektion – Für‘s nächste Mal.</a:t>
+              <a:t>6 Reflektion – Für‘s nächste Mal.</a:t>
             </a:r>
             <a:endParaRPr dirty="0"/>
           </a:p>
@@ -25398,13 +24699,6 @@
   <p:clrMapOvr>
     <a:masterClrMapping/>
   </p:clrMapOvr>
-  <p:timing>
-    <p:tnLst>
-      <p:par>
-        <p:cTn id="1" dur="indefinite" restart="never" nodeType="tmRoot"/>
-      </p:par>
-    </p:tnLst>
-  </p:timing>
 </p:sld>
 </file>
 
@@ -25490,7 +24784,7 @@
               <a:buChar char="●"/>
             </a:pPr>
             <a:r>
-              <a:rPr lang="de" dirty="0" smtClean="0"/>
+              <a:rPr lang="de" dirty="0"/>
               <a:t>SuS motiviert</a:t>
             </a:r>
           </a:p>
@@ -25506,7 +24800,7 @@
               <a:buChar char="●"/>
             </a:pPr>
             <a:r>
-              <a:rPr lang="de" dirty="0" smtClean="0"/>
+              <a:rPr lang="de" dirty="0"/>
               <a:t>Diskussion super</a:t>
             </a:r>
           </a:p>
@@ -25522,7 +24816,7 @@
               <a:buChar char="●"/>
             </a:pPr>
             <a:r>
-              <a:rPr lang="de" dirty="0" smtClean="0"/>
+              <a:rPr lang="de" dirty="0"/>
               <a:t>Verlust der SuS bei Prozentrechnung -&gt; schwer wieder zu kriegen</a:t>
             </a:r>
             <a:endParaRPr dirty="0"/>
@@ -25565,11 +24859,7 @@
             </a:pPr>
             <a:r>
               <a:rPr lang="de" dirty="0"/>
-              <a:t>6 </a:t>
-            </a:r>
-            <a:r>
-              <a:rPr lang="de" dirty="0" smtClean="0"/>
-              <a:t>Reflektion – Eindruck des Workshops</a:t>
+              <a:t>6 Reflektion – Eindruck des Workshops</a:t>
             </a:r>
             <a:endParaRPr dirty="0"/>
           </a:p>
@@ -25585,13 +24875,6 @@
   <p:clrMapOvr>
     <a:masterClrMapping/>
   </p:clrMapOvr>
-  <p:timing>
-    <p:tnLst>
-      <p:par>
-        <p:cTn id="1" dur="indefinite" restart="never" nodeType="tmRoot"/>
-      </p:par>
-    </p:tnLst>
-  </p:timing>
 </p:sld>
 </file>
 
@@ -25649,36 +24932,24 @@
             </a:pPr>
             <a:r>
               <a:rPr lang="de" dirty="0"/>
-              <a:t>PingPong Spiel zwischen Digital und </a:t>
-            </a:r>
-            <a:r>
-              <a:rPr lang="de" dirty="0" smtClean="0"/>
-              <a:t>Analog ist </a:t>
-            </a:r>
+              <a:t>PingPong Spiel zwischen Digital und Analog ist wichtig! </a:t>
+            </a:r>
+            <a:endParaRPr dirty="0"/>
+          </a:p>
+          <a:p>
+            <a:pPr marL="0" lvl="0" indent="0" algn="l" rtl="0">
+              <a:spcBef>
+                <a:spcPts val="0"/>
+              </a:spcBef>
+              <a:spcAft>
+                <a:spcPts val="0"/>
+              </a:spcAft>
+              <a:buSzPts val="1800"/>
+              <a:buNone/>
+            </a:pPr>
             <a:r>
               <a:rPr lang="de" dirty="0"/>
-              <a:t>wichtig! </a:t>
-            </a:r>
-            <a:endParaRPr dirty="0"/>
-          </a:p>
-          <a:p>
-            <a:pPr marL="0" lvl="0" indent="0" algn="l" rtl="0">
-              <a:spcBef>
-                <a:spcPts val="0"/>
-              </a:spcBef>
-              <a:spcAft>
-                <a:spcPts val="0"/>
-              </a:spcAft>
-              <a:buSzPts val="1800"/>
-              <a:buNone/>
-            </a:pPr>
-            <a:r>
-              <a:rPr lang="de" dirty="0"/>
-              <a:t>Digital ist </a:t>
-            </a:r>
-            <a:r>
-              <a:rPr lang="de" dirty="0" smtClean="0"/>
-              <a:t>anstrengend</a:t>
+              <a:t>Digital ist anstrengend</a:t>
             </a:r>
           </a:p>
           <a:p>
@@ -25693,7 +24964,7 @@
               <a:buChar char="●"/>
             </a:pPr>
             <a:r>
-              <a:rPr lang="de" dirty="0" smtClean="0"/>
+              <a:rPr lang="de" dirty="0"/>
               <a:t>Wechsel zwischen den Medien -&gt; zu zweit gut machbar</a:t>
             </a:r>
           </a:p>
@@ -25713,7 +24984,7 @@
               <a:t>n</a:t>
             </a:r>
             <a:r>
-              <a:rPr lang="de" dirty="0" smtClean="0"/>
+              <a:rPr lang="de" dirty="0"/>
               <a:t>eue Umgebung nicht immer intuitiv</a:t>
             </a:r>
           </a:p>
@@ -25729,11 +25000,11 @@
               <a:buChar char="●"/>
             </a:pPr>
             <a:r>
-              <a:rPr lang="de-DE" dirty="0" smtClean="0"/>
+              <a:rPr lang="de-DE" dirty="0"/>
               <a:t>F</a:t>
             </a:r>
             <a:r>
-              <a:rPr lang="de" dirty="0" smtClean="0"/>
+              <a:rPr lang="de" dirty="0"/>
               <a:t>ehlerlösung</a:t>
             </a:r>
           </a:p>
@@ -25749,7 +25020,7 @@
               <a:buChar char="●"/>
             </a:pPr>
             <a:r>
-              <a:rPr lang="de" dirty="0" smtClean="0"/>
+              <a:rPr lang="de" dirty="0"/>
               <a:t>spontane Reaktion auf Probleme</a:t>
             </a:r>
           </a:p>
@@ -25765,7 +25036,7 @@
               <a:buChar char="●"/>
             </a:pPr>
             <a:r>
-              <a:rPr lang="de" dirty="0" smtClean="0"/>
+              <a:rPr lang="de" dirty="0"/>
               <a:t>unflexiblere Gestaltung des Unterrichts</a:t>
             </a:r>
             <a:endParaRPr dirty="0"/>
@@ -25808,11 +25079,7 @@
             </a:pPr>
             <a:r>
               <a:rPr lang="de" dirty="0"/>
-              <a:t>6 Reflektion </a:t>
-            </a:r>
-            <a:r>
-              <a:rPr lang="de" dirty="0" smtClean="0"/>
-              <a:t>– Was wir mitnehmen.</a:t>
+              <a:t>6 Reflektion – Was wir mitnehmen.</a:t>
             </a:r>
             <a:endParaRPr dirty="0"/>
           </a:p>
@@ -25823,13 +25090,6 @@
   <p:clrMapOvr>
     <a:masterClrMapping/>
   </p:clrMapOvr>
-  <p:timing>
-    <p:tnLst>
-      <p:par>
-        <p:cTn id="1" dur="indefinite" restart="never" nodeType="tmRoot"/>
-      </p:par>
-    </p:tnLst>
-  </p:timing>
 </p:sld>
 </file>
 
@@ -25935,13 +25195,6 @@
   <p:clrMapOvr>
     <a:masterClrMapping/>
   </p:clrMapOvr>
-  <p:timing>
-    <p:tnLst>
-      <p:par>
-        <p:cTn id="1" dur="indefinite" restart="never" nodeType="tmRoot"/>
-      </p:par>
-    </p:tnLst>
-  </p:timing>
 </p:sld>
 </file>
 
@@ -26016,11 +25269,7 @@
             </a:pPr>
             <a:r>
               <a:rPr lang="de" dirty="0"/>
-              <a:t>Hat </a:t>
-            </a:r>
-            <a:r>
-              <a:rPr lang="de" dirty="0" smtClean="0"/>
-              <a:t>im Großen funktioniert</a:t>
+              <a:t>Hat im Großen funktioniert</a:t>
             </a:r>
             <a:endParaRPr dirty="0"/>
           </a:p>
@@ -26036,7 +25285,7 @@
               <a:buChar char="●"/>
             </a:pPr>
             <a:r>
-              <a:rPr lang="de" dirty="0" smtClean="0"/>
+              <a:rPr lang="de" dirty="0"/>
               <a:t>Tools neu / besser kennengelernt:</a:t>
             </a:r>
           </a:p>
@@ -26052,12 +25301,8 @@
               <a:buNone/>
             </a:pPr>
             <a:r>
-              <a:rPr lang="de" dirty="0" smtClean="0"/>
-              <a:t>Notion</a:t>
-            </a:r>
-            <a:r>
               <a:rPr lang="de" dirty="0"/>
-              <a:t>, H5P, Geogebra, Menti</a:t>
+              <a:t>Notion, H5P, Geogebra, Menti</a:t>
             </a:r>
             <a:endParaRPr dirty="0"/>
           </a:p>
@@ -26074,27 +25319,7 @@
             </a:pPr>
             <a:r>
               <a:rPr lang="de" dirty="0"/>
-              <a:t>PingPong Spiel zwischen </a:t>
-            </a:r>
-            <a:r>
-              <a:rPr lang="de" dirty="0"/>
-              <a:t>D</a:t>
-            </a:r>
-            <a:r>
-              <a:rPr lang="de" dirty="0" smtClean="0"/>
-              <a:t>igital </a:t>
-            </a:r>
-            <a:r>
-              <a:rPr lang="de" dirty="0"/>
-              <a:t>und </a:t>
-            </a:r>
-            <a:r>
-              <a:rPr lang="de" dirty="0" smtClean="0"/>
-              <a:t>A</a:t>
-            </a:r>
-            <a:r>
-              <a:rPr lang="de" dirty="0" smtClean="0"/>
-              <a:t>nalog </a:t>
+              <a:t>PingPong Spiel zwischen Digital und Analog </a:t>
             </a:r>
             <a:endParaRPr dirty="0"/>
           </a:p>
@@ -26110,7 +25335,7 @@
               <a:buChar char="●"/>
             </a:pPr>
             <a:r>
-              <a:rPr lang="de" dirty="0" smtClean="0"/>
+              <a:rPr lang="de" dirty="0"/>
               <a:t>Nicht zu viele verschiedene digitale Medien</a:t>
             </a:r>
           </a:p>
@@ -26126,7 +25351,7 @@
               <a:buNone/>
             </a:pPr>
             <a:r>
-              <a:rPr lang="de" dirty="0" smtClean="0">
+              <a:rPr lang="de" dirty="0">
                 <a:solidFill>
                   <a:srgbClr val="FF0000"/>
                 </a:solidFill>
@@ -26188,13 +25413,6 @@
   <p:clrMapOvr>
     <a:masterClrMapping/>
   </p:clrMapOvr>
-  <p:timing>
-    <p:tnLst>
-      <p:par>
-        <p:cTn id="1" dur="indefinite" restart="never" nodeType="tmRoot"/>
-      </p:par>
-    </p:tnLst>
-  </p:timing>
 </p:sld>
 </file>
 
@@ -26271,13 +25489,6 @@
   <p:clrMapOvr>
     <a:masterClrMapping/>
   </p:clrMapOvr>
-  <p:timing>
-    <p:tnLst>
-      <p:par>
-        <p:cTn id="1" dur="indefinite" restart="never" nodeType="tmRoot"/>
-      </p:par>
-    </p:tnLst>
-  </p:timing>
 </p:sld>
 </file>
 
@@ -26490,13 +25701,6 @@
   <p:clrMapOvr>
     <a:masterClrMapping/>
   </p:clrMapOvr>
-  <p:timing>
-    <p:tnLst>
-      <p:par>
-        <p:cTn id="1" dur="indefinite" restart="never" nodeType="tmRoot"/>
-      </p:par>
-    </p:tnLst>
-  </p:timing>
 </p:sld>
 </file>
 
@@ -26690,7 +25894,7 @@
                 </a:spcAft>
               </a:pPr>
               <a:r>
-                <a:rPr lang="de-DE" sz="3600" kern="1200" dirty="0" smtClean="0">
+                <a:rPr lang="de-DE" sz="3600" kern="1200" dirty="0">
                   <a:latin typeface="Open Sans" panose="020B0604020202020204" charset="0"/>
                   <a:ea typeface="Open Sans" panose="020B0604020202020204" charset="0"/>
                   <a:cs typeface="Open Sans" panose="020B0604020202020204" charset="0"/>
@@ -26867,7 +26071,7 @@
                 </a:spcAft>
               </a:pPr>
               <a:r>
-                <a:rPr lang="de" sz="2000" kern="1200" dirty="0" smtClean="0">
+                <a:rPr lang="de" sz="2000" kern="1200" dirty="0">
                   <a:latin typeface="Open Sans" panose="020B0604020202020204" charset="0"/>
                   <a:ea typeface="Open Sans" panose="020B0604020202020204" charset="0"/>
                   <a:cs typeface="Open Sans" panose="020B0604020202020204" charset="0"/>
@@ -26876,7 +26080,7 @@
                 <a:t>Die Lernenden kennen verschiedene Modelle für die Sitzverteilung bei Verhältniswahlen und können diese </a:t>
               </a:r>
               <a:r>
-                <a:rPr lang="de-DE" sz="2000" kern="1200" dirty="0" smtClean="0">
+                <a:rPr lang="de-DE" sz="2000" kern="1200" dirty="0">
                   <a:latin typeface="Open Sans" panose="020B0604020202020204" charset="0"/>
                   <a:ea typeface="Open Sans" panose="020B0604020202020204" charset="0"/>
                   <a:cs typeface="Open Sans" panose="020B0604020202020204" charset="0"/>
@@ -26885,7 +26089,7 @@
                 <a:t>auf Beispiele anwenden.</a:t>
               </a:r>
               <a:r>
-                <a:rPr lang="de" sz="2000" kern="1200" dirty="0" smtClean="0">
+                <a:rPr lang="de" sz="2000" kern="1200" dirty="0">
                   <a:latin typeface="Open Sans" panose="020B0604020202020204" charset="0"/>
                   <a:ea typeface="Open Sans" panose="020B0604020202020204" charset="0"/>
                   <a:cs typeface="Open Sans" panose="020B0604020202020204" charset="0"/>
@@ -27063,7 +26267,7 @@
                 </a:spcAft>
               </a:pPr>
               <a:r>
-                <a:rPr lang="de" sz="2000" kern="1200" dirty="0" smtClean="0">
+                <a:rPr lang="de" sz="2000" kern="1200" dirty="0">
                   <a:latin typeface="Open Sans" panose="020B0604020202020204" charset="0"/>
                   <a:ea typeface="Open Sans" panose="020B0604020202020204" charset="0"/>
                   <a:cs typeface="Open Sans" panose="020B0604020202020204" charset="0"/>
@@ -27071,12 +26275,6 @@
                 </a:rPr>
                 <a:t>Die Lernenden können die Sitzverteilungsverfahren anhand geeigneter Qualitätskriterien vergleichen und die gleichwertige mathematische Korrektheit dieser Modelle erkennen.</a:t>
               </a:r>
-              <a:endParaRPr lang="de" sz="2000" kern="1200" dirty="0" smtClean="0">
-                <a:latin typeface="Open Sans" panose="020B0604020202020204" charset="0"/>
-                <a:ea typeface="Open Sans" panose="020B0604020202020204" charset="0"/>
-                <a:cs typeface="Open Sans" panose="020B0604020202020204" charset="0"/>
-                <a:sym typeface="Nunito"/>
-              </a:endParaRPr>
             </a:p>
           </p:txBody>
         </p:sp>
@@ -27091,13 +26289,6 @@
   <p:clrMapOvr>
     <a:masterClrMapping/>
   </p:clrMapOvr>
-  <p:timing>
-    <p:tnLst>
-      <p:par>
-        <p:cTn id="1" dur="indefinite" restart="never" nodeType="tmRoot"/>
-      </p:par>
-    </p:tnLst>
-  </p:timing>
 </p:sld>
 </file>
 
@@ -27291,18 +26482,13 @@
                 </a:spcAft>
               </a:pPr>
               <a:r>
-                <a:rPr lang="de-DE" sz="3600" kern="1200" dirty="0" smtClean="0">
+                <a:rPr lang="de-DE" sz="3600" kern="1200" dirty="0">
                   <a:latin typeface="Open Sans" panose="020B0604020202020204" charset="0"/>
                   <a:ea typeface="Open Sans" panose="020B0604020202020204" charset="0"/>
                   <a:cs typeface="Open Sans" panose="020B0604020202020204" charset="0"/>
                 </a:rPr>
                 <a:t>Grobziele</a:t>
               </a:r>
-              <a:endParaRPr lang="de-DE" sz="3600" kern="1200" dirty="0">
-                <a:latin typeface="Open Sans" panose="020B0604020202020204" charset="0"/>
-                <a:ea typeface="Open Sans" panose="020B0604020202020204" charset="0"/>
-                <a:cs typeface="Open Sans" panose="020B0604020202020204" charset="0"/>
-              </a:endParaRPr>
             </a:p>
           </p:txBody>
         </p:sp>
@@ -27468,7 +26654,7 @@
                 </a:spcAft>
               </a:pPr>
               <a:r>
-                <a:rPr lang="de" sz="900" kern="1200" dirty="0" smtClean="0">
+                <a:rPr lang="de" sz="900" kern="1200" dirty="0">
                   <a:latin typeface="Open Sans" panose="020B0604020202020204" charset="0"/>
                   <a:ea typeface="Open Sans" panose="020B0604020202020204" charset="0"/>
                   <a:cs typeface="Open Sans" panose="020B0604020202020204" charset="0"/>
@@ -27477,7 +26663,7 @@
                 <a:t>Die Lernenden kennen verschiedene Modelle für die Sitzverteilung bei Verhältnis-wahlen und können diese </a:t>
               </a:r>
               <a:r>
-                <a:rPr lang="de-DE" sz="900" kern="1200" dirty="0" smtClean="0">
+                <a:rPr lang="de-DE" sz="900" kern="1200" dirty="0">
                   <a:solidFill>
                     <a:srgbClr val="424242"/>
                   </a:solidFill>
@@ -27489,7 +26675,7 @@
                 <a:t>auf Beispiele anwenden.</a:t>
               </a:r>
               <a:r>
-                <a:rPr lang="de" sz="900" kern="1200" dirty="0" smtClean="0">
+                <a:rPr lang="de" sz="900" kern="1200" dirty="0">
                   <a:latin typeface="Open Sans" panose="020B0604020202020204" charset="0"/>
                   <a:ea typeface="Open Sans" panose="020B0604020202020204" charset="0"/>
                   <a:cs typeface="Open Sans" panose="020B0604020202020204" charset="0"/>
@@ -27663,7 +26849,7 @@
                 </a:spcAft>
               </a:pPr>
               <a:r>
-                <a:rPr lang="de" sz="900" kern="1200" dirty="0" smtClean="0">
+                <a:rPr lang="de" sz="900" kern="1200" dirty="0">
                   <a:latin typeface="Open Sans" panose="020B0604020202020204" charset="0"/>
                   <a:ea typeface="Open Sans" panose="020B0604020202020204" charset="0"/>
                   <a:cs typeface="Open Sans" panose="020B0604020202020204" charset="0"/>
@@ -27671,12 +26857,6 @@
                 </a:rPr>
                 <a:t>Die Lernenden können die Sitzverteilungs-verfahren anhand geeigneter Qualitätskriterien vergleichen und die gleichwertige mathematische Korrektheit dieser Modelle erkennen.</a:t>
               </a:r>
-              <a:endParaRPr lang="de" sz="900" kern="1200" dirty="0" smtClean="0">
-                <a:latin typeface="Open Sans" panose="020B0604020202020204" charset="0"/>
-                <a:ea typeface="Open Sans" panose="020B0604020202020204" charset="0"/>
-                <a:cs typeface="Open Sans" panose="020B0604020202020204" charset="0"/>
-                <a:sym typeface="Nunito"/>
-              </a:endParaRPr>
             </a:p>
           </p:txBody>
         </p:sp>
@@ -27839,18 +27019,13 @@
                 </a:spcAft>
               </a:pPr>
               <a:r>
-                <a:rPr lang="de-DE" sz="3200" kern="1200" dirty="0" smtClean="0">
+                <a:rPr lang="de-DE" sz="3200" kern="1200" dirty="0">
                   <a:latin typeface="Open Sans" panose="020B0604020202020204" charset="0"/>
                   <a:ea typeface="Open Sans" panose="020B0604020202020204" charset="0"/>
                   <a:cs typeface="Open Sans" panose="020B0604020202020204" charset="0"/>
                 </a:rPr>
                 <a:t>Feinziele</a:t>
               </a:r>
-              <a:endParaRPr lang="de-DE" sz="3200" kern="1200" dirty="0">
-                <a:latin typeface="Open Sans" panose="020B0604020202020204" charset="0"/>
-                <a:ea typeface="Open Sans" panose="020B0604020202020204" charset="0"/>
-                <a:cs typeface="Open Sans" panose="020B0604020202020204" charset="0"/>
-              </a:endParaRPr>
             </a:p>
           </p:txBody>
         </p:sp>
@@ -27925,7 +27100,7 @@
                 </a:spcAft>
               </a:pPr>
               <a:r>
-                <a:rPr lang="de-DE" kern="1200" dirty="0" smtClean="0">
+                <a:rPr lang="de-DE" kern="1200" dirty="0">
                   <a:latin typeface="Open Sans" panose="020B0604020202020204" charset="0"/>
                   <a:ea typeface="Open Sans" panose="020B0604020202020204" charset="0"/>
                   <a:cs typeface="Open Sans" panose="020B0604020202020204" charset="0"/>
@@ -27933,12 +27108,6 @@
                 </a:rPr>
                 <a:t>Die Lernenden können Wahlsysteme nennen und kennen Qualitätskriterien für Sitzverteilungsverfahren.</a:t>
               </a:r>
-              <a:endParaRPr lang="de-DE" kern="1200" dirty="0">
-                <a:latin typeface="Open Sans" panose="020B0604020202020204" charset="0"/>
-                <a:ea typeface="Open Sans" panose="020B0604020202020204" charset="0"/>
-                <a:cs typeface="Open Sans" panose="020B0604020202020204" charset="0"/>
-                <a:sym typeface="Nunito"/>
-              </a:endParaRPr>
             </a:p>
           </p:txBody>
         </p:sp>
@@ -28013,7 +27182,7 @@
                 </a:spcAft>
               </a:pPr>
               <a:r>
-                <a:rPr lang="de-DE" kern="1200" dirty="0" smtClean="0">
+                <a:rPr lang="de-DE" kern="1200" dirty="0">
                   <a:latin typeface="Open Sans" panose="020B0604020202020204" charset="0"/>
                   <a:ea typeface="Open Sans" panose="020B0604020202020204" charset="0"/>
                   <a:cs typeface="Open Sans" panose="020B0604020202020204" charset="0"/>
@@ -28021,12 +27190,6 @@
                 </a:rPr>
                 <a:t>Die Lernenden können ein eigenes Sitzverteilungsverfahren entwickeln.</a:t>
               </a:r>
-              <a:endParaRPr lang="de-DE" kern="1200" dirty="0">
-                <a:latin typeface="Open Sans" panose="020B0604020202020204" charset="0"/>
-                <a:ea typeface="Open Sans" panose="020B0604020202020204" charset="0"/>
-                <a:cs typeface="Open Sans" panose="020B0604020202020204" charset="0"/>
-                <a:sym typeface="Nunito"/>
-              </a:endParaRPr>
             </a:p>
           </p:txBody>
         </p:sp>
@@ -28101,7 +27264,7 @@
                 </a:spcAft>
               </a:pPr>
               <a:r>
-                <a:rPr lang="de-DE" kern="1200" dirty="0" smtClean="0">
+                <a:rPr lang="de-DE" kern="1200" dirty="0">
                   <a:latin typeface="Open Sans" panose="020B0604020202020204" charset="0"/>
                   <a:ea typeface="Open Sans" panose="020B0604020202020204" charset="0"/>
                   <a:cs typeface="Open Sans" panose="020B0604020202020204" charset="0"/>
@@ -28109,12 +27272,6 @@
                 </a:rPr>
                 <a:t>Die Lernenden können das Sitzverteilungsverfahren nach Niemeyer anwenden und das Sitzzuwachsparadoxon anhand eines Beispiels erklären. </a:t>
               </a:r>
-              <a:endParaRPr lang="de-DE" kern="1200" dirty="0">
-                <a:latin typeface="Open Sans" panose="020B0604020202020204" charset="0"/>
-                <a:ea typeface="Open Sans" panose="020B0604020202020204" charset="0"/>
-                <a:cs typeface="Open Sans" panose="020B0604020202020204" charset="0"/>
-                <a:sym typeface="Nunito"/>
-              </a:endParaRPr>
             </a:p>
           </p:txBody>
         </p:sp>
@@ -28189,7 +27346,7 @@
                 </a:spcAft>
               </a:pPr>
               <a:r>
-                <a:rPr lang="de-DE" kern="1200" dirty="0" smtClean="0">
+                <a:rPr lang="de-DE" kern="1200" dirty="0">
                   <a:latin typeface="Open Sans" panose="020B0604020202020204" charset="0"/>
                   <a:ea typeface="Open Sans" panose="020B0604020202020204" charset="0"/>
                   <a:cs typeface="Open Sans" panose="020B0604020202020204" charset="0"/>
@@ -28198,7 +27355,7 @@
                 <a:t>Die Lernenden können das Sitzverteilungsverfahren nach D'Hondt oder </a:t>
               </a:r>
               <a:r>
-                <a:rPr lang="de-DE" kern="1200" dirty="0" err="1" smtClean="0">
+                <a:rPr lang="de-DE" kern="1200" dirty="0" err="1">
                   <a:latin typeface="Open Sans" panose="020B0604020202020204" charset="0"/>
                   <a:ea typeface="Open Sans" panose="020B0604020202020204" charset="0"/>
                   <a:cs typeface="Open Sans" panose="020B0604020202020204" charset="0"/>
@@ -28207,7 +27364,7 @@
                 <a:t>Sainte-Laguë</a:t>
               </a:r>
               <a:r>
-                <a:rPr lang="de-DE" kern="1200" dirty="0" smtClean="0">
+                <a:rPr lang="de-DE" kern="1200" dirty="0">
                   <a:latin typeface="Open Sans" panose="020B0604020202020204" charset="0"/>
                   <a:ea typeface="Open Sans" panose="020B0604020202020204" charset="0"/>
                   <a:cs typeface="Open Sans" panose="020B0604020202020204" charset="0"/>
@@ -28215,12 +27372,6 @@
                 </a:rPr>
                 <a:t> auf ein Beispiel anwenden und erklären.</a:t>
               </a:r>
-              <a:endParaRPr lang="de-DE" kern="1200" dirty="0">
-                <a:latin typeface="Open Sans" panose="020B0604020202020204" charset="0"/>
-                <a:ea typeface="Open Sans" panose="020B0604020202020204" charset="0"/>
-                <a:cs typeface="Open Sans" panose="020B0604020202020204" charset="0"/>
-                <a:sym typeface="Nunito"/>
-              </a:endParaRPr>
             </a:p>
           </p:txBody>
         </p:sp>
@@ -28295,7 +27446,7 @@
                 </a:spcAft>
               </a:pPr>
               <a:r>
-                <a:rPr lang="de-DE" kern="1200" dirty="0" smtClean="0">
+                <a:rPr lang="de-DE" kern="1200" dirty="0">
                   <a:latin typeface="Open Sans" panose="020B0604020202020204" charset="0"/>
                   <a:ea typeface="Open Sans" panose="020B0604020202020204" charset="0"/>
                   <a:cs typeface="Open Sans" panose="020B0604020202020204" charset="0"/>
@@ -28322,13 +27473,6 @@
   <p:clrMapOvr>
     <a:masterClrMapping/>
   </p:clrMapOvr>
-  <p:timing>
-    <p:tnLst>
-      <p:par>
-        <p:cTn id="1" dur="indefinite" restart="never" nodeType="tmRoot"/>
-      </p:par>
-    </p:tnLst>
-  </p:timing>
 </p:sld>
 </file>
 
@@ -28438,13 +27582,6 @@
   <p:clrMapOvr>
     <a:masterClrMapping/>
   </p:clrMapOvr>
-  <p:timing>
-    <p:tnLst>
-      <p:par>
-        <p:cTn id="1" dur="indefinite" restart="never" nodeType="tmRoot"/>
-      </p:par>
-    </p:tnLst>
-  </p:timing>
 </p:sld>
 </file>
 
@@ -28502,11 +27639,7 @@
             </a:pPr>
             <a:r>
               <a:rPr lang="de" dirty="0"/>
-              <a:t>Stundenverlaufsplan (gekürzt und mit Bezug auf Workbook und Hinweis auf Stop/Inputphase</a:t>
-            </a:r>
-            <a:r>
-              <a:rPr lang="de" dirty="0" smtClean="0"/>
-              <a:t>)</a:t>
+              <a:t>Stundenverlaufsplan (gekürzt und mit Bezug auf Workbook und Hinweis auf Stop/Inputphase)</a:t>
             </a:r>
             <a:endParaRPr dirty="0"/>
           </a:p>
@@ -28572,13 +27705,6 @@
   <p:clrMapOvr>
     <a:masterClrMapping/>
   </p:clrMapOvr>
-  <p:timing>
-    <p:tnLst>
-      <p:par>
-        <p:cTn id="1" dur="indefinite" restart="never" nodeType="tmRoot"/>
-      </p:par>
-    </p:tnLst>
-  </p:timing>
 </p:sld>
 </file>
 

</xml_diff>